<commit_message>
Added Load Balancing section.
</commit_message>
<xml_diff>
--- a/API Gateway.pptx
+++ b/API Gateway.pptx
@@ -5,7 +5,7 @@
     <p:sldMasterId id="2147483648" r:id="rId1"/>
   </p:sldMasterIdLst>
   <p:notesMasterIdLst>
-    <p:notesMasterId r:id="rId33"/>
+    <p:notesMasterId r:id="rId37"/>
   </p:notesMasterIdLst>
   <p:sldIdLst>
     <p:sldId id="256" r:id="rId2"/>
@@ -20,25 +20,29 @@
     <p:sldId id="318" r:id="rId11"/>
     <p:sldId id="311" r:id="rId12"/>
     <p:sldId id="317" r:id="rId13"/>
-    <p:sldId id="336" r:id="rId14"/>
-    <p:sldId id="337" r:id="rId15"/>
-    <p:sldId id="344" r:id="rId16"/>
-    <p:sldId id="346" r:id="rId17"/>
-    <p:sldId id="338" r:id="rId18"/>
-    <p:sldId id="339" r:id="rId19"/>
+    <p:sldId id="338" r:id="rId14"/>
+    <p:sldId id="339" r:id="rId15"/>
+    <p:sldId id="336" r:id="rId16"/>
+    <p:sldId id="337" r:id="rId17"/>
+    <p:sldId id="346" r:id="rId18"/>
+    <p:sldId id="344" r:id="rId19"/>
     <p:sldId id="340" r:id="rId20"/>
     <p:sldId id="327" r:id="rId21"/>
     <p:sldId id="328" r:id="rId22"/>
     <p:sldId id="333" r:id="rId23"/>
     <p:sldId id="329" r:id="rId24"/>
-    <p:sldId id="331" r:id="rId25"/>
-    <p:sldId id="332" r:id="rId26"/>
-    <p:sldId id="330" r:id="rId27"/>
-    <p:sldId id="342" r:id="rId28"/>
-    <p:sldId id="343" r:id="rId29"/>
-    <p:sldId id="335" r:id="rId30"/>
-    <p:sldId id="321" r:id="rId31"/>
-    <p:sldId id="341" r:id="rId32"/>
+    <p:sldId id="347" r:id="rId25"/>
+    <p:sldId id="348" r:id="rId26"/>
+    <p:sldId id="349" r:id="rId27"/>
+    <p:sldId id="350" r:id="rId28"/>
+    <p:sldId id="331" r:id="rId29"/>
+    <p:sldId id="332" r:id="rId30"/>
+    <p:sldId id="330" r:id="rId31"/>
+    <p:sldId id="342" r:id="rId32"/>
+    <p:sldId id="343" r:id="rId33"/>
+    <p:sldId id="335" r:id="rId34"/>
+    <p:sldId id="321" r:id="rId35"/>
+    <p:sldId id="341" r:id="rId36"/>
   </p:sldIdLst>
   <p:sldSz cx="12192000" cy="6858000"/>
   <p:notesSz cx="6858000" cy="9144000"/>
@@ -1492,7 +1496,7 @@
           <a:p>
             <a:fld id="{CFBC01FF-781E-4D25-A720-185C2D90034C}" type="slidenum">
               <a:rPr lang="en-US" smtClean="0"/>
-              <a:t>26</a:t>
+              <a:t>30</a:t>
             </a:fld>
             <a:endParaRPr lang="en-US"/>
           </a:p>
@@ -1582,7 +1586,7 @@
           <a:p>
             <a:fld id="{CFBC01FF-781E-4D25-A720-185C2D90034C}" type="slidenum">
               <a:rPr lang="en-US" smtClean="0"/>
-              <a:t>28</a:t>
+              <a:t>32</a:t>
             </a:fld>
             <a:endParaRPr lang="en-US"/>
           </a:p>
@@ -1666,7 +1670,7 @@
           <a:p>
             <a:fld id="{CFBC01FF-781E-4D25-A720-185C2D90034C}" type="slidenum">
               <a:rPr lang="en-US" smtClean="0"/>
-              <a:t>29</a:t>
+              <a:t>33</a:t>
             </a:fld>
             <a:endParaRPr lang="en-US"/>
           </a:p>
@@ -1851,10 +1855,20 @@
           <a:lstStyle/>
           <a:p>
             <a:r>
-              <a:rPr lang="de-AT" dirty="0" smtClean="0">
-                <a:hlinkClick r:id="rId3"/>
-              </a:rPr>
-              <a:t>https://konghq.com/install/</a:t>
+              <a:rPr lang="de-AT" dirty="0" smtClean="0"/>
+              <a:t>Link </a:t>
+            </a:r>
+            <a:r>
+              <a:rPr lang="de-AT" dirty="0" err="1" smtClean="0"/>
+              <a:t>to</a:t>
+            </a:r>
+            <a:r>
+              <a:rPr lang="de-AT" dirty="0" smtClean="0"/>
+              <a:t> </a:t>
+            </a:r>
+            <a:r>
+              <a:rPr lang="de-AT" dirty="0" err="1" smtClean="0"/>
+              <a:t>Archi</a:t>
             </a:r>
             <a:endParaRPr lang="de-AT" dirty="0" smtClean="0"/>
           </a:p>
@@ -1865,13 +1879,8 @@
             </a:pPr>
             <a:r>
               <a:rPr lang="de-AT" dirty="0" smtClean="0"/>
-              <a:t>Linux </a:t>
-            </a:r>
-            <a:r>
-              <a:rPr lang="de-AT" dirty="0" err="1" smtClean="0"/>
-              <a:t>Distributions</a:t>
-            </a:r>
-            <a:endParaRPr lang="de-AT" dirty="0" smtClean="0"/>
+              <a:t>Simple</a:t>
+            </a:r>
           </a:p>
           <a:p>
             <a:pPr marL="171450" indent="-171450">
@@ -1880,56 +1889,12 @@
             </a:pPr>
             <a:r>
               <a:rPr lang="de-AT" dirty="0" smtClean="0"/>
-              <a:t>Docker</a:t>
-            </a:r>
-          </a:p>
-          <a:p>
-            <a:pPr marL="171450" indent="-171450">
-              <a:buFontTx/>
-              <a:buChar char="-"/>
-            </a:pPr>
+              <a:t>VERBUND OpenShift </a:t>
+            </a:r>
             <a:r>
               <a:rPr lang="de-AT" dirty="0" err="1" smtClean="0"/>
-              <a:t>Kubernetes</a:t>
-            </a:r>
-            <a:endParaRPr lang="de-AT" dirty="0" smtClean="0"/>
-          </a:p>
-          <a:p>
-            <a:pPr marL="171450" indent="-171450">
-              <a:buFontTx/>
-              <a:buChar char="-"/>
-            </a:pPr>
-            <a:r>
-              <a:rPr lang="de-AT" dirty="0" err="1" smtClean="0"/>
-              <a:t>Azure</a:t>
-            </a:r>
-            <a:endParaRPr lang="de-AT" dirty="0" smtClean="0"/>
-          </a:p>
-          <a:p>
-            <a:pPr marL="171450" indent="-171450">
-              <a:buFontTx/>
-              <a:buChar char="-"/>
-            </a:pPr>
-            <a:r>
-              <a:rPr lang="de-AT" dirty="0" smtClean="0"/>
-              <a:t>AWS</a:t>
-            </a:r>
-          </a:p>
-          <a:p>
-            <a:pPr marL="171450" indent="-171450">
-              <a:buFontTx/>
-              <a:buChar char="-"/>
-            </a:pPr>
-            <a:r>
-              <a:rPr lang="de-AT" dirty="0" smtClean="0"/>
-              <a:t>GCP</a:t>
-            </a:r>
-          </a:p>
-          <a:p>
-            <a:pPr marL="171450" indent="-171450">
-              <a:buFontTx/>
-              <a:buChar char="-"/>
-            </a:pPr>
+              <a:t>Deployment</a:t>
+            </a:r>
             <a:endParaRPr lang="de-AT" dirty="0"/>
           </a:p>
         </p:txBody>
@@ -1960,7 +1925,7 @@
     </p:spTree>
     <p:extLst>
       <p:ext uri="{BB962C8B-B14F-4D97-AF65-F5344CB8AC3E}">
-        <p14:creationId xmlns:p14="http://schemas.microsoft.com/office/powerpoint/2010/main" val="1884093684"/>
+        <p14:creationId xmlns:p14="http://schemas.microsoft.com/office/powerpoint/2010/main" val="2434513362"/>
       </p:ext>
     </p:extLst>
   </p:cSld>
@@ -2014,6 +1979,12 @@
           <a:bodyPr/>
           <a:lstStyle/>
           <a:p>
+            <a:r>
+              <a:rPr lang="de-AT" dirty="0" smtClean="0">
+                <a:hlinkClick r:id="rId3"/>
+              </a:rPr>
+              <a:t>https://docs.konghq.com/1.4.x/db-less-and-declarative-config/</a:t>
+            </a:r>
             <a:endParaRPr lang="de-AT" dirty="0"/>
           </a:p>
         </p:txBody>
@@ -2044,7 +2015,7 @@
     </p:spTree>
     <p:extLst>
       <p:ext uri="{BB962C8B-B14F-4D97-AF65-F5344CB8AC3E}">
-        <p14:creationId xmlns:p14="http://schemas.microsoft.com/office/powerpoint/2010/main" val="1899104220"/>
+        <p14:creationId xmlns:p14="http://schemas.microsoft.com/office/powerpoint/2010/main" val="670475549"/>
       </p:ext>
     </p:extLst>
   </p:cSld>
@@ -2102,8 +2073,82 @@
               <a:rPr lang="de-AT" dirty="0" smtClean="0">
                 <a:hlinkClick r:id="rId3"/>
               </a:rPr>
-              <a:t>https://docs.konghq.com/1.4.x/clustering/</a:t>
-            </a:r>
+              <a:t>https://konghq.com/install/</a:t>
+            </a:r>
+            <a:endParaRPr lang="de-AT" dirty="0" smtClean="0"/>
+          </a:p>
+          <a:p>
+            <a:pPr marL="171450" indent="-171450">
+              <a:buFontTx/>
+              <a:buChar char="-"/>
+            </a:pPr>
+            <a:r>
+              <a:rPr lang="de-AT" dirty="0" smtClean="0"/>
+              <a:t>Linux </a:t>
+            </a:r>
+            <a:r>
+              <a:rPr lang="de-AT" dirty="0" err="1" smtClean="0"/>
+              <a:t>Distributions</a:t>
+            </a:r>
+            <a:endParaRPr lang="de-AT" dirty="0" smtClean="0"/>
+          </a:p>
+          <a:p>
+            <a:pPr marL="171450" indent="-171450">
+              <a:buFontTx/>
+              <a:buChar char="-"/>
+            </a:pPr>
+            <a:r>
+              <a:rPr lang="de-AT" dirty="0" smtClean="0"/>
+              <a:t>Docker</a:t>
+            </a:r>
+          </a:p>
+          <a:p>
+            <a:pPr marL="171450" indent="-171450">
+              <a:buFontTx/>
+              <a:buChar char="-"/>
+            </a:pPr>
+            <a:r>
+              <a:rPr lang="de-AT" dirty="0" err="1" smtClean="0"/>
+              <a:t>Kubernetes</a:t>
+            </a:r>
+            <a:endParaRPr lang="de-AT" dirty="0" smtClean="0"/>
+          </a:p>
+          <a:p>
+            <a:pPr marL="171450" indent="-171450">
+              <a:buFontTx/>
+              <a:buChar char="-"/>
+            </a:pPr>
+            <a:r>
+              <a:rPr lang="de-AT" dirty="0" err="1" smtClean="0"/>
+              <a:t>Azure</a:t>
+            </a:r>
+            <a:endParaRPr lang="de-AT" dirty="0" smtClean="0"/>
+          </a:p>
+          <a:p>
+            <a:pPr marL="171450" indent="-171450">
+              <a:buFontTx/>
+              <a:buChar char="-"/>
+            </a:pPr>
+            <a:r>
+              <a:rPr lang="de-AT" dirty="0" smtClean="0"/>
+              <a:t>AWS</a:t>
+            </a:r>
+          </a:p>
+          <a:p>
+            <a:pPr marL="171450" indent="-171450">
+              <a:buFontTx/>
+              <a:buChar char="-"/>
+            </a:pPr>
+            <a:r>
+              <a:rPr lang="de-AT" dirty="0" smtClean="0"/>
+              <a:t>GCP</a:t>
+            </a:r>
+          </a:p>
+          <a:p>
+            <a:pPr marL="171450" indent="-171450">
+              <a:buFontTx/>
+              <a:buChar char="-"/>
+            </a:pPr>
             <a:endParaRPr lang="de-AT" dirty="0"/>
           </a:p>
         </p:txBody>
@@ -2134,7 +2179,7 @@
     </p:spTree>
     <p:extLst>
       <p:ext uri="{BB962C8B-B14F-4D97-AF65-F5344CB8AC3E}">
-        <p14:creationId xmlns:p14="http://schemas.microsoft.com/office/powerpoint/2010/main" val="2911641481"/>
+        <p14:creationId xmlns:p14="http://schemas.microsoft.com/office/powerpoint/2010/main" val="1884093684"/>
       </p:ext>
     </p:extLst>
   </p:cSld>
@@ -2188,47 +2233,6 @@
           <a:bodyPr/>
           <a:lstStyle/>
           <a:p>
-            <a:r>
-              <a:rPr lang="de-AT" dirty="0" smtClean="0"/>
-              <a:t>Link </a:t>
-            </a:r>
-            <a:r>
-              <a:rPr lang="de-AT" dirty="0" err="1" smtClean="0"/>
-              <a:t>to</a:t>
-            </a:r>
-            <a:r>
-              <a:rPr lang="de-AT" dirty="0" smtClean="0"/>
-              <a:t> </a:t>
-            </a:r>
-            <a:r>
-              <a:rPr lang="de-AT" dirty="0" err="1" smtClean="0"/>
-              <a:t>Archi</a:t>
-            </a:r>
-            <a:endParaRPr lang="de-AT" dirty="0" smtClean="0"/>
-          </a:p>
-          <a:p>
-            <a:pPr marL="171450" indent="-171450">
-              <a:buFontTx/>
-              <a:buChar char="-"/>
-            </a:pPr>
-            <a:r>
-              <a:rPr lang="de-AT" dirty="0" smtClean="0"/>
-              <a:t>Simple</a:t>
-            </a:r>
-          </a:p>
-          <a:p>
-            <a:pPr marL="171450" indent="-171450">
-              <a:buFontTx/>
-              <a:buChar char="-"/>
-            </a:pPr>
-            <a:r>
-              <a:rPr lang="de-AT" dirty="0" smtClean="0"/>
-              <a:t>VERBUND OpenShift </a:t>
-            </a:r>
-            <a:r>
-              <a:rPr lang="de-AT" dirty="0" err="1" smtClean="0"/>
-              <a:t>Deployment</a:t>
-            </a:r>
             <a:endParaRPr lang="de-AT" dirty="0"/>
           </a:p>
         </p:txBody>
@@ -2250,7 +2254,7 @@
           <a:p>
             <a:fld id="{CFBC01FF-781E-4D25-A720-185C2D90034C}" type="slidenum">
               <a:rPr lang="en-US" smtClean="0"/>
-              <a:t>17</a:t>
+              <a:t>16</a:t>
             </a:fld>
             <a:endParaRPr lang="en-US"/>
           </a:p>
@@ -2259,7 +2263,7 @@
     </p:spTree>
     <p:extLst>
       <p:ext uri="{BB962C8B-B14F-4D97-AF65-F5344CB8AC3E}">
-        <p14:creationId xmlns:p14="http://schemas.microsoft.com/office/powerpoint/2010/main" val="2434513362"/>
+        <p14:creationId xmlns:p14="http://schemas.microsoft.com/office/powerpoint/2010/main" val="1899104220"/>
       </p:ext>
     </p:extLst>
   </p:cSld>
@@ -2317,7 +2321,7 @@
               <a:rPr lang="de-AT" dirty="0" smtClean="0">
                 <a:hlinkClick r:id="rId3"/>
               </a:rPr>
-              <a:t>https://docs.konghq.com/1.4.x/db-less-and-declarative-config/</a:t>
+              <a:t>https://docs.konghq.com/1.4.x/clustering/</a:t>
             </a:r>
             <a:endParaRPr lang="de-AT" dirty="0"/>
           </a:p>
@@ -2349,7 +2353,7 @@
     </p:spTree>
     <p:extLst>
       <p:ext uri="{BB962C8B-B14F-4D97-AF65-F5344CB8AC3E}">
-        <p14:creationId xmlns:p14="http://schemas.microsoft.com/office/powerpoint/2010/main" val="670475549"/>
+        <p14:creationId xmlns:p14="http://schemas.microsoft.com/office/powerpoint/2010/main" val="2911641481"/>
       </p:ext>
     </p:extLst>
   </p:cSld>
@@ -6824,6 +6828,547 @@
           <a:p>
             <a:r>
               <a:rPr lang="de-AT" dirty="0" smtClean="0"/>
+              <a:t>Database</a:t>
+            </a:r>
+            <a:endParaRPr lang="de-AT" dirty="0"/>
+          </a:p>
+        </p:txBody>
+      </p:sp>
+      <p:pic>
+        <p:nvPicPr>
+          <p:cNvPr id="4" name="Picture 3"/>
+          <p:cNvPicPr>
+            <a:picLocks noChangeAspect="1"/>
+          </p:cNvPicPr>
+          <p:nvPr/>
+        </p:nvPicPr>
+        <p:blipFill>
+          <a:blip r:embed="rId3"/>
+          <a:stretch>
+            <a:fillRect/>
+          </a:stretch>
+        </p:blipFill>
+        <p:spPr>
+          <a:xfrm>
+            <a:off x="2496000" y="1676400"/>
+            <a:ext cx="7200000" cy="3575709"/>
+          </a:xfrm>
+          <a:prstGeom prst="rect">
+            <a:avLst/>
+          </a:prstGeom>
+        </p:spPr>
+      </p:pic>
+      <p:sp>
+        <p:nvSpPr>
+          <p:cNvPr id="5" name="TextBox 1">
+            <a:extLst>
+              <a:ext uri="{FF2B5EF4-FFF2-40B4-BE49-F238E27FC236}">
+                <a16:creationId xmlns:a16="http://schemas.microsoft.com/office/drawing/2014/main" id="{E55A1FC0-8E30-4FAB-B566-BDFED0EBDD27}"/>
+              </a:ext>
+            </a:extLst>
+          </p:cNvPr>
+          <p:cNvSpPr txBox="1"/>
+          <p:nvPr/>
+        </p:nvSpPr>
+        <p:spPr>
+          <a:xfrm>
+            <a:off x="43543" y="6438899"/>
+            <a:ext cx="8068126" cy="369332"/>
+          </a:xfrm>
+          <a:prstGeom prst="rect">
+            <a:avLst/>
+          </a:prstGeom>
+          <a:noFill/>
+        </p:spPr>
+        <p:txBody>
+          <a:bodyPr rot="0" spcFirstLastPara="0" vert="horz" wrap="square" lIns="91440" tIns="45720" rIns="91440" bIns="45720" numCol="1" spcCol="0" rtlCol="0" fromWordArt="0" anchor="t" anchorCtr="0" forceAA="0" compatLnSpc="1">
+            <a:prstTxWarp prst="textNoShape">
+              <a:avLst/>
+            </a:prstTxWarp>
+            <a:spAutoFit/>
+          </a:bodyPr>
+          <a:lstStyle>
+            <a:defPPr>
+              <a:defRPr lang="en-US"/>
+            </a:defPPr>
+            <a:lvl1pPr marL="0" algn="l" defTabSz="914400" rtl="0" eaLnBrk="1" latinLnBrk="0" hangingPunct="1">
+              <a:defRPr sz="1800" kern="1200">
+                <a:solidFill>
+                  <a:schemeClr val="tx1"/>
+                </a:solidFill>
+                <a:latin typeface="+mn-lt"/>
+                <a:ea typeface="+mn-ea"/>
+                <a:cs typeface="+mn-cs"/>
+              </a:defRPr>
+            </a:lvl1pPr>
+            <a:lvl2pPr marL="457200" algn="l" defTabSz="914400" rtl="0" eaLnBrk="1" latinLnBrk="0" hangingPunct="1">
+              <a:defRPr sz="1800" kern="1200">
+                <a:solidFill>
+                  <a:schemeClr val="tx1"/>
+                </a:solidFill>
+                <a:latin typeface="+mn-lt"/>
+                <a:ea typeface="+mn-ea"/>
+                <a:cs typeface="+mn-cs"/>
+              </a:defRPr>
+            </a:lvl2pPr>
+            <a:lvl3pPr marL="914400" algn="l" defTabSz="914400" rtl="0" eaLnBrk="1" latinLnBrk="0" hangingPunct="1">
+              <a:defRPr sz="1800" kern="1200">
+                <a:solidFill>
+                  <a:schemeClr val="tx1"/>
+                </a:solidFill>
+                <a:latin typeface="+mn-lt"/>
+                <a:ea typeface="+mn-ea"/>
+                <a:cs typeface="+mn-cs"/>
+              </a:defRPr>
+            </a:lvl3pPr>
+            <a:lvl4pPr marL="1371600" algn="l" defTabSz="914400" rtl="0" eaLnBrk="1" latinLnBrk="0" hangingPunct="1">
+              <a:defRPr sz="1800" kern="1200">
+                <a:solidFill>
+                  <a:schemeClr val="tx1"/>
+                </a:solidFill>
+                <a:latin typeface="+mn-lt"/>
+                <a:ea typeface="+mn-ea"/>
+                <a:cs typeface="+mn-cs"/>
+              </a:defRPr>
+            </a:lvl4pPr>
+            <a:lvl5pPr marL="1828800" algn="l" defTabSz="914400" rtl="0" eaLnBrk="1" latinLnBrk="0" hangingPunct="1">
+              <a:defRPr sz="1800" kern="1200">
+                <a:solidFill>
+                  <a:schemeClr val="tx1"/>
+                </a:solidFill>
+                <a:latin typeface="+mn-lt"/>
+                <a:ea typeface="+mn-ea"/>
+                <a:cs typeface="+mn-cs"/>
+              </a:defRPr>
+            </a:lvl5pPr>
+            <a:lvl6pPr marL="2286000" algn="l" defTabSz="914400" rtl="0" eaLnBrk="1" latinLnBrk="0" hangingPunct="1">
+              <a:defRPr sz="1800" kern="1200">
+                <a:solidFill>
+                  <a:schemeClr val="tx1"/>
+                </a:solidFill>
+                <a:latin typeface="+mn-lt"/>
+                <a:ea typeface="+mn-ea"/>
+                <a:cs typeface="+mn-cs"/>
+              </a:defRPr>
+            </a:lvl6pPr>
+            <a:lvl7pPr marL="2743200" algn="l" defTabSz="914400" rtl="0" eaLnBrk="1" latinLnBrk="0" hangingPunct="1">
+              <a:defRPr sz="1800" kern="1200">
+                <a:solidFill>
+                  <a:schemeClr val="tx1"/>
+                </a:solidFill>
+                <a:latin typeface="+mn-lt"/>
+                <a:ea typeface="+mn-ea"/>
+                <a:cs typeface="+mn-cs"/>
+              </a:defRPr>
+            </a:lvl7pPr>
+            <a:lvl8pPr marL="3200400" algn="l" defTabSz="914400" rtl="0" eaLnBrk="1" latinLnBrk="0" hangingPunct="1">
+              <a:defRPr sz="1800" kern="1200">
+                <a:solidFill>
+                  <a:schemeClr val="tx1"/>
+                </a:solidFill>
+                <a:latin typeface="+mn-lt"/>
+                <a:ea typeface="+mn-ea"/>
+                <a:cs typeface="+mn-cs"/>
+              </a:defRPr>
+            </a:lvl8pPr>
+            <a:lvl9pPr marL="3657600" algn="l" defTabSz="914400" rtl="0" eaLnBrk="1" latinLnBrk="0" hangingPunct="1">
+              <a:defRPr sz="1800" kern="1200">
+                <a:solidFill>
+                  <a:schemeClr val="tx1"/>
+                </a:solidFill>
+                <a:latin typeface="+mn-lt"/>
+                <a:ea typeface="+mn-ea"/>
+                <a:cs typeface="+mn-cs"/>
+              </a:defRPr>
+            </a:lvl9pPr>
+          </a:lstStyle>
+          <a:p>
+            <a:r>
+              <a:rPr lang="en-US" dirty="0" err="1"/>
+              <a:t>Siehe</a:t>
+            </a:r>
+            <a:r>
+              <a:rPr lang="en-US" dirty="0" smtClean="0"/>
+              <a:t>:</a:t>
+            </a:r>
+            <a:r>
+              <a:rPr lang="en-US" dirty="0"/>
+              <a:t> </a:t>
+            </a:r>
+            <a:r>
+              <a:rPr lang="de-AT" dirty="0">
+                <a:hlinkClick r:id="rId4"/>
+              </a:rPr>
+              <a:t>https://</a:t>
+            </a:r>
+            <a:r>
+              <a:rPr lang="de-AT" dirty="0" smtClean="0">
+                <a:hlinkClick r:id="rId4"/>
+              </a:rPr>
+              <a:t>www.archimatetool.com</a:t>
+            </a:r>
+            <a:endParaRPr lang="en-US" dirty="0"/>
+          </a:p>
+        </p:txBody>
+      </p:sp>
+      <p:pic>
+        <p:nvPicPr>
+          <p:cNvPr id="2050" name="Picture 2" descr="https://www.archimatetool.com/wp-content/uploads/2018/07/header.png"/>
+          <p:cNvPicPr>
+            <a:picLocks noChangeAspect="1" noChangeArrowheads="1"/>
+          </p:cNvPicPr>
+          <p:nvPr/>
+        </p:nvPicPr>
+        <p:blipFill>
+          <a:blip r:embed="rId5">
+            <a:extLst>
+              <a:ext uri="{28A0092B-C50C-407E-A947-70E740481C1C}">
+                <a14:useLocalDpi xmlns:a14="http://schemas.microsoft.com/office/drawing/2010/main" val="0"/>
+              </a:ext>
+            </a:extLst>
+          </a:blip>
+          <a:srcRect/>
+          <a:stretch>
+            <a:fillRect/>
+          </a:stretch>
+        </p:blipFill>
+        <p:spPr bwMode="auto">
+          <a:xfrm>
+            <a:off x="10101942" y="365125"/>
+            <a:ext cx="1631287" cy="598637"/>
+          </a:xfrm>
+          <a:prstGeom prst="rect">
+            <a:avLst/>
+          </a:prstGeom>
+          <a:noFill/>
+          <a:extLst>
+            <a:ext uri="{909E8E84-426E-40DD-AFC4-6F175D3DCCD1}">
+              <a14:hiddenFill xmlns:a14="http://schemas.microsoft.com/office/drawing/2010/main">
+                <a:solidFill>
+                  <a:srgbClr val="FFFFFF"/>
+                </a:solidFill>
+              </a14:hiddenFill>
+            </a:ext>
+          </a:extLst>
+        </p:spPr>
+      </p:pic>
+    </p:spTree>
+    <p:extLst>
+      <p:ext uri="{BB962C8B-B14F-4D97-AF65-F5344CB8AC3E}">
+        <p14:creationId xmlns:p14="http://schemas.microsoft.com/office/powerpoint/2010/main" val="2237333450"/>
+      </p:ext>
+    </p:extLst>
+  </p:cSld>
+  <p:clrMapOvr>
+    <a:masterClrMapping/>
+  </p:clrMapOvr>
+</p:sld>
+</file>
+
+<file path=ppt/slides/slide14.xml><?xml version="1.0" encoding="utf-8"?>
+<p:sld xmlns:a="http://schemas.openxmlformats.org/drawingml/2006/main" xmlns:r="http://schemas.openxmlformats.org/officeDocument/2006/relationships" xmlns:p="http://schemas.openxmlformats.org/presentationml/2006/main">
+  <p:cSld>
+    <p:spTree>
+      <p:nvGrpSpPr>
+        <p:cNvPr id="1" name=""/>
+        <p:cNvGrpSpPr/>
+        <p:nvPr/>
+      </p:nvGrpSpPr>
+      <p:grpSpPr>
+        <a:xfrm>
+          <a:off x="0" y="0"/>
+          <a:ext cx="0" cy="0"/>
+          <a:chOff x="0" y="0"/>
+          <a:chExt cx="0" cy="0"/>
+        </a:xfrm>
+      </p:grpSpPr>
+      <p:sp>
+        <p:nvSpPr>
+          <p:cNvPr id="2" name="Title 1"/>
+          <p:cNvSpPr>
+            <a:spLocks noGrp="1"/>
+          </p:cNvSpPr>
+          <p:nvPr>
+            <p:ph type="title"/>
+          </p:nvPr>
+        </p:nvSpPr>
+        <p:spPr/>
+        <p:txBody>
+          <a:bodyPr/>
+          <a:lstStyle/>
+          <a:p>
+            <a:r>
+              <a:rPr lang="de-AT" dirty="0" smtClean="0"/>
+              <a:t>DB-</a:t>
+            </a:r>
+            <a:r>
+              <a:rPr lang="de-AT" dirty="0" err="1" smtClean="0"/>
+              <a:t>less</a:t>
+            </a:r>
+            <a:endParaRPr lang="de-AT" dirty="0"/>
+          </a:p>
+        </p:txBody>
+      </p:sp>
+      <p:pic>
+        <p:nvPicPr>
+          <p:cNvPr id="4" name="Content Placeholder 3"/>
+          <p:cNvPicPr>
+            <a:picLocks noGrp="1" noChangeAspect="1"/>
+          </p:cNvPicPr>
+          <p:nvPr>
+            <p:ph idx="1"/>
+          </p:nvPr>
+        </p:nvPicPr>
+        <p:blipFill>
+          <a:blip r:embed="rId3"/>
+          <a:stretch>
+            <a:fillRect/>
+          </a:stretch>
+        </p:blipFill>
+        <p:spPr>
+          <a:xfrm>
+            <a:off x="2496000" y="2020389"/>
+            <a:ext cx="7200000" cy="3744551"/>
+          </a:xfrm>
+          <a:prstGeom prst="rect">
+            <a:avLst/>
+          </a:prstGeom>
+        </p:spPr>
+      </p:pic>
+      <p:pic>
+        <p:nvPicPr>
+          <p:cNvPr id="5" name="Picture 2" descr="https://www.archimatetool.com/wp-content/uploads/2018/07/header.png"/>
+          <p:cNvPicPr>
+            <a:picLocks noChangeAspect="1" noChangeArrowheads="1"/>
+          </p:cNvPicPr>
+          <p:nvPr/>
+        </p:nvPicPr>
+        <p:blipFill>
+          <a:blip r:embed="rId4">
+            <a:extLst>
+              <a:ext uri="{28A0092B-C50C-407E-A947-70E740481C1C}">
+                <a14:useLocalDpi xmlns:a14="http://schemas.microsoft.com/office/drawing/2010/main" val="0"/>
+              </a:ext>
+            </a:extLst>
+          </a:blip>
+          <a:srcRect/>
+          <a:stretch>
+            <a:fillRect/>
+          </a:stretch>
+        </p:blipFill>
+        <p:spPr bwMode="auto">
+          <a:xfrm>
+            <a:off x="10101942" y="365125"/>
+            <a:ext cx="1631287" cy="598637"/>
+          </a:xfrm>
+          <a:prstGeom prst="rect">
+            <a:avLst/>
+          </a:prstGeom>
+          <a:noFill/>
+          <a:extLst>
+            <a:ext uri="{909E8E84-426E-40DD-AFC4-6F175D3DCCD1}">
+              <a14:hiddenFill xmlns:a14="http://schemas.microsoft.com/office/drawing/2010/main">
+                <a:solidFill>
+                  <a:srgbClr val="FFFFFF"/>
+                </a:solidFill>
+              </a14:hiddenFill>
+            </a:ext>
+          </a:extLst>
+        </p:spPr>
+      </p:pic>
+      <p:sp>
+        <p:nvSpPr>
+          <p:cNvPr id="6" name="TextBox 1">
+            <a:extLst>
+              <a:ext uri="{FF2B5EF4-FFF2-40B4-BE49-F238E27FC236}">
+                <a16:creationId xmlns:a16="http://schemas.microsoft.com/office/drawing/2014/main" id="{E55A1FC0-8E30-4FAB-B566-BDFED0EBDD27}"/>
+              </a:ext>
+            </a:extLst>
+          </p:cNvPr>
+          <p:cNvSpPr txBox="1"/>
+          <p:nvPr/>
+        </p:nvSpPr>
+        <p:spPr>
+          <a:xfrm>
+            <a:off x="43543" y="6438899"/>
+            <a:ext cx="8068126" cy="369332"/>
+          </a:xfrm>
+          <a:prstGeom prst="rect">
+            <a:avLst/>
+          </a:prstGeom>
+          <a:noFill/>
+        </p:spPr>
+        <p:txBody>
+          <a:bodyPr rot="0" spcFirstLastPara="0" vert="horz" wrap="square" lIns="91440" tIns="45720" rIns="91440" bIns="45720" numCol="1" spcCol="0" rtlCol="0" fromWordArt="0" anchor="t" anchorCtr="0" forceAA="0" compatLnSpc="1">
+            <a:prstTxWarp prst="textNoShape">
+              <a:avLst/>
+            </a:prstTxWarp>
+            <a:spAutoFit/>
+          </a:bodyPr>
+          <a:lstStyle>
+            <a:defPPr>
+              <a:defRPr lang="en-US"/>
+            </a:defPPr>
+            <a:lvl1pPr marL="0" algn="l" defTabSz="914400" rtl="0" eaLnBrk="1" latinLnBrk="0" hangingPunct="1">
+              <a:defRPr sz="1800" kern="1200">
+                <a:solidFill>
+                  <a:schemeClr val="tx1"/>
+                </a:solidFill>
+                <a:latin typeface="+mn-lt"/>
+                <a:ea typeface="+mn-ea"/>
+                <a:cs typeface="+mn-cs"/>
+              </a:defRPr>
+            </a:lvl1pPr>
+            <a:lvl2pPr marL="457200" algn="l" defTabSz="914400" rtl="0" eaLnBrk="1" latinLnBrk="0" hangingPunct="1">
+              <a:defRPr sz="1800" kern="1200">
+                <a:solidFill>
+                  <a:schemeClr val="tx1"/>
+                </a:solidFill>
+                <a:latin typeface="+mn-lt"/>
+                <a:ea typeface="+mn-ea"/>
+                <a:cs typeface="+mn-cs"/>
+              </a:defRPr>
+            </a:lvl2pPr>
+            <a:lvl3pPr marL="914400" algn="l" defTabSz="914400" rtl="0" eaLnBrk="1" latinLnBrk="0" hangingPunct="1">
+              <a:defRPr sz="1800" kern="1200">
+                <a:solidFill>
+                  <a:schemeClr val="tx1"/>
+                </a:solidFill>
+                <a:latin typeface="+mn-lt"/>
+                <a:ea typeface="+mn-ea"/>
+                <a:cs typeface="+mn-cs"/>
+              </a:defRPr>
+            </a:lvl3pPr>
+            <a:lvl4pPr marL="1371600" algn="l" defTabSz="914400" rtl="0" eaLnBrk="1" latinLnBrk="0" hangingPunct="1">
+              <a:defRPr sz="1800" kern="1200">
+                <a:solidFill>
+                  <a:schemeClr val="tx1"/>
+                </a:solidFill>
+                <a:latin typeface="+mn-lt"/>
+                <a:ea typeface="+mn-ea"/>
+                <a:cs typeface="+mn-cs"/>
+              </a:defRPr>
+            </a:lvl4pPr>
+            <a:lvl5pPr marL="1828800" algn="l" defTabSz="914400" rtl="0" eaLnBrk="1" latinLnBrk="0" hangingPunct="1">
+              <a:defRPr sz="1800" kern="1200">
+                <a:solidFill>
+                  <a:schemeClr val="tx1"/>
+                </a:solidFill>
+                <a:latin typeface="+mn-lt"/>
+                <a:ea typeface="+mn-ea"/>
+                <a:cs typeface="+mn-cs"/>
+              </a:defRPr>
+            </a:lvl5pPr>
+            <a:lvl6pPr marL="2286000" algn="l" defTabSz="914400" rtl="0" eaLnBrk="1" latinLnBrk="0" hangingPunct="1">
+              <a:defRPr sz="1800" kern="1200">
+                <a:solidFill>
+                  <a:schemeClr val="tx1"/>
+                </a:solidFill>
+                <a:latin typeface="+mn-lt"/>
+                <a:ea typeface="+mn-ea"/>
+                <a:cs typeface="+mn-cs"/>
+              </a:defRPr>
+            </a:lvl6pPr>
+            <a:lvl7pPr marL="2743200" algn="l" defTabSz="914400" rtl="0" eaLnBrk="1" latinLnBrk="0" hangingPunct="1">
+              <a:defRPr sz="1800" kern="1200">
+                <a:solidFill>
+                  <a:schemeClr val="tx1"/>
+                </a:solidFill>
+                <a:latin typeface="+mn-lt"/>
+                <a:ea typeface="+mn-ea"/>
+                <a:cs typeface="+mn-cs"/>
+              </a:defRPr>
+            </a:lvl7pPr>
+            <a:lvl8pPr marL="3200400" algn="l" defTabSz="914400" rtl="0" eaLnBrk="1" latinLnBrk="0" hangingPunct="1">
+              <a:defRPr sz="1800" kern="1200">
+                <a:solidFill>
+                  <a:schemeClr val="tx1"/>
+                </a:solidFill>
+                <a:latin typeface="+mn-lt"/>
+                <a:ea typeface="+mn-ea"/>
+                <a:cs typeface="+mn-cs"/>
+              </a:defRPr>
+            </a:lvl8pPr>
+            <a:lvl9pPr marL="3657600" algn="l" defTabSz="914400" rtl="0" eaLnBrk="1" latinLnBrk="0" hangingPunct="1">
+              <a:defRPr sz="1800" kern="1200">
+                <a:solidFill>
+                  <a:schemeClr val="tx1"/>
+                </a:solidFill>
+                <a:latin typeface="+mn-lt"/>
+                <a:ea typeface="+mn-ea"/>
+                <a:cs typeface="+mn-cs"/>
+              </a:defRPr>
+            </a:lvl9pPr>
+          </a:lstStyle>
+          <a:p>
+            <a:r>
+              <a:rPr lang="en-US" dirty="0" smtClean="0"/>
+              <a:t>See: </a:t>
+            </a:r>
+            <a:r>
+              <a:rPr lang="de-AT" dirty="0">
+                <a:hlinkClick r:id="rId5"/>
+              </a:rPr>
+              <a:t>https://docs.konghq.com/1.4.x/db-less-and-declarative-config/</a:t>
+            </a:r>
+            <a:endParaRPr lang="en-US" dirty="0"/>
+          </a:p>
+        </p:txBody>
+      </p:sp>
+    </p:spTree>
+    <p:extLst>
+      <p:ext uri="{BB962C8B-B14F-4D97-AF65-F5344CB8AC3E}">
+        <p14:creationId xmlns:p14="http://schemas.microsoft.com/office/powerpoint/2010/main" val="1120640164"/>
+      </p:ext>
+    </p:extLst>
+  </p:cSld>
+  <p:clrMapOvr>
+    <a:masterClrMapping/>
+  </p:clrMapOvr>
+  <p:timing>
+    <p:tnLst>
+      <p:par>
+        <p:cTn id="1" dur="indefinite" restart="never" nodeType="tmRoot"/>
+      </p:par>
+    </p:tnLst>
+  </p:timing>
+</p:sld>
+</file>
+
+<file path=ppt/slides/slide15.xml><?xml version="1.0" encoding="utf-8"?>
+<p:sld xmlns:a="http://schemas.openxmlformats.org/drawingml/2006/main" xmlns:r="http://schemas.openxmlformats.org/officeDocument/2006/relationships" xmlns:p="http://schemas.openxmlformats.org/presentationml/2006/main">
+  <p:cSld>
+    <p:spTree>
+      <p:nvGrpSpPr>
+        <p:cNvPr id="1" name=""/>
+        <p:cNvGrpSpPr/>
+        <p:nvPr/>
+      </p:nvGrpSpPr>
+      <p:grpSpPr>
+        <a:xfrm>
+          <a:off x="0" y="0"/>
+          <a:ext cx="0" cy="0"/>
+          <a:chOff x="0" y="0"/>
+          <a:chExt cx="0" cy="0"/>
+        </a:xfrm>
+      </p:grpSpPr>
+      <p:sp>
+        <p:nvSpPr>
+          <p:cNvPr id="2" name="Title 1"/>
+          <p:cNvSpPr>
+            <a:spLocks noGrp="1"/>
+          </p:cNvSpPr>
+          <p:nvPr>
+            <p:ph type="title"/>
+          </p:nvPr>
+        </p:nvSpPr>
+        <p:spPr/>
+        <p:txBody>
+          <a:bodyPr/>
+          <a:lstStyle/>
+          <a:p>
+            <a:r>
+              <a:rPr lang="de-AT" dirty="0" smtClean="0"/>
               <a:t>Installation</a:t>
             </a:r>
             <a:endParaRPr lang="de-AT" dirty="0"/>
@@ -7014,7 +7559,7 @@
 </p:sld>
 </file>
 
-<file path=ppt/slides/slide14.xml><?xml version="1.0" encoding="utf-8"?>
+<file path=ppt/slides/slide16.xml><?xml version="1.0" encoding="utf-8"?>
 <p:sld xmlns:a="http://schemas.openxmlformats.org/drawingml/2006/main" xmlns:r="http://schemas.openxmlformats.org/officeDocument/2006/relationships" xmlns:p="http://schemas.openxmlformats.org/presentationml/2006/main">
   <p:cSld>
     <p:spTree>
@@ -7223,7 +7768,152 @@
 </p:sld>
 </file>
 
-<file path=ppt/slides/slide15.xml><?xml version="1.0" encoding="utf-8"?>
+<file path=ppt/slides/slide17.xml><?xml version="1.0" encoding="utf-8"?>
+<p:sld xmlns:a="http://schemas.openxmlformats.org/drawingml/2006/main" xmlns:r="http://schemas.openxmlformats.org/officeDocument/2006/relationships" xmlns:p="http://schemas.openxmlformats.org/presentationml/2006/main">
+  <p:cSld>
+    <p:spTree>
+      <p:nvGrpSpPr>
+        <p:cNvPr id="1" name=""/>
+        <p:cNvGrpSpPr/>
+        <p:nvPr/>
+      </p:nvGrpSpPr>
+      <p:grpSpPr>
+        <a:xfrm>
+          <a:off x="0" y="0"/>
+          <a:ext cx="0" cy="0"/>
+          <a:chOff x="0" y="0"/>
+          <a:chExt cx="0" cy="0"/>
+        </a:xfrm>
+      </p:grpSpPr>
+      <p:sp>
+        <p:nvSpPr>
+          <p:cNvPr id="2" name="Title 1">
+            <a:extLst>
+              <a:ext uri="{FF2B5EF4-FFF2-40B4-BE49-F238E27FC236}">
+                <a16:creationId xmlns:a16="http://schemas.microsoft.com/office/drawing/2014/main" id="{04A30FA5-BC0C-476B-88DD-73B4FBB9406C}"/>
+              </a:ext>
+            </a:extLst>
+          </p:cNvPr>
+          <p:cNvSpPr>
+            <a:spLocks noGrp="1"/>
+          </p:cNvSpPr>
+          <p:nvPr>
+            <p:ph type="ctrTitle"/>
+          </p:nvPr>
+        </p:nvSpPr>
+        <p:spPr/>
+        <p:txBody>
+          <a:bodyPr/>
+          <a:lstStyle/>
+          <a:p>
+            <a:r>
+              <a:rPr lang="de-AT" smtClean="0"/>
+              <a:t>Hands-On</a:t>
+            </a:r>
+            <a:endParaRPr lang="en-US" dirty="0"/>
+          </a:p>
+        </p:txBody>
+      </p:sp>
+      <p:sp>
+        <p:nvSpPr>
+          <p:cNvPr id="3" name="Content Placeholder 2">
+            <a:extLst>
+              <a:ext uri="{FF2B5EF4-FFF2-40B4-BE49-F238E27FC236}">
+                <a16:creationId xmlns:a16="http://schemas.microsoft.com/office/drawing/2014/main" id="{2B106E46-C4D6-49F9-9B77-5E5E6EFEC57E}"/>
+              </a:ext>
+            </a:extLst>
+          </p:cNvPr>
+          <p:cNvSpPr>
+            <a:spLocks noGrp="1"/>
+          </p:cNvSpPr>
+          <p:nvPr>
+            <p:ph type="subTitle" idx="1"/>
+          </p:nvPr>
+        </p:nvSpPr>
+        <p:spPr>
+          <a:xfrm>
+            <a:off x="1524000" y="3602038"/>
+            <a:ext cx="9144000" cy="424732"/>
+          </a:xfrm>
+        </p:spPr>
+        <p:txBody>
+          <a:bodyPr>
+            <a:spAutoFit/>
+          </a:bodyPr>
+          <a:lstStyle/>
+          <a:p>
+            <a:r>
+              <a:rPr lang="en-US" dirty="0">
+                <a:hlinkClick r:id="rId2"/>
+              </a:rPr>
+              <a:t>github.com/danielwagn3r/</a:t>
+            </a:r>
+            <a:r>
+              <a:rPr lang="en-US" dirty="0" err="1">
+                <a:hlinkClick r:id="rId2"/>
+              </a:rPr>
+              <a:t>apimgmt</a:t>
+            </a:r>
+            <a:r>
+              <a:rPr lang="en-US">
+                <a:hlinkClick r:id="rId2"/>
+              </a:rPr>
+              <a:t>-workshop</a:t>
+            </a:r>
+            <a:endParaRPr lang="en-US" dirty="0"/>
+          </a:p>
+        </p:txBody>
+      </p:sp>
+      <p:pic>
+        <p:nvPicPr>
+          <p:cNvPr id="8" name="Picture 7">
+            <a:extLst>
+              <a:ext uri="{FF2B5EF4-FFF2-40B4-BE49-F238E27FC236}">
+                <a16:creationId xmlns:a16="http://schemas.microsoft.com/office/drawing/2014/main" id="{A6966702-4737-41A1-A211-D462668C4834}"/>
+              </a:ext>
+            </a:extLst>
+          </p:cNvPr>
+          <p:cNvPicPr>
+            <a:picLocks noChangeAspect="1"/>
+          </p:cNvPicPr>
+          <p:nvPr/>
+        </p:nvPicPr>
+        <p:blipFill>
+          <a:blip r:embed="rId3">
+            <a:extLst>
+              <a:ext uri="{28A0092B-C50C-407E-A947-70E740481C1C}">
+                <a14:useLocalDpi xmlns:a14="http://schemas.microsoft.com/office/drawing/2010/main" val="0"/>
+              </a:ext>
+            </a:extLst>
+          </a:blip>
+          <a:stretch>
+            <a:fillRect/>
+          </a:stretch>
+        </p:blipFill>
+        <p:spPr>
+          <a:xfrm>
+            <a:off x="2497810" y="3509604"/>
+            <a:ext cx="609600" cy="609600"/>
+          </a:xfrm>
+          <a:prstGeom prst="rect">
+            <a:avLst/>
+          </a:prstGeom>
+        </p:spPr>
+      </p:pic>
+    </p:spTree>
+    <p:extLst>
+      <p:ext uri="{BB962C8B-B14F-4D97-AF65-F5344CB8AC3E}">
+        <p14:creationId xmlns:p14="http://schemas.microsoft.com/office/powerpoint/2010/main" val="2985596720"/>
+      </p:ext>
+    </p:extLst>
+  </p:cSld>
+  <p:clrMapOvr>
+    <a:masterClrMapping/>
+  </p:clrMapOvr>
+</p:sld>
+</file>
+
+<file path=ppt/slides/slide18.xml><?xml version="1.0" encoding="utf-8"?>
 <p:sld xmlns:a="http://schemas.openxmlformats.org/drawingml/2006/main" xmlns:r="http://schemas.openxmlformats.org/officeDocument/2006/relationships" xmlns:p="http://schemas.openxmlformats.org/presentationml/2006/main">
   <p:cSld>
     <p:spTree>
@@ -7898,692 +8588,6 @@
 </p:sld>
 </file>
 
-<file path=ppt/slides/slide16.xml><?xml version="1.0" encoding="utf-8"?>
-<p:sld xmlns:a="http://schemas.openxmlformats.org/drawingml/2006/main" xmlns:r="http://schemas.openxmlformats.org/officeDocument/2006/relationships" xmlns:p="http://schemas.openxmlformats.org/presentationml/2006/main">
-  <p:cSld>
-    <p:spTree>
-      <p:nvGrpSpPr>
-        <p:cNvPr id="1" name=""/>
-        <p:cNvGrpSpPr/>
-        <p:nvPr/>
-      </p:nvGrpSpPr>
-      <p:grpSpPr>
-        <a:xfrm>
-          <a:off x="0" y="0"/>
-          <a:ext cx="0" cy="0"/>
-          <a:chOff x="0" y="0"/>
-          <a:chExt cx="0" cy="0"/>
-        </a:xfrm>
-      </p:grpSpPr>
-      <p:sp>
-        <p:nvSpPr>
-          <p:cNvPr id="2" name="Title 1">
-            <a:extLst>
-              <a:ext uri="{FF2B5EF4-FFF2-40B4-BE49-F238E27FC236}">
-                <a16:creationId xmlns:a16="http://schemas.microsoft.com/office/drawing/2014/main" id="{04A30FA5-BC0C-476B-88DD-73B4FBB9406C}"/>
-              </a:ext>
-            </a:extLst>
-          </p:cNvPr>
-          <p:cNvSpPr>
-            <a:spLocks noGrp="1"/>
-          </p:cNvSpPr>
-          <p:nvPr>
-            <p:ph type="ctrTitle"/>
-          </p:nvPr>
-        </p:nvSpPr>
-        <p:spPr/>
-        <p:txBody>
-          <a:bodyPr/>
-          <a:lstStyle/>
-          <a:p>
-            <a:r>
-              <a:rPr lang="de-AT" smtClean="0"/>
-              <a:t>Hands-On</a:t>
-            </a:r>
-            <a:endParaRPr lang="en-US" dirty="0"/>
-          </a:p>
-        </p:txBody>
-      </p:sp>
-      <p:sp>
-        <p:nvSpPr>
-          <p:cNvPr id="3" name="Content Placeholder 2">
-            <a:extLst>
-              <a:ext uri="{FF2B5EF4-FFF2-40B4-BE49-F238E27FC236}">
-                <a16:creationId xmlns:a16="http://schemas.microsoft.com/office/drawing/2014/main" id="{2B106E46-C4D6-49F9-9B77-5E5E6EFEC57E}"/>
-              </a:ext>
-            </a:extLst>
-          </p:cNvPr>
-          <p:cNvSpPr>
-            <a:spLocks noGrp="1"/>
-          </p:cNvSpPr>
-          <p:nvPr>
-            <p:ph type="subTitle" idx="1"/>
-          </p:nvPr>
-        </p:nvSpPr>
-        <p:spPr>
-          <a:xfrm>
-            <a:off x="1524000" y="3602038"/>
-            <a:ext cx="9144000" cy="424732"/>
-          </a:xfrm>
-        </p:spPr>
-        <p:txBody>
-          <a:bodyPr>
-            <a:spAutoFit/>
-          </a:bodyPr>
-          <a:lstStyle/>
-          <a:p>
-            <a:r>
-              <a:rPr lang="en-US" dirty="0">
-                <a:hlinkClick r:id="rId2"/>
-              </a:rPr>
-              <a:t>github.com/danielwagn3r/</a:t>
-            </a:r>
-            <a:r>
-              <a:rPr lang="en-US" dirty="0" err="1">
-                <a:hlinkClick r:id="rId2"/>
-              </a:rPr>
-              <a:t>apimgmt</a:t>
-            </a:r>
-            <a:r>
-              <a:rPr lang="en-US">
-                <a:hlinkClick r:id="rId2"/>
-              </a:rPr>
-              <a:t>-workshop</a:t>
-            </a:r>
-            <a:endParaRPr lang="en-US" dirty="0"/>
-          </a:p>
-        </p:txBody>
-      </p:sp>
-      <p:pic>
-        <p:nvPicPr>
-          <p:cNvPr id="8" name="Picture 7">
-            <a:extLst>
-              <a:ext uri="{FF2B5EF4-FFF2-40B4-BE49-F238E27FC236}">
-                <a16:creationId xmlns:a16="http://schemas.microsoft.com/office/drawing/2014/main" id="{A6966702-4737-41A1-A211-D462668C4834}"/>
-              </a:ext>
-            </a:extLst>
-          </p:cNvPr>
-          <p:cNvPicPr>
-            <a:picLocks noChangeAspect="1"/>
-          </p:cNvPicPr>
-          <p:nvPr/>
-        </p:nvPicPr>
-        <p:blipFill>
-          <a:blip r:embed="rId3">
-            <a:extLst>
-              <a:ext uri="{28A0092B-C50C-407E-A947-70E740481C1C}">
-                <a14:useLocalDpi xmlns:a14="http://schemas.microsoft.com/office/drawing/2010/main" val="0"/>
-              </a:ext>
-            </a:extLst>
-          </a:blip>
-          <a:stretch>
-            <a:fillRect/>
-          </a:stretch>
-        </p:blipFill>
-        <p:spPr>
-          <a:xfrm>
-            <a:off x="2497810" y="3509604"/>
-            <a:ext cx="609600" cy="609600"/>
-          </a:xfrm>
-          <a:prstGeom prst="rect">
-            <a:avLst/>
-          </a:prstGeom>
-        </p:spPr>
-      </p:pic>
-    </p:spTree>
-    <p:extLst>
-      <p:ext uri="{BB962C8B-B14F-4D97-AF65-F5344CB8AC3E}">
-        <p14:creationId xmlns:p14="http://schemas.microsoft.com/office/powerpoint/2010/main" val="2985596720"/>
-      </p:ext>
-    </p:extLst>
-  </p:cSld>
-  <p:clrMapOvr>
-    <a:masterClrMapping/>
-  </p:clrMapOvr>
-</p:sld>
-</file>
-
-<file path=ppt/slides/slide17.xml><?xml version="1.0" encoding="utf-8"?>
-<p:sld xmlns:a="http://schemas.openxmlformats.org/drawingml/2006/main" xmlns:r="http://schemas.openxmlformats.org/officeDocument/2006/relationships" xmlns:p="http://schemas.openxmlformats.org/presentationml/2006/main">
-  <p:cSld>
-    <p:spTree>
-      <p:nvGrpSpPr>
-        <p:cNvPr id="1" name=""/>
-        <p:cNvGrpSpPr/>
-        <p:nvPr/>
-      </p:nvGrpSpPr>
-      <p:grpSpPr>
-        <a:xfrm>
-          <a:off x="0" y="0"/>
-          <a:ext cx="0" cy="0"/>
-          <a:chOff x="0" y="0"/>
-          <a:chExt cx="0" cy="0"/>
-        </a:xfrm>
-      </p:grpSpPr>
-      <p:sp>
-        <p:nvSpPr>
-          <p:cNvPr id="2" name="Title 1"/>
-          <p:cNvSpPr>
-            <a:spLocks noGrp="1"/>
-          </p:cNvSpPr>
-          <p:nvPr>
-            <p:ph type="title"/>
-          </p:nvPr>
-        </p:nvSpPr>
-        <p:spPr/>
-        <p:txBody>
-          <a:bodyPr/>
-          <a:lstStyle/>
-          <a:p>
-            <a:r>
-              <a:rPr lang="de-AT" dirty="0" smtClean="0"/>
-              <a:t>Database</a:t>
-            </a:r>
-            <a:endParaRPr lang="de-AT" dirty="0"/>
-          </a:p>
-        </p:txBody>
-      </p:sp>
-      <p:pic>
-        <p:nvPicPr>
-          <p:cNvPr id="4" name="Picture 3"/>
-          <p:cNvPicPr>
-            <a:picLocks noChangeAspect="1"/>
-          </p:cNvPicPr>
-          <p:nvPr/>
-        </p:nvPicPr>
-        <p:blipFill>
-          <a:blip r:embed="rId3"/>
-          <a:stretch>
-            <a:fillRect/>
-          </a:stretch>
-        </p:blipFill>
-        <p:spPr>
-          <a:xfrm>
-            <a:off x="2496000" y="1676400"/>
-            <a:ext cx="7200000" cy="3575709"/>
-          </a:xfrm>
-          <a:prstGeom prst="rect">
-            <a:avLst/>
-          </a:prstGeom>
-        </p:spPr>
-      </p:pic>
-      <p:sp>
-        <p:nvSpPr>
-          <p:cNvPr id="5" name="TextBox 1">
-            <a:extLst>
-              <a:ext uri="{FF2B5EF4-FFF2-40B4-BE49-F238E27FC236}">
-                <a16:creationId xmlns:a16="http://schemas.microsoft.com/office/drawing/2014/main" id="{E55A1FC0-8E30-4FAB-B566-BDFED0EBDD27}"/>
-              </a:ext>
-            </a:extLst>
-          </p:cNvPr>
-          <p:cNvSpPr txBox="1"/>
-          <p:nvPr/>
-        </p:nvSpPr>
-        <p:spPr>
-          <a:xfrm>
-            <a:off x="43543" y="6438899"/>
-            <a:ext cx="8068126" cy="369332"/>
-          </a:xfrm>
-          <a:prstGeom prst="rect">
-            <a:avLst/>
-          </a:prstGeom>
-          <a:noFill/>
-        </p:spPr>
-        <p:txBody>
-          <a:bodyPr rot="0" spcFirstLastPara="0" vert="horz" wrap="square" lIns="91440" tIns="45720" rIns="91440" bIns="45720" numCol="1" spcCol="0" rtlCol="0" fromWordArt="0" anchor="t" anchorCtr="0" forceAA="0" compatLnSpc="1">
-            <a:prstTxWarp prst="textNoShape">
-              <a:avLst/>
-            </a:prstTxWarp>
-            <a:spAutoFit/>
-          </a:bodyPr>
-          <a:lstStyle>
-            <a:defPPr>
-              <a:defRPr lang="en-US"/>
-            </a:defPPr>
-            <a:lvl1pPr marL="0" algn="l" defTabSz="914400" rtl="0" eaLnBrk="1" latinLnBrk="0" hangingPunct="1">
-              <a:defRPr sz="1800" kern="1200">
-                <a:solidFill>
-                  <a:schemeClr val="tx1"/>
-                </a:solidFill>
-                <a:latin typeface="+mn-lt"/>
-                <a:ea typeface="+mn-ea"/>
-                <a:cs typeface="+mn-cs"/>
-              </a:defRPr>
-            </a:lvl1pPr>
-            <a:lvl2pPr marL="457200" algn="l" defTabSz="914400" rtl="0" eaLnBrk="1" latinLnBrk="0" hangingPunct="1">
-              <a:defRPr sz="1800" kern="1200">
-                <a:solidFill>
-                  <a:schemeClr val="tx1"/>
-                </a:solidFill>
-                <a:latin typeface="+mn-lt"/>
-                <a:ea typeface="+mn-ea"/>
-                <a:cs typeface="+mn-cs"/>
-              </a:defRPr>
-            </a:lvl2pPr>
-            <a:lvl3pPr marL="914400" algn="l" defTabSz="914400" rtl="0" eaLnBrk="1" latinLnBrk="0" hangingPunct="1">
-              <a:defRPr sz="1800" kern="1200">
-                <a:solidFill>
-                  <a:schemeClr val="tx1"/>
-                </a:solidFill>
-                <a:latin typeface="+mn-lt"/>
-                <a:ea typeface="+mn-ea"/>
-                <a:cs typeface="+mn-cs"/>
-              </a:defRPr>
-            </a:lvl3pPr>
-            <a:lvl4pPr marL="1371600" algn="l" defTabSz="914400" rtl="0" eaLnBrk="1" latinLnBrk="0" hangingPunct="1">
-              <a:defRPr sz="1800" kern="1200">
-                <a:solidFill>
-                  <a:schemeClr val="tx1"/>
-                </a:solidFill>
-                <a:latin typeface="+mn-lt"/>
-                <a:ea typeface="+mn-ea"/>
-                <a:cs typeface="+mn-cs"/>
-              </a:defRPr>
-            </a:lvl4pPr>
-            <a:lvl5pPr marL="1828800" algn="l" defTabSz="914400" rtl="0" eaLnBrk="1" latinLnBrk="0" hangingPunct="1">
-              <a:defRPr sz="1800" kern="1200">
-                <a:solidFill>
-                  <a:schemeClr val="tx1"/>
-                </a:solidFill>
-                <a:latin typeface="+mn-lt"/>
-                <a:ea typeface="+mn-ea"/>
-                <a:cs typeface="+mn-cs"/>
-              </a:defRPr>
-            </a:lvl5pPr>
-            <a:lvl6pPr marL="2286000" algn="l" defTabSz="914400" rtl="0" eaLnBrk="1" latinLnBrk="0" hangingPunct="1">
-              <a:defRPr sz="1800" kern="1200">
-                <a:solidFill>
-                  <a:schemeClr val="tx1"/>
-                </a:solidFill>
-                <a:latin typeface="+mn-lt"/>
-                <a:ea typeface="+mn-ea"/>
-                <a:cs typeface="+mn-cs"/>
-              </a:defRPr>
-            </a:lvl6pPr>
-            <a:lvl7pPr marL="2743200" algn="l" defTabSz="914400" rtl="0" eaLnBrk="1" latinLnBrk="0" hangingPunct="1">
-              <a:defRPr sz="1800" kern="1200">
-                <a:solidFill>
-                  <a:schemeClr val="tx1"/>
-                </a:solidFill>
-                <a:latin typeface="+mn-lt"/>
-                <a:ea typeface="+mn-ea"/>
-                <a:cs typeface="+mn-cs"/>
-              </a:defRPr>
-            </a:lvl7pPr>
-            <a:lvl8pPr marL="3200400" algn="l" defTabSz="914400" rtl="0" eaLnBrk="1" latinLnBrk="0" hangingPunct="1">
-              <a:defRPr sz="1800" kern="1200">
-                <a:solidFill>
-                  <a:schemeClr val="tx1"/>
-                </a:solidFill>
-                <a:latin typeface="+mn-lt"/>
-                <a:ea typeface="+mn-ea"/>
-                <a:cs typeface="+mn-cs"/>
-              </a:defRPr>
-            </a:lvl8pPr>
-            <a:lvl9pPr marL="3657600" algn="l" defTabSz="914400" rtl="0" eaLnBrk="1" latinLnBrk="0" hangingPunct="1">
-              <a:defRPr sz="1800" kern="1200">
-                <a:solidFill>
-                  <a:schemeClr val="tx1"/>
-                </a:solidFill>
-                <a:latin typeface="+mn-lt"/>
-                <a:ea typeface="+mn-ea"/>
-                <a:cs typeface="+mn-cs"/>
-              </a:defRPr>
-            </a:lvl9pPr>
-          </a:lstStyle>
-          <a:p>
-            <a:r>
-              <a:rPr lang="en-US" dirty="0" err="1"/>
-              <a:t>Siehe</a:t>
-            </a:r>
-            <a:r>
-              <a:rPr lang="en-US" dirty="0" smtClean="0"/>
-              <a:t>:</a:t>
-            </a:r>
-            <a:r>
-              <a:rPr lang="en-US" dirty="0"/>
-              <a:t> </a:t>
-            </a:r>
-            <a:r>
-              <a:rPr lang="de-AT" dirty="0">
-                <a:hlinkClick r:id="rId4"/>
-              </a:rPr>
-              <a:t>https://</a:t>
-            </a:r>
-            <a:r>
-              <a:rPr lang="de-AT" dirty="0" smtClean="0">
-                <a:hlinkClick r:id="rId4"/>
-              </a:rPr>
-              <a:t>www.archimatetool.com</a:t>
-            </a:r>
-            <a:endParaRPr lang="en-US" dirty="0"/>
-          </a:p>
-        </p:txBody>
-      </p:sp>
-      <p:pic>
-        <p:nvPicPr>
-          <p:cNvPr id="2050" name="Picture 2" descr="https://www.archimatetool.com/wp-content/uploads/2018/07/header.png"/>
-          <p:cNvPicPr>
-            <a:picLocks noChangeAspect="1" noChangeArrowheads="1"/>
-          </p:cNvPicPr>
-          <p:nvPr/>
-        </p:nvPicPr>
-        <p:blipFill>
-          <a:blip r:embed="rId5">
-            <a:extLst>
-              <a:ext uri="{28A0092B-C50C-407E-A947-70E740481C1C}">
-                <a14:useLocalDpi xmlns:a14="http://schemas.microsoft.com/office/drawing/2010/main" val="0"/>
-              </a:ext>
-            </a:extLst>
-          </a:blip>
-          <a:srcRect/>
-          <a:stretch>
-            <a:fillRect/>
-          </a:stretch>
-        </p:blipFill>
-        <p:spPr bwMode="auto">
-          <a:xfrm>
-            <a:off x="10101942" y="365125"/>
-            <a:ext cx="1631287" cy="598637"/>
-          </a:xfrm>
-          <a:prstGeom prst="rect">
-            <a:avLst/>
-          </a:prstGeom>
-          <a:noFill/>
-          <a:extLst>
-            <a:ext uri="{909E8E84-426E-40DD-AFC4-6F175D3DCCD1}">
-              <a14:hiddenFill xmlns:a14="http://schemas.microsoft.com/office/drawing/2010/main">
-                <a:solidFill>
-                  <a:srgbClr val="FFFFFF"/>
-                </a:solidFill>
-              </a14:hiddenFill>
-            </a:ext>
-          </a:extLst>
-        </p:spPr>
-      </p:pic>
-    </p:spTree>
-    <p:extLst>
-      <p:ext uri="{BB962C8B-B14F-4D97-AF65-F5344CB8AC3E}">
-        <p14:creationId xmlns:p14="http://schemas.microsoft.com/office/powerpoint/2010/main" val="2237333450"/>
-      </p:ext>
-    </p:extLst>
-  </p:cSld>
-  <p:clrMapOvr>
-    <a:masterClrMapping/>
-  </p:clrMapOvr>
-</p:sld>
-</file>
-
-<file path=ppt/slides/slide18.xml><?xml version="1.0" encoding="utf-8"?>
-<p:sld xmlns:a="http://schemas.openxmlformats.org/drawingml/2006/main" xmlns:r="http://schemas.openxmlformats.org/officeDocument/2006/relationships" xmlns:p="http://schemas.openxmlformats.org/presentationml/2006/main">
-  <p:cSld>
-    <p:spTree>
-      <p:nvGrpSpPr>
-        <p:cNvPr id="1" name=""/>
-        <p:cNvGrpSpPr/>
-        <p:nvPr/>
-      </p:nvGrpSpPr>
-      <p:grpSpPr>
-        <a:xfrm>
-          <a:off x="0" y="0"/>
-          <a:ext cx="0" cy="0"/>
-          <a:chOff x="0" y="0"/>
-          <a:chExt cx="0" cy="0"/>
-        </a:xfrm>
-      </p:grpSpPr>
-      <p:sp>
-        <p:nvSpPr>
-          <p:cNvPr id="2" name="Title 1"/>
-          <p:cNvSpPr>
-            <a:spLocks noGrp="1"/>
-          </p:cNvSpPr>
-          <p:nvPr>
-            <p:ph type="title"/>
-          </p:nvPr>
-        </p:nvSpPr>
-        <p:spPr/>
-        <p:txBody>
-          <a:bodyPr/>
-          <a:lstStyle/>
-          <a:p>
-            <a:r>
-              <a:rPr lang="de-AT" dirty="0" smtClean="0"/>
-              <a:t>DB-</a:t>
-            </a:r>
-            <a:r>
-              <a:rPr lang="de-AT" dirty="0" err="1" smtClean="0"/>
-              <a:t>less</a:t>
-            </a:r>
-            <a:endParaRPr lang="de-AT" dirty="0"/>
-          </a:p>
-        </p:txBody>
-      </p:sp>
-      <p:pic>
-        <p:nvPicPr>
-          <p:cNvPr id="4" name="Content Placeholder 3"/>
-          <p:cNvPicPr>
-            <a:picLocks noGrp="1" noChangeAspect="1"/>
-          </p:cNvPicPr>
-          <p:nvPr>
-            <p:ph idx="1"/>
-          </p:nvPr>
-        </p:nvPicPr>
-        <p:blipFill>
-          <a:blip r:embed="rId3"/>
-          <a:stretch>
-            <a:fillRect/>
-          </a:stretch>
-        </p:blipFill>
-        <p:spPr>
-          <a:xfrm>
-            <a:off x="2496000" y="2020389"/>
-            <a:ext cx="7200000" cy="3744551"/>
-          </a:xfrm>
-          <a:prstGeom prst="rect">
-            <a:avLst/>
-          </a:prstGeom>
-        </p:spPr>
-      </p:pic>
-      <p:pic>
-        <p:nvPicPr>
-          <p:cNvPr id="5" name="Picture 2" descr="https://www.archimatetool.com/wp-content/uploads/2018/07/header.png"/>
-          <p:cNvPicPr>
-            <a:picLocks noChangeAspect="1" noChangeArrowheads="1"/>
-          </p:cNvPicPr>
-          <p:nvPr/>
-        </p:nvPicPr>
-        <p:blipFill>
-          <a:blip r:embed="rId4">
-            <a:extLst>
-              <a:ext uri="{28A0092B-C50C-407E-A947-70E740481C1C}">
-                <a14:useLocalDpi xmlns:a14="http://schemas.microsoft.com/office/drawing/2010/main" val="0"/>
-              </a:ext>
-            </a:extLst>
-          </a:blip>
-          <a:srcRect/>
-          <a:stretch>
-            <a:fillRect/>
-          </a:stretch>
-        </p:blipFill>
-        <p:spPr bwMode="auto">
-          <a:xfrm>
-            <a:off x="10101942" y="365125"/>
-            <a:ext cx="1631287" cy="598637"/>
-          </a:xfrm>
-          <a:prstGeom prst="rect">
-            <a:avLst/>
-          </a:prstGeom>
-          <a:noFill/>
-          <a:extLst>
-            <a:ext uri="{909E8E84-426E-40DD-AFC4-6F175D3DCCD1}">
-              <a14:hiddenFill xmlns:a14="http://schemas.microsoft.com/office/drawing/2010/main">
-                <a:solidFill>
-                  <a:srgbClr val="FFFFFF"/>
-                </a:solidFill>
-              </a14:hiddenFill>
-            </a:ext>
-          </a:extLst>
-        </p:spPr>
-      </p:pic>
-      <p:sp>
-        <p:nvSpPr>
-          <p:cNvPr id="6" name="TextBox 1">
-            <a:extLst>
-              <a:ext uri="{FF2B5EF4-FFF2-40B4-BE49-F238E27FC236}">
-                <a16:creationId xmlns:a16="http://schemas.microsoft.com/office/drawing/2014/main" id="{E55A1FC0-8E30-4FAB-B566-BDFED0EBDD27}"/>
-              </a:ext>
-            </a:extLst>
-          </p:cNvPr>
-          <p:cNvSpPr txBox="1"/>
-          <p:nvPr/>
-        </p:nvSpPr>
-        <p:spPr>
-          <a:xfrm>
-            <a:off x="43543" y="6438899"/>
-            <a:ext cx="8068126" cy="369332"/>
-          </a:xfrm>
-          <a:prstGeom prst="rect">
-            <a:avLst/>
-          </a:prstGeom>
-          <a:noFill/>
-        </p:spPr>
-        <p:txBody>
-          <a:bodyPr rot="0" spcFirstLastPara="0" vert="horz" wrap="square" lIns="91440" tIns="45720" rIns="91440" bIns="45720" numCol="1" spcCol="0" rtlCol="0" fromWordArt="0" anchor="t" anchorCtr="0" forceAA="0" compatLnSpc="1">
-            <a:prstTxWarp prst="textNoShape">
-              <a:avLst/>
-            </a:prstTxWarp>
-            <a:spAutoFit/>
-          </a:bodyPr>
-          <a:lstStyle>
-            <a:defPPr>
-              <a:defRPr lang="en-US"/>
-            </a:defPPr>
-            <a:lvl1pPr marL="0" algn="l" defTabSz="914400" rtl="0" eaLnBrk="1" latinLnBrk="0" hangingPunct="1">
-              <a:defRPr sz="1800" kern="1200">
-                <a:solidFill>
-                  <a:schemeClr val="tx1"/>
-                </a:solidFill>
-                <a:latin typeface="+mn-lt"/>
-                <a:ea typeface="+mn-ea"/>
-                <a:cs typeface="+mn-cs"/>
-              </a:defRPr>
-            </a:lvl1pPr>
-            <a:lvl2pPr marL="457200" algn="l" defTabSz="914400" rtl="0" eaLnBrk="1" latinLnBrk="0" hangingPunct="1">
-              <a:defRPr sz="1800" kern="1200">
-                <a:solidFill>
-                  <a:schemeClr val="tx1"/>
-                </a:solidFill>
-                <a:latin typeface="+mn-lt"/>
-                <a:ea typeface="+mn-ea"/>
-                <a:cs typeface="+mn-cs"/>
-              </a:defRPr>
-            </a:lvl2pPr>
-            <a:lvl3pPr marL="914400" algn="l" defTabSz="914400" rtl="0" eaLnBrk="1" latinLnBrk="0" hangingPunct="1">
-              <a:defRPr sz="1800" kern="1200">
-                <a:solidFill>
-                  <a:schemeClr val="tx1"/>
-                </a:solidFill>
-                <a:latin typeface="+mn-lt"/>
-                <a:ea typeface="+mn-ea"/>
-                <a:cs typeface="+mn-cs"/>
-              </a:defRPr>
-            </a:lvl3pPr>
-            <a:lvl4pPr marL="1371600" algn="l" defTabSz="914400" rtl="0" eaLnBrk="1" latinLnBrk="0" hangingPunct="1">
-              <a:defRPr sz="1800" kern="1200">
-                <a:solidFill>
-                  <a:schemeClr val="tx1"/>
-                </a:solidFill>
-                <a:latin typeface="+mn-lt"/>
-                <a:ea typeface="+mn-ea"/>
-                <a:cs typeface="+mn-cs"/>
-              </a:defRPr>
-            </a:lvl4pPr>
-            <a:lvl5pPr marL="1828800" algn="l" defTabSz="914400" rtl="0" eaLnBrk="1" latinLnBrk="0" hangingPunct="1">
-              <a:defRPr sz="1800" kern="1200">
-                <a:solidFill>
-                  <a:schemeClr val="tx1"/>
-                </a:solidFill>
-                <a:latin typeface="+mn-lt"/>
-                <a:ea typeface="+mn-ea"/>
-                <a:cs typeface="+mn-cs"/>
-              </a:defRPr>
-            </a:lvl5pPr>
-            <a:lvl6pPr marL="2286000" algn="l" defTabSz="914400" rtl="0" eaLnBrk="1" latinLnBrk="0" hangingPunct="1">
-              <a:defRPr sz="1800" kern="1200">
-                <a:solidFill>
-                  <a:schemeClr val="tx1"/>
-                </a:solidFill>
-                <a:latin typeface="+mn-lt"/>
-                <a:ea typeface="+mn-ea"/>
-                <a:cs typeface="+mn-cs"/>
-              </a:defRPr>
-            </a:lvl6pPr>
-            <a:lvl7pPr marL="2743200" algn="l" defTabSz="914400" rtl="0" eaLnBrk="1" latinLnBrk="0" hangingPunct="1">
-              <a:defRPr sz="1800" kern="1200">
-                <a:solidFill>
-                  <a:schemeClr val="tx1"/>
-                </a:solidFill>
-                <a:latin typeface="+mn-lt"/>
-                <a:ea typeface="+mn-ea"/>
-                <a:cs typeface="+mn-cs"/>
-              </a:defRPr>
-            </a:lvl7pPr>
-            <a:lvl8pPr marL="3200400" algn="l" defTabSz="914400" rtl="0" eaLnBrk="1" latinLnBrk="0" hangingPunct="1">
-              <a:defRPr sz="1800" kern="1200">
-                <a:solidFill>
-                  <a:schemeClr val="tx1"/>
-                </a:solidFill>
-                <a:latin typeface="+mn-lt"/>
-                <a:ea typeface="+mn-ea"/>
-                <a:cs typeface="+mn-cs"/>
-              </a:defRPr>
-            </a:lvl8pPr>
-            <a:lvl9pPr marL="3657600" algn="l" defTabSz="914400" rtl="0" eaLnBrk="1" latinLnBrk="0" hangingPunct="1">
-              <a:defRPr sz="1800" kern="1200">
-                <a:solidFill>
-                  <a:schemeClr val="tx1"/>
-                </a:solidFill>
-                <a:latin typeface="+mn-lt"/>
-                <a:ea typeface="+mn-ea"/>
-                <a:cs typeface="+mn-cs"/>
-              </a:defRPr>
-            </a:lvl9pPr>
-          </a:lstStyle>
-          <a:p>
-            <a:r>
-              <a:rPr lang="en-US" dirty="0" smtClean="0"/>
-              <a:t>See: </a:t>
-            </a:r>
-            <a:r>
-              <a:rPr lang="de-AT" dirty="0">
-                <a:hlinkClick r:id="rId5"/>
-              </a:rPr>
-              <a:t>https://docs.konghq.com/1.4.x/db-less-and-declarative-config/</a:t>
-            </a:r>
-            <a:endParaRPr lang="en-US" dirty="0"/>
-          </a:p>
-        </p:txBody>
-      </p:sp>
-    </p:spTree>
-    <p:extLst>
-      <p:ext uri="{BB962C8B-B14F-4D97-AF65-F5344CB8AC3E}">
-        <p14:creationId xmlns:p14="http://schemas.microsoft.com/office/powerpoint/2010/main" val="1120640164"/>
-      </p:ext>
-    </p:extLst>
-  </p:cSld>
-  <p:clrMapOvr>
-    <a:masterClrMapping/>
-  </p:clrMapOvr>
-  <p:timing>
-    <p:tnLst>
-      <p:par>
-        <p:cTn id="1" dur="indefinite" restart="never" nodeType="tmRoot"/>
-      </p:par>
-    </p:tnLst>
-  </p:timing>
-</p:sld>
-</file>
-
 <file path=ppt/slides/slide19.xml><?xml version="1.0" encoding="utf-8"?>
 <p:sld xmlns:a="http://schemas.openxmlformats.org/drawingml/2006/main" xmlns:r="http://schemas.openxmlformats.org/officeDocument/2006/relationships" xmlns:p="http://schemas.openxmlformats.org/presentationml/2006/main">
   <p:cSld>
@@ -11017,7 +11021,9 @@
         </p:nvSpPr>
         <p:spPr/>
         <p:txBody>
-          <a:bodyPr/>
+          <a:bodyPr>
+            <a:normAutofit lnSpcReduction="10000"/>
+          </a:bodyPr>
           <a:lstStyle/>
           <a:p>
             <a:pPr marL="0" indent="0">
@@ -11127,6 +11133,22 @@
             <a:r>
               <a:rPr lang="de-AT" dirty="0" smtClean="0"/>
               <a:t>OAuth2</a:t>
+            </a:r>
+          </a:p>
+          <a:p>
+            <a:pPr>
+              <a:buFontTx/>
+              <a:buChar char="-"/>
+            </a:pPr>
+            <a:endParaRPr lang="de-AT" dirty="0"/>
+          </a:p>
+          <a:p>
+            <a:pPr marL="0" indent="0">
+              <a:buNone/>
+            </a:pPr>
+            <a:r>
+              <a:rPr lang="de-AT" dirty="0" smtClean="0"/>
+              <a:t>Groups</a:t>
             </a:r>
             <a:endParaRPr lang="de-AT" dirty="0"/>
           </a:p>
@@ -11144,7 +11166,9 @@
         </p:nvSpPr>
         <p:spPr/>
         <p:txBody>
-          <a:bodyPr/>
+          <a:bodyPr>
+            <a:normAutofit lnSpcReduction="10000"/>
+          </a:bodyPr>
           <a:lstStyle/>
           <a:p>
             <a:pPr marL="0" indent="0">
@@ -11489,54 +11513,63 @@
           <a:p>
             <a:r>
               <a:rPr lang="de-AT" dirty="0" err="1" smtClean="0"/>
-              <a:t>Upstreams</a:t>
+              <a:t>Healthchecks</a:t>
+            </a:r>
+            <a:r>
+              <a:rPr lang="de-AT" dirty="0" smtClean="0"/>
+              <a:t> Basics</a:t>
             </a:r>
             <a:endParaRPr lang="de-AT" dirty="0"/>
           </a:p>
         </p:txBody>
       </p:sp>
-      <p:sp>
-        <p:nvSpPr>
-          <p:cNvPr id="4" name="Content Placeholder 3"/>
-          <p:cNvSpPr>
-            <a:spLocks noGrp="1"/>
-          </p:cNvSpPr>
+      <p:pic>
+        <p:nvPicPr>
+          <p:cNvPr id="1026" name="Picture 2" descr="https://2tjosk2rxzc21medji3nfn1g-wpengine.netdna-ssl.com/wp-content/uploads/2018/03/diagram-001.jpg"/>
+          <p:cNvPicPr>
+            <a:picLocks noGrp="1" noChangeAspect="1" noChangeArrowheads="1"/>
+          </p:cNvPicPr>
           <p:nvPr>
-            <p:ph sz="half" idx="1"/>
+            <p:ph idx="1"/>
           </p:nvPr>
-        </p:nvSpPr>
-        <p:spPr/>
-        <p:txBody>
-          <a:bodyPr/>
-          <a:lstStyle/>
-          <a:p>
-            <a:endParaRPr lang="de-AT"/>
-          </a:p>
-        </p:txBody>
-      </p:sp>
-      <p:sp>
-        <p:nvSpPr>
-          <p:cNvPr id="5" name="Content Placeholder 4"/>
-          <p:cNvSpPr>
-            <a:spLocks noGrp="1"/>
-          </p:cNvSpPr>
-          <p:nvPr>
-            <p:ph sz="half" idx="2"/>
-          </p:nvPr>
-        </p:nvSpPr>
-        <p:spPr/>
-        <p:txBody>
-          <a:bodyPr/>
-          <a:lstStyle/>
-          <a:p>
-            <a:endParaRPr lang="de-AT"/>
-          </a:p>
-        </p:txBody>
-      </p:sp>
+        </p:nvPicPr>
+        <p:blipFill>
+          <a:blip r:embed="rId2">
+            <a:extLst>
+              <a:ext uri="{28A0092B-C50C-407E-A947-70E740481C1C}">
+                <a14:useLocalDpi xmlns:a14="http://schemas.microsoft.com/office/drawing/2010/main" val="0"/>
+              </a:ext>
+            </a:extLst>
+          </a:blip>
+          <a:srcRect/>
+          <a:stretch>
+            <a:fillRect/>
+          </a:stretch>
+        </p:blipFill>
+        <p:spPr bwMode="auto">
+          <a:xfrm>
+            <a:off x="838200" y="2044576"/>
+            <a:ext cx="10515600" cy="3913436"/>
+          </a:xfrm>
+          <a:prstGeom prst="rect">
+            <a:avLst/>
+          </a:prstGeom>
+          <a:noFill/>
+          <a:extLst>
+            <a:ext uri="{909E8E84-426E-40DD-AFC4-6F175D3DCCD1}">
+              <a14:hiddenFill xmlns:a14="http://schemas.microsoft.com/office/drawing/2010/main">
+                <a:solidFill>
+                  <a:srgbClr val="FFFFFF"/>
+                </a:solidFill>
+              </a14:hiddenFill>
+            </a:ext>
+          </a:extLst>
+        </p:spPr>
+      </p:pic>
     </p:spTree>
     <p:extLst>
       <p:ext uri="{BB962C8B-B14F-4D97-AF65-F5344CB8AC3E}">
-        <p14:creationId xmlns:p14="http://schemas.microsoft.com/office/powerpoint/2010/main" val="3387577602"/>
+        <p14:creationId xmlns:p14="http://schemas.microsoft.com/office/powerpoint/2010/main" val="4003436163"/>
       </p:ext>
     </p:extLst>
   </p:cSld>
@@ -11579,55 +11612,55 @@
           <a:lstStyle/>
           <a:p>
             <a:r>
+              <a:rPr lang="de-AT" dirty="0" err="1" smtClean="0"/>
+              <a:t>Active</a:t>
+            </a:r>
+            <a:r>
               <a:rPr lang="de-AT" dirty="0" smtClean="0"/>
-              <a:t>Targets</a:t>
+              <a:t> </a:t>
+            </a:r>
+            <a:r>
+              <a:rPr lang="de-AT" dirty="0" err="1" smtClean="0"/>
+              <a:t>Health</a:t>
+            </a:r>
+            <a:r>
+              <a:rPr lang="de-AT" dirty="0" smtClean="0"/>
+              <a:t> Check</a:t>
             </a:r>
             <a:endParaRPr lang="de-AT" dirty="0"/>
           </a:p>
         </p:txBody>
       </p:sp>
-      <p:sp>
-        <p:nvSpPr>
-          <p:cNvPr id="4" name="Content Placeholder 3"/>
-          <p:cNvSpPr>
-            <a:spLocks noGrp="1"/>
-          </p:cNvSpPr>
+      <p:pic>
+        <p:nvPicPr>
+          <p:cNvPr id="5" name="Content Placeholder 4"/>
+          <p:cNvPicPr>
+            <a:picLocks noGrp="1" noChangeAspect="1"/>
+          </p:cNvPicPr>
           <p:nvPr>
-            <p:ph sz="half" idx="1"/>
+            <p:ph idx="1"/>
           </p:nvPr>
-        </p:nvSpPr>
-        <p:spPr/>
-        <p:txBody>
-          <a:bodyPr/>
-          <a:lstStyle/>
-          <a:p>
-            <a:endParaRPr lang="de-AT" dirty="0"/>
-          </a:p>
-        </p:txBody>
-      </p:sp>
-      <p:sp>
-        <p:nvSpPr>
-          <p:cNvPr id="5" name="Content Placeholder 4"/>
-          <p:cNvSpPr>
-            <a:spLocks noGrp="1"/>
-          </p:cNvSpPr>
-          <p:nvPr>
-            <p:ph sz="half" idx="2"/>
-          </p:nvPr>
-        </p:nvSpPr>
-        <p:spPr/>
-        <p:txBody>
-          <a:bodyPr/>
-          <a:lstStyle/>
-          <a:p>
-            <a:endParaRPr lang="de-AT"/>
-          </a:p>
-        </p:txBody>
-      </p:sp>
+        </p:nvPicPr>
+        <p:blipFill>
+          <a:blip r:embed="rId2"/>
+          <a:stretch>
+            <a:fillRect/>
+          </a:stretch>
+        </p:blipFill>
+        <p:spPr>
+          <a:xfrm>
+            <a:off x="838200" y="2044576"/>
+            <a:ext cx="10515600" cy="3913436"/>
+          </a:xfrm>
+          <a:prstGeom prst="rect">
+            <a:avLst/>
+          </a:prstGeom>
+        </p:spPr>
+      </p:pic>
     </p:spTree>
     <p:extLst>
       <p:ext uri="{BB962C8B-B14F-4D97-AF65-F5344CB8AC3E}">
-        <p14:creationId xmlns:p14="http://schemas.microsoft.com/office/powerpoint/2010/main" val="4258409465"/>
+        <p14:creationId xmlns:p14="http://schemas.microsoft.com/office/powerpoint/2010/main" val="2318157801"/>
       </p:ext>
     </p:extLst>
   </p:cSld>
@@ -11670,883 +11703,51 @@
           <a:lstStyle/>
           <a:p>
             <a:r>
+              <a:rPr lang="de-AT" dirty="0" smtClean="0"/>
+              <a:t>Circuit </a:t>
+            </a:r>
+            <a:r>
               <a:rPr lang="de-AT" dirty="0" err="1" smtClean="0"/>
-              <a:t>Plugins</a:t>
+              <a:t>Breaker</a:t>
+            </a:r>
+            <a:r>
+              <a:rPr lang="de-AT" dirty="0" smtClean="0"/>
+              <a:t> (1)</a:t>
             </a:r>
             <a:endParaRPr lang="de-AT" dirty="0"/>
           </a:p>
         </p:txBody>
       </p:sp>
-      <p:sp>
-        <p:nvSpPr>
-          <p:cNvPr id="4" name="Content Placeholder 3"/>
-          <p:cNvSpPr>
-            <a:spLocks noGrp="1"/>
-          </p:cNvSpPr>
+      <p:pic>
+        <p:nvPicPr>
+          <p:cNvPr id="8" name="Content Placeholder 7"/>
+          <p:cNvPicPr>
+            <a:picLocks noGrp="1" noChangeAspect="1"/>
+          </p:cNvPicPr>
           <p:nvPr>
-            <p:ph sz="half" idx="1"/>
+            <p:ph idx="1"/>
           </p:nvPr>
-        </p:nvSpPr>
+        </p:nvPicPr>
+        <p:blipFill>
+          <a:blip r:embed="rId2"/>
+          <a:stretch>
+            <a:fillRect/>
+          </a:stretch>
+        </p:blipFill>
         <p:spPr>
           <a:xfrm>
-            <a:off x="838200" y="1825625"/>
-            <a:ext cx="5181600" cy="3319883"/>
+            <a:off x="838200" y="2044576"/>
+            <a:ext cx="10515600" cy="3913436"/>
           </a:xfrm>
+          <a:prstGeom prst="rect">
+            <a:avLst/>
+          </a:prstGeom>
         </p:spPr>
-        <p:txBody>
-          <a:bodyPr>
-            <a:spAutoFit/>
-          </a:bodyPr>
-          <a:lstStyle/>
-          <a:p>
-            <a:pPr marL="0" indent="0">
-              <a:buNone/>
-            </a:pPr>
-            <a:r>
-              <a:rPr lang="de-AT" dirty="0" err="1" smtClean="0"/>
-              <a:t>Plugins</a:t>
-            </a:r>
-            <a:r>
-              <a:rPr lang="de-AT" dirty="0" smtClean="0"/>
-              <a:t> </a:t>
-            </a:r>
-            <a:r>
-              <a:rPr lang="de-AT" dirty="0" err="1" smtClean="0"/>
-              <a:t>are</a:t>
-            </a:r>
-            <a:r>
-              <a:rPr lang="de-AT" dirty="0" smtClean="0"/>
-              <a:t> </a:t>
-            </a:r>
-            <a:r>
-              <a:rPr lang="de-AT" dirty="0" err="1" smtClean="0"/>
-              <a:t>executed</a:t>
-            </a:r>
-            <a:r>
-              <a:rPr lang="de-AT" dirty="0" smtClean="0"/>
-              <a:t> </a:t>
-            </a:r>
-            <a:r>
-              <a:rPr lang="de-AT" dirty="0" err="1" smtClean="0"/>
-              <a:t>during</a:t>
-            </a:r>
-            <a:r>
-              <a:rPr lang="de-AT" dirty="0" smtClean="0"/>
-              <a:t> HTTP </a:t>
-            </a:r>
-            <a:r>
-              <a:rPr lang="de-AT" dirty="0" err="1" smtClean="0"/>
-              <a:t>request</a:t>
-            </a:r>
-            <a:r>
-              <a:rPr lang="de-AT" dirty="0" smtClean="0"/>
-              <a:t>/</a:t>
-            </a:r>
-            <a:r>
-              <a:rPr lang="de-AT" dirty="0" err="1" smtClean="0"/>
-              <a:t>response</a:t>
-            </a:r>
-            <a:r>
-              <a:rPr lang="de-AT" dirty="0" smtClean="0"/>
-              <a:t> </a:t>
-            </a:r>
-            <a:r>
-              <a:rPr lang="de-AT" dirty="0" err="1" smtClean="0"/>
-              <a:t>lifecycle</a:t>
-            </a:r>
-            <a:endParaRPr lang="de-AT" dirty="0" smtClean="0"/>
-          </a:p>
-          <a:p>
-            <a:pPr marL="0" indent="0">
-              <a:buNone/>
-            </a:pPr>
-            <a:endParaRPr lang="de-AT" dirty="0" smtClean="0"/>
-          </a:p>
-          <a:p>
-            <a:pPr marL="0" indent="0">
-              <a:buNone/>
-            </a:pPr>
-            <a:r>
-              <a:rPr lang="de-AT" dirty="0" err="1" smtClean="0"/>
-              <a:t>Plugins</a:t>
-            </a:r>
-            <a:r>
-              <a:rPr lang="de-AT" dirty="0" smtClean="0"/>
-              <a:t> </a:t>
-            </a:r>
-            <a:r>
-              <a:rPr lang="de-AT" dirty="0" err="1" smtClean="0"/>
-              <a:t>are</a:t>
-            </a:r>
-            <a:r>
-              <a:rPr lang="de-AT" dirty="0" smtClean="0"/>
-              <a:t> </a:t>
-            </a:r>
-            <a:r>
-              <a:rPr lang="de-AT" dirty="0" err="1" smtClean="0"/>
-              <a:t>bound</a:t>
-            </a:r>
-            <a:r>
-              <a:rPr lang="de-AT" dirty="0" smtClean="0"/>
-              <a:t> </a:t>
-            </a:r>
-            <a:r>
-              <a:rPr lang="de-AT" dirty="0" err="1" smtClean="0"/>
-              <a:t>to</a:t>
-            </a:r>
-            <a:r>
-              <a:rPr lang="de-AT" dirty="0" smtClean="0"/>
-              <a:t> </a:t>
-            </a:r>
-            <a:r>
-              <a:rPr lang="de-AT" dirty="0" err="1" smtClean="0"/>
-              <a:t>services</a:t>
-            </a:r>
-            <a:r>
-              <a:rPr lang="de-AT" dirty="0" smtClean="0"/>
-              <a:t>, </a:t>
-            </a:r>
-            <a:r>
-              <a:rPr lang="de-AT" dirty="0" err="1" smtClean="0"/>
-              <a:t>routes</a:t>
-            </a:r>
-            <a:r>
-              <a:rPr lang="de-AT" dirty="0" smtClean="0"/>
-              <a:t> </a:t>
-            </a:r>
-            <a:r>
-              <a:rPr lang="de-AT" dirty="0" err="1" smtClean="0"/>
-              <a:t>and</a:t>
-            </a:r>
-            <a:r>
-              <a:rPr lang="de-AT" dirty="0" smtClean="0"/>
-              <a:t>/</a:t>
-            </a:r>
-            <a:r>
-              <a:rPr lang="de-AT" dirty="0" err="1" smtClean="0"/>
-              <a:t>or</a:t>
-            </a:r>
-            <a:r>
-              <a:rPr lang="de-AT" dirty="0" smtClean="0"/>
-              <a:t> </a:t>
-            </a:r>
-            <a:r>
-              <a:rPr lang="de-AT" dirty="0" err="1" smtClean="0"/>
-              <a:t>consumers</a:t>
-            </a:r>
-            <a:endParaRPr lang="de-AT" dirty="0" smtClean="0"/>
-          </a:p>
-          <a:p>
-            <a:pPr marL="0" indent="0">
-              <a:buNone/>
-            </a:pPr>
-            <a:endParaRPr lang="de-AT" dirty="0"/>
-          </a:p>
-          <a:p>
-            <a:pPr marL="0" indent="0">
-              <a:buNone/>
-            </a:pPr>
-            <a:r>
-              <a:rPr lang="de-AT" dirty="0" err="1" smtClean="0"/>
-              <a:t>Plugins</a:t>
-            </a:r>
-            <a:r>
-              <a:rPr lang="de-AT" dirty="0" smtClean="0"/>
-              <a:t> </a:t>
-            </a:r>
-            <a:r>
-              <a:rPr lang="de-AT" dirty="0" err="1" smtClean="0"/>
-              <a:t>are</a:t>
-            </a:r>
-            <a:r>
-              <a:rPr lang="de-AT" dirty="0" smtClean="0"/>
-              <a:t> </a:t>
-            </a:r>
-            <a:r>
-              <a:rPr lang="de-AT" dirty="0" err="1" smtClean="0"/>
-              <a:t>developed</a:t>
-            </a:r>
-            <a:r>
-              <a:rPr lang="de-AT" dirty="0" smtClean="0"/>
-              <a:t> in </a:t>
-            </a:r>
-            <a:r>
-              <a:rPr lang="de-AT" dirty="0" err="1" smtClean="0"/>
-              <a:t>Lua</a:t>
-            </a:r>
-            <a:endParaRPr lang="de-AT" dirty="0" smtClean="0"/>
-          </a:p>
-        </p:txBody>
-      </p:sp>
-      <p:sp>
-        <p:nvSpPr>
-          <p:cNvPr id="5" name="Content Placeholder 4"/>
-          <p:cNvSpPr>
-            <a:spLocks noGrp="1"/>
-          </p:cNvSpPr>
-          <p:nvPr>
-            <p:ph sz="half" idx="2"/>
-          </p:nvPr>
-        </p:nvSpPr>
-        <p:spPr/>
-        <p:txBody>
-          <a:bodyPr>
-            <a:normAutofit fontScale="40000" lnSpcReduction="20000"/>
-          </a:bodyPr>
-          <a:lstStyle/>
-          <a:p>
-            <a:pPr marL="0" indent="0">
-              <a:buNone/>
-            </a:pPr>
-            <a:r>
-              <a:rPr lang="de-AT" dirty="0">
-                <a:solidFill>
-                  <a:srgbClr val="000000"/>
-                </a:solidFill>
-                <a:latin typeface="Fira Code, Consolas,  Courier New"/>
-              </a:rPr>
-              <a:t>{</a:t>
-            </a:r>
-          </a:p>
-          <a:p>
-            <a:pPr marL="0" indent="0">
-              <a:buNone/>
-            </a:pPr>
-            <a:r>
-              <a:rPr lang="de-AT" dirty="0">
-                <a:solidFill>
-                  <a:srgbClr val="000000"/>
-                </a:solidFill>
-                <a:latin typeface="Fira Code, Consolas,  Courier New"/>
-              </a:rPr>
-              <a:t>    </a:t>
-            </a:r>
-            <a:r>
-              <a:rPr lang="de-AT" dirty="0">
-                <a:solidFill>
-                  <a:srgbClr val="0451A5"/>
-                </a:solidFill>
-                <a:latin typeface="Fira Code, Consolas,  Courier New"/>
-              </a:rPr>
-              <a:t>"</a:t>
-            </a:r>
-            <a:r>
-              <a:rPr lang="de-AT" dirty="0" err="1">
-                <a:solidFill>
-                  <a:srgbClr val="0451A5"/>
-                </a:solidFill>
-                <a:latin typeface="Fira Code, Consolas,  Courier New"/>
-              </a:rPr>
-              <a:t>name</a:t>
-            </a:r>
-            <a:r>
-              <a:rPr lang="de-AT" dirty="0">
-                <a:solidFill>
-                  <a:srgbClr val="0451A5"/>
-                </a:solidFill>
-                <a:latin typeface="Fira Code, Consolas,  Courier New"/>
-              </a:rPr>
-              <a:t>"</a:t>
-            </a:r>
-            <a:r>
-              <a:rPr lang="de-AT" dirty="0">
-                <a:solidFill>
-                  <a:srgbClr val="000000"/>
-                </a:solidFill>
-                <a:latin typeface="Fira Code, Consolas,  Courier New"/>
-              </a:rPr>
-              <a:t>: </a:t>
-            </a:r>
-            <a:r>
-              <a:rPr lang="de-AT" dirty="0">
-                <a:solidFill>
-                  <a:srgbClr val="A31515"/>
-                </a:solidFill>
-                <a:latin typeface="Fira Code, Consolas,  Courier New"/>
-              </a:rPr>
-              <a:t>"</a:t>
-            </a:r>
-            <a:r>
-              <a:rPr lang="de-AT" dirty="0" err="1">
-                <a:solidFill>
-                  <a:srgbClr val="A31515"/>
-                </a:solidFill>
-                <a:latin typeface="Fira Code, Consolas,  Courier New"/>
-              </a:rPr>
-              <a:t>ip-restriction</a:t>
-            </a:r>
-            <a:r>
-              <a:rPr lang="de-AT" dirty="0">
-                <a:solidFill>
-                  <a:srgbClr val="A31515"/>
-                </a:solidFill>
-                <a:latin typeface="Fira Code, Consolas,  Courier New"/>
-              </a:rPr>
-              <a:t>"</a:t>
-            </a:r>
-            <a:r>
-              <a:rPr lang="de-AT" dirty="0">
-                <a:solidFill>
-                  <a:srgbClr val="000000"/>
-                </a:solidFill>
-                <a:latin typeface="Fira Code, Consolas,  Courier New"/>
-              </a:rPr>
-              <a:t>,</a:t>
-            </a:r>
-          </a:p>
-          <a:p>
-            <a:pPr marL="0" indent="0">
-              <a:buNone/>
-            </a:pPr>
-            <a:r>
-              <a:rPr lang="de-AT" dirty="0">
-                <a:solidFill>
-                  <a:srgbClr val="000000"/>
-                </a:solidFill>
-                <a:latin typeface="Fira Code, Consolas,  Courier New"/>
-              </a:rPr>
-              <a:t>    </a:t>
-            </a:r>
-            <a:r>
-              <a:rPr lang="de-AT" dirty="0">
-                <a:solidFill>
-                  <a:srgbClr val="0451A5"/>
-                </a:solidFill>
-                <a:latin typeface="Fira Code, Consolas,  Courier New"/>
-              </a:rPr>
-              <a:t>"</a:t>
-            </a:r>
-            <a:r>
-              <a:rPr lang="de-AT" dirty="0" err="1">
-                <a:solidFill>
-                  <a:srgbClr val="0451A5"/>
-                </a:solidFill>
-                <a:latin typeface="Fira Code, Consolas,  Courier New"/>
-              </a:rPr>
-              <a:t>config</a:t>
-            </a:r>
-            <a:r>
-              <a:rPr lang="de-AT" dirty="0">
-                <a:solidFill>
-                  <a:srgbClr val="0451A5"/>
-                </a:solidFill>
-                <a:latin typeface="Fira Code, Consolas,  Courier New"/>
-              </a:rPr>
-              <a:t>"</a:t>
-            </a:r>
-            <a:r>
-              <a:rPr lang="de-AT" dirty="0">
-                <a:solidFill>
-                  <a:srgbClr val="000000"/>
-                </a:solidFill>
-                <a:latin typeface="Fira Code, Consolas,  Courier New"/>
-              </a:rPr>
-              <a:t>: {</a:t>
-            </a:r>
-          </a:p>
-          <a:p>
-            <a:pPr marL="0" indent="0">
-              <a:buNone/>
-            </a:pPr>
-            <a:r>
-              <a:rPr lang="de-AT" dirty="0">
-                <a:solidFill>
-                  <a:srgbClr val="000000"/>
-                </a:solidFill>
-                <a:latin typeface="Fira Code, Consolas,  Courier New"/>
-              </a:rPr>
-              <a:t>        </a:t>
-            </a:r>
-            <a:r>
-              <a:rPr lang="de-AT" dirty="0">
-                <a:solidFill>
-                  <a:srgbClr val="0451A5"/>
-                </a:solidFill>
-                <a:latin typeface="Fira Code, Consolas,  Courier New"/>
-              </a:rPr>
-              <a:t>"</a:t>
-            </a:r>
-            <a:r>
-              <a:rPr lang="de-AT" dirty="0" err="1">
-                <a:solidFill>
-                  <a:srgbClr val="0451A5"/>
-                </a:solidFill>
-                <a:latin typeface="Fira Code, Consolas,  Courier New"/>
-              </a:rPr>
-              <a:t>whitelist</a:t>
-            </a:r>
-            <a:r>
-              <a:rPr lang="de-AT" dirty="0">
-                <a:solidFill>
-                  <a:srgbClr val="0451A5"/>
-                </a:solidFill>
-                <a:latin typeface="Fira Code, Consolas,  Courier New"/>
-              </a:rPr>
-              <a:t>"</a:t>
-            </a:r>
-            <a:r>
-              <a:rPr lang="de-AT" dirty="0">
-                <a:solidFill>
-                  <a:srgbClr val="000000"/>
-                </a:solidFill>
-                <a:latin typeface="Fira Code, Consolas,  Courier New"/>
-              </a:rPr>
-              <a:t>: [</a:t>
-            </a:r>
-          </a:p>
-          <a:p>
-            <a:pPr marL="0" indent="0">
-              <a:buNone/>
-            </a:pPr>
-            <a:r>
-              <a:rPr lang="de-AT" dirty="0">
-                <a:solidFill>
-                  <a:srgbClr val="000000"/>
-                </a:solidFill>
-                <a:latin typeface="Fira Code, Consolas,  Courier New"/>
-              </a:rPr>
-              <a:t>            </a:t>
-            </a:r>
-            <a:r>
-              <a:rPr lang="de-AT" dirty="0">
-                <a:solidFill>
-                  <a:srgbClr val="A31515"/>
-                </a:solidFill>
-                <a:latin typeface="Fira Code, Consolas,  Courier New"/>
-              </a:rPr>
-              <a:t>"172.18.0.0/16"</a:t>
-            </a:r>
-            <a:endParaRPr lang="de-AT" dirty="0">
-              <a:solidFill>
-                <a:srgbClr val="000000"/>
-              </a:solidFill>
-              <a:latin typeface="Fira Code, Consolas,  Courier New"/>
-            </a:endParaRPr>
-          </a:p>
-          <a:p>
-            <a:pPr marL="0" indent="0">
-              <a:buNone/>
-            </a:pPr>
-            <a:r>
-              <a:rPr lang="de-AT" dirty="0">
-                <a:solidFill>
-                  <a:srgbClr val="000000"/>
-                </a:solidFill>
-                <a:latin typeface="Fira Code, Consolas,  Courier New"/>
-              </a:rPr>
-              <a:t>        ]</a:t>
-            </a:r>
-          </a:p>
-          <a:p>
-            <a:pPr marL="0" indent="0">
-              <a:buNone/>
-            </a:pPr>
-            <a:r>
-              <a:rPr lang="de-AT" dirty="0">
-                <a:solidFill>
-                  <a:srgbClr val="000000"/>
-                </a:solidFill>
-                <a:latin typeface="Fira Code, Consolas,  Courier New"/>
-              </a:rPr>
-              <a:t>    },</a:t>
-            </a:r>
-          </a:p>
-          <a:p>
-            <a:pPr marL="0" indent="0">
-              <a:buNone/>
-            </a:pPr>
-            <a:r>
-              <a:rPr lang="de-AT" dirty="0">
-                <a:solidFill>
-                  <a:srgbClr val="000000"/>
-                </a:solidFill>
-                <a:latin typeface="Fira Code, Consolas,  Courier New"/>
-              </a:rPr>
-              <a:t>    </a:t>
-            </a:r>
-            <a:r>
-              <a:rPr lang="de-AT" dirty="0">
-                <a:solidFill>
-                  <a:srgbClr val="0451A5"/>
-                </a:solidFill>
-                <a:latin typeface="Fira Code, Consolas,  Courier New"/>
-              </a:rPr>
-              <a:t>"</a:t>
-            </a:r>
-            <a:r>
-              <a:rPr lang="de-AT" dirty="0" err="1">
-                <a:solidFill>
-                  <a:srgbClr val="0451A5"/>
-                </a:solidFill>
-                <a:latin typeface="Fira Code, Consolas,  Courier New"/>
-              </a:rPr>
-              <a:t>consumer</a:t>
-            </a:r>
-            <a:r>
-              <a:rPr lang="de-AT" dirty="0">
-                <a:solidFill>
-                  <a:srgbClr val="0451A5"/>
-                </a:solidFill>
-                <a:latin typeface="Fira Code, Consolas,  Courier New"/>
-              </a:rPr>
-              <a:t>"</a:t>
-            </a:r>
-            <a:r>
-              <a:rPr lang="de-AT" dirty="0">
-                <a:solidFill>
-                  <a:srgbClr val="000000"/>
-                </a:solidFill>
-                <a:latin typeface="Fira Code, Consolas,  Courier New"/>
-              </a:rPr>
-              <a:t>: </a:t>
-            </a:r>
-            <a:r>
-              <a:rPr lang="de-AT" dirty="0">
-                <a:solidFill>
-                  <a:srgbClr val="0000FF"/>
-                </a:solidFill>
-                <a:latin typeface="Fira Code, Consolas,  Courier New"/>
-              </a:rPr>
-              <a:t>null</a:t>
-            </a:r>
-            <a:r>
-              <a:rPr lang="de-AT" dirty="0">
-                <a:solidFill>
-                  <a:srgbClr val="000000"/>
-                </a:solidFill>
-                <a:latin typeface="Fira Code, Consolas,  Courier New"/>
-              </a:rPr>
-              <a:t>,</a:t>
-            </a:r>
-          </a:p>
-          <a:p>
-            <a:pPr marL="0" indent="0">
-              <a:buNone/>
-            </a:pPr>
-            <a:r>
-              <a:rPr lang="de-AT" dirty="0">
-                <a:solidFill>
-                  <a:srgbClr val="000000"/>
-                </a:solidFill>
-                <a:latin typeface="Fira Code, Consolas,  Courier New"/>
-              </a:rPr>
-              <a:t>    </a:t>
-            </a:r>
-            <a:r>
-              <a:rPr lang="de-AT" dirty="0">
-                <a:solidFill>
-                  <a:srgbClr val="0451A5"/>
-                </a:solidFill>
-                <a:latin typeface="Fira Code, Consolas,  Courier New"/>
-              </a:rPr>
-              <a:t>"</a:t>
-            </a:r>
-            <a:r>
-              <a:rPr lang="de-AT" dirty="0" err="1">
-                <a:solidFill>
-                  <a:srgbClr val="0451A5"/>
-                </a:solidFill>
-                <a:latin typeface="Fira Code, Consolas,  Courier New"/>
-              </a:rPr>
-              <a:t>protocols</a:t>
-            </a:r>
-            <a:r>
-              <a:rPr lang="de-AT" dirty="0">
-                <a:solidFill>
-                  <a:srgbClr val="0451A5"/>
-                </a:solidFill>
-                <a:latin typeface="Fira Code, Consolas,  Courier New"/>
-              </a:rPr>
-              <a:t>"</a:t>
-            </a:r>
-            <a:r>
-              <a:rPr lang="de-AT" dirty="0">
-                <a:solidFill>
-                  <a:srgbClr val="000000"/>
-                </a:solidFill>
-                <a:latin typeface="Fira Code, Consolas,  Courier New"/>
-              </a:rPr>
-              <a:t>: [</a:t>
-            </a:r>
-          </a:p>
-          <a:p>
-            <a:pPr marL="0" indent="0">
-              <a:buNone/>
-            </a:pPr>
-            <a:r>
-              <a:rPr lang="de-AT" dirty="0">
-                <a:solidFill>
-                  <a:srgbClr val="000000"/>
-                </a:solidFill>
-                <a:latin typeface="Fira Code, Consolas,  Courier New"/>
-              </a:rPr>
-              <a:t>        </a:t>
-            </a:r>
-            <a:r>
-              <a:rPr lang="de-AT" dirty="0">
-                <a:solidFill>
-                  <a:srgbClr val="A31515"/>
-                </a:solidFill>
-                <a:latin typeface="Fira Code, Consolas,  Courier New"/>
-              </a:rPr>
-              <a:t>"http"</a:t>
-            </a:r>
-            <a:r>
-              <a:rPr lang="de-AT" dirty="0">
-                <a:solidFill>
-                  <a:srgbClr val="000000"/>
-                </a:solidFill>
-                <a:latin typeface="Fira Code, Consolas,  Courier New"/>
-              </a:rPr>
-              <a:t>,</a:t>
-            </a:r>
-          </a:p>
-          <a:p>
-            <a:pPr marL="0" indent="0">
-              <a:buNone/>
-            </a:pPr>
-            <a:r>
-              <a:rPr lang="de-AT" dirty="0">
-                <a:solidFill>
-                  <a:srgbClr val="000000"/>
-                </a:solidFill>
-                <a:latin typeface="Fira Code, Consolas,  Courier New"/>
-              </a:rPr>
-              <a:t>        </a:t>
-            </a:r>
-            <a:r>
-              <a:rPr lang="de-AT" dirty="0">
-                <a:solidFill>
-                  <a:srgbClr val="A31515"/>
-                </a:solidFill>
-                <a:latin typeface="Fira Code, Consolas,  Courier New"/>
-              </a:rPr>
-              <a:t>"https"</a:t>
-            </a:r>
-            <a:endParaRPr lang="de-AT" dirty="0">
-              <a:solidFill>
-                <a:srgbClr val="000000"/>
-              </a:solidFill>
-              <a:latin typeface="Fira Code, Consolas,  Courier New"/>
-            </a:endParaRPr>
-          </a:p>
-          <a:p>
-            <a:pPr marL="0" indent="0">
-              <a:buNone/>
-            </a:pPr>
-            <a:r>
-              <a:rPr lang="de-AT" dirty="0">
-                <a:solidFill>
-                  <a:srgbClr val="000000"/>
-                </a:solidFill>
-                <a:latin typeface="Fira Code, Consolas,  Courier New"/>
-              </a:rPr>
-              <a:t>    ],</a:t>
-            </a:r>
-          </a:p>
-          <a:p>
-            <a:pPr marL="0" indent="0">
-              <a:buNone/>
-            </a:pPr>
-            <a:r>
-              <a:rPr lang="de-AT" dirty="0">
-                <a:solidFill>
-                  <a:srgbClr val="000000"/>
-                </a:solidFill>
-                <a:latin typeface="Fira Code, Consolas,  Courier New"/>
-              </a:rPr>
-              <a:t>    </a:t>
-            </a:r>
-            <a:r>
-              <a:rPr lang="de-AT" dirty="0">
-                <a:solidFill>
-                  <a:srgbClr val="0451A5"/>
-                </a:solidFill>
-                <a:latin typeface="Fira Code, Consolas,  Courier New"/>
-              </a:rPr>
-              <a:t>"route"</a:t>
-            </a:r>
-            <a:r>
-              <a:rPr lang="de-AT" dirty="0">
-                <a:solidFill>
-                  <a:srgbClr val="000000"/>
-                </a:solidFill>
-                <a:latin typeface="Fira Code, Consolas,  Courier New"/>
-              </a:rPr>
-              <a:t>: {</a:t>
-            </a:r>
-          </a:p>
-          <a:p>
-            <a:pPr marL="0" indent="0">
-              <a:buNone/>
-            </a:pPr>
-            <a:r>
-              <a:rPr lang="de-AT" dirty="0">
-                <a:solidFill>
-                  <a:srgbClr val="000000"/>
-                </a:solidFill>
-                <a:latin typeface="Fira Code, Consolas,  Courier New"/>
-              </a:rPr>
-              <a:t>        </a:t>
-            </a:r>
-            <a:r>
-              <a:rPr lang="de-AT" dirty="0">
-                <a:solidFill>
-                  <a:srgbClr val="0451A5"/>
-                </a:solidFill>
-                <a:latin typeface="Fira Code, Consolas,  Courier New"/>
-              </a:rPr>
-              <a:t>"</a:t>
-            </a:r>
-            <a:r>
-              <a:rPr lang="de-AT" dirty="0" err="1">
-                <a:solidFill>
-                  <a:srgbClr val="0451A5"/>
-                </a:solidFill>
-                <a:latin typeface="Fira Code, Consolas,  Courier New"/>
-              </a:rPr>
-              <a:t>id</a:t>
-            </a:r>
-            <a:r>
-              <a:rPr lang="de-AT" dirty="0">
-                <a:solidFill>
-                  <a:srgbClr val="0451A5"/>
-                </a:solidFill>
-                <a:latin typeface="Fira Code, Consolas,  Courier New"/>
-              </a:rPr>
-              <a:t>"</a:t>
-            </a:r>
-            <a:r>
-              <a:rPr lang="de-AT" dirty="0">
-                <a:solidFill>
-                  <a:srgbClr val="000000"/>
-                </a:solidFill>
-                <a:latin typeface="Fira Code, Consolas,  Courier New"/>
-              </a:rPr>
-              <a:t>: </a:t>
-            </a:r>
-            <a:r>
-              <a:rPr lang="de-AT" dirty="0">
-                <a:solidFill>
-                  <a:srgbClr val="A31515"/>
-                </a:solidFill>
-                <a:latin typeface="Fira Code, Consolas,  Courier New"/>
-              </a:rPr>
-              <a:t>"5ff018a3-2a25-567e-8c74-1805c4029fbd"</a:t>
-            </a:r>
-            <a:endParaRPr lang="de-AT" dirty="0">
-              <a:solidFill>
-                <a:srgbClr val="000000"/>
-              </a:solidFill>
-              <a:latin typeface="Fira Code, Consolas,  Courier New"/>
-            </a:endParaRPr>
-          </a:p>
-          <a:p>
-            <a:pPr marL="0" indent="0">
-              <a:buNone/>
-            </a:pPr>
-            <a:r>
-              <a:rPr lang="de-AT" dirty="0">
-                <a:solidFill>
-                  <a:srgbClr val="000000"/>
-                </a:solidFill>
-                <a:latin typeface="Fira Code, Consolas,  Courier New"/>
-              </a:rPr>
-              <a:t>    },</a:t>
-            </a:r>
-          </a:p>
-          <a:p>
-            <a:pPr marL="0" indent="0">
-              <a:buNone/>
-            </a:pPr>
-            <a:r>
-              <a:rPr lang="de-AT" dirty="0">
-                <a:solidFill>
-                  <a:srgbClr val="000000"/>
-                </a:solidFill>
-                <a:latin typeface="Fira Code, Consolas,  Courier New"/>
-              </a:rPr>
-              <a:t>    </a:t>
-            </a:r>
-            <a:r>
-              <a:rPr lang="de-AT" dirty="0">
-                <a:solidFill>
-                  <a:srgbClr val="0451A5"/>
-                </a:solidFill>
-                <a:latin typeface="Fira Code, Consolas,  Courier New"/>
-              </a:rPr>
-              <a:t>"</a:t>
-            </a:r>
-            <a:r>
-              <a:rPr lang="de-AT" dirty="0" err="1">
-                <a:solidFill>
-                  <a:srgbClr val="0451A5"/>
-                </a:solidFill>
-                <a:latin typeface="Fira Code, Consolas,  Courier New"/>
-              </a:rPr>
-              <a:t>service</a:t>
-            </a:r>
-            <a:r>
-              <a:rPr lang="de-AT" dirty="0">
-                <a:solidFill>
-                  <a:srgbClr val="0451A5"/>
-                </a:solidFill>
-                <a:latin typeface="Fira Code, Consolas,  Courier New"/>
-              </a:rPr>
-              <a:t>"</a:t>
-            </a:r>
-            <a:r>
-              <a:rPr lang="de-AT" dirty="0">
-                <a:solidFill>
-                  <a:srgbClr val="000000"/>
-                </a:solidFill>
-                <a:latin typeface="Fira Code, Consolas,  Courier New"/>
-              </a:rPr>
-              <a:t>: </a:t>
-            </a:r>
-            <a:r>
-              <a:rPr lang="de-AT" dirty="0">
-                <a:solidFill>
-                  <a:srgbClr val="0000FF"/>
-                </a:solidFill>
-                <a:latin typeface="Fira Code, Consolas,  Courier New"/>
-              </a:rPr>
-              <a:t>null</a:t>
-            </a:r>
-            <a:endParaRPr lang="de-AT" dirty="0">
-              <a:solidFill>
-                <a:srgbClr val="000000"/>
-              </a:solidFill>
-              <a:latin typeface="Fira Code, Consolas,  Courier New"/>
-            </a:endParaRPr>
-          </a:p>
-          <a:p>
-            <a:pPr marL="0" indent="0">
-              <a:buNone/>
-            </a:pPr>
-            <a:r>
-              <a:rPr lang="de-AT" dirty="0">
-                <a:solidFill>
-                  <a:srgbClr val="000000"/>
-                </a:solidFill>
-                <a:latin typeface="Fira Code, Consolas,  Courier New"/>
-              </a:rPr>
-              <a:t>}</a:t>
-            </a:r>
-            <a:endParaRPr lang="de-AT" b="0" dirty="0">
-              <a:solidFill>
-                <a:srgbClr val="000000"/>
-              </a:solidFill>
-              <a:effectLst/>
-              <a:latin typeface="Fira Code, Consolas,  Courier New"/>
-            </a:endParaRPr>
-          </a:p>
-        </p:txBody>
-      </p:sp>
+      </p:pic>
     </p:spTree>
     <p:extLst>
       <p:ext uri="{BB962C8B-B14F-4D97-AF65-F5344CB8AC3E}">
-        <p14:creationId xmlns:p14="http://schemas.microsoft.com/office/powerpoint/2010/main" val="2735879224"/>
+        <p14:creationId xmlns:p14="http://schemas.microsoft.com/office/powerpoint/2010/main" val="1377814905"/>
       </p:ext>
     </p:extLst>
   </p:cSld>
@@ -12590,111 +11791,50 @@
           <a:p>
             <a:r>
               <a:rPr lang="de-AT" dirty="0" smtClean="0"/>
-              <a:t>Service Design</a:t>
+              <a:t>Circuit </a:t>
+            </a:r>
+            <a:r>
+              <a:rPr lang="de-AT" dirty="0" err="1" smtClean="0"/>
+              <a:t>Breaker</a:t>
+            </a:r>
+            <a:r>
+              <a:rPr lang="de-AT" dirty="0" smtClean="0"/>
+              <a:t> (2)</a:t>
             </a:r>
             <a:endParaRPr lang="de-AT" dirty="0"/>
           </a:p>
         </p:txBody>
       </p:sp>
-      <p:sp>
-        <p:nvSpPr>
-          <p:cNvPr id="3" name="Content Placeholder 2"/>
-          <p:cNvSpPr>
-            <a:spLocks noGrp="1"/>
-          </p:cNvSpPr>
+      <p:pic>
+        <p:nvPicPr>
+          <p:cNvPr id="5" name="Content Placeholder 4"/>
+          <p:cNvPicPr>
+            <a:picLocks noGrp="1" noChangeAspect="1"/>
+          </p:cNvPicPr>
           <p:nvPr>
             <p:ph idx="1"/>
           </p:nvPr>
-        </p:nvSpPr>
-        <p:spPr/>
-        <p:txBody>
-          <a:bodyPr/>
-          <a:lstStyle/>
-          <a:p>
-            <a:pPr marL="0" indent="0">
-              <a:buNone/>
-            </a:pPr>
-            <a:endParaRPr lang="de-AT" dirty="0" smtClean="0"/>
-          </a:p>
-          <a:p>
-            <a:pPr marL="0" indent="0">
-              <a:buNone/>
-            </a:pPr>
-            <a:r>
-              <a:rPr lang="de-AT" dirty="0" smtClean="0"/>
-              <a:t>Who </a:t>
-            </a:r>
-            <a:r>
-              <a:rPr lang="de-AT" dirty="0" err="1" smtClean="0"/>
-              <a:t>operates</a:t>
-            </a:r>
-            <a:r>
-              <a:rPr lang="de-AT" dirty="0" smtClean="0"/>
-              <a:t> </a:t>
-            </a:r>
-            <a:r>
-              <a:rPr lang="de-AT" dirty="0" err="1" smtClean="0"/>
-              <a:t>your</a:t>
-            </a:r>
-            <a:r>
-              <a:rPr lang="de-AT" dirty="0" smtClean="0"/>
-              <a:t> </a:t>
-            </a:r>
-            <a:r>
-              <a:rPr lang="de-AT" dirty="0" err="1" smtClean="0"/>
-              <a:t>gateway</a:t>
-            </a:r>
-            <a:r>
-              <a:rPr lang="de-AT" dirty="0" smtClean="0"/>
-              <a:t>?</a:t>
-            </a:r>
-          </a:p>
-          <a:p>
-            <a:pPr marL="0" indent="0">
-              <a:buNone/>
-            </a:pPr>
-            <a:endParaRPr lang="de-AT" dirty="0"/>
-          </a:p>
-          <a:p>
-            <a:pPr marL="0" indent="0">
-              <a:buNone/>
-            </a:pPr>
-            <a:r>
-              <a:rPr lang="de-AT" dirty="0" smtClean="0"/>
-              <a:t>Who </a:t>
-            </a:r>
-            <a:r>
-              <a:rPr lang="de-AT" dirty="0" err="1" smtClean="0"/>
-              <a:t>uses</a:t>
-            </a:r>
-            <a:r>
-              <a:rPr lang="de-AT" dirty="0" smtClean="0"/>
-              <a:t> </a:t>
-            </a:r>
-            <a:r>
-              <a:rPr lang="de-AT" dirty="0" err="1" smtClean="0"/>
-              <a:t>your</a:t>
-            </a:r>
-            <a:r>
-              <a:rPr lang="de-AT" dirty="0" smtClean="0"/>
-              <a:t> </a:t>
-            </a:r>
-            <a:r>
-              <a:rPr lang="de-AT" dirty="0" err="1" smtClean="0"/>
-              <a:t>gateway</a:t>
-            </a:r>
-            <a:r>
-              <a:rPr lang="de-AT" dirty="0" smtClean="0"/>
-              <a:t>?</a:t>
-            </a:r>
-            <a:endParaRPr lang="de-AT" dirty="0"/>
-          </a:p>
-        </p:txBody>
-      </p:sp>
+        </p:nvPicPr>
+        <p:blipFill>
+          <a:blip r:embed="rId2"/>
+          <a:stretch>
+            <a:fillRect/>
+          </a:stretch>
+        </p:blipFill>
+        <p:spPr>
+          <a:xfrm>
+            <a:off x="838200" y="2129760"/>
+            <a:ext cx="10515600" cy="3743068"/>
+          </a:xfrm>
+          <a:prstGeom prst="rect">
+            <a:avLst/>
+          </a:prstGeom>
+        </p:spPr>
+      </p:pic>
     </p:spTree>
     <p:extLst>
       <p:ext uri="{BB962C8B-B14F-4D97-AF65-F5344CB8AC3E}">
-        <p14:creationId xmlns:p14="http://schemas.microsoft.com/office/powerpoint/2010/main" val="2848102619"/>
+        <p14:creationId xmlns:p14="http://schemas.microsoft.com/office/powerpoint/2010/main" val="849917032"/>
       </p:ext>
     </p:extLst>
   </p:cSld>
@@ -12738,6 +11878,1414 @@
           <a:p>
             <a:r>
               <a:rPr lang="de-AT" dirty="0" err="1" smtClean="0"/>
+              <a:t>Upstreams</a:t>
+            </a:r>
+            <a:endParaRPr lang="de-AT" dirty="0"/>
+          </a:p>
+        </p:txBody>
+      </p:sp>
+      <p:sp>
+        <p:nvSpPr>
+          <p:cNvPr id="4" name="Content Placeholder 3"/>
+          <p:cNvSpPr>
+            <a:spLocks noGrp="1"/>
+          </p:cNvSpPr>
+          <p:nvPr>
+            <p:ph sz="half" idx="1"/>
+          </p:nvPr>
+        </p:nvSpPr>
+        <p:spPr/>
+        <p:txBody>
+          <a:bodyPr/>
+          <a:lstStyle/>
+          <a:p>
+            <a:endParaRPr lang="de-AT"/>
+          </a:p>
+        </p:txBody>
+      </p:sp>
+      <p:sp>
+        <p:nvSpPr>
+          <p:cNvPr id="5" name="Content Placeholder 4"/>
+          <p:cNvSpPr>
+            <a:spLocks noGrp="1"/>
+          </p:cNvSpPr>
+          <p:nvPr>
+            <p:ph sz="half" idx="2"/>
+          </p:nvPr>
+        </p:nvSpPr>
+        <p:spPr/>
+        <p:txBody>
+          <a:bodyPr/>
+          <a:lstStyle/>
+          <a:p>
+            <a:endParaRPr lang="de-AT"/>
+          </a:p>
+        </p:txBody>
+      </p:sp>
+    </p:spTree>
+    <p:extLst>
+      <p:ext uri="{BB962C8B-B14F-4D97-AF65-F5344CB8AC3E}">
+        <p14:creationId xmlns:p14="http://schemas.microsoft.com/office/powerpoint/2010/main" val="3387577602"/>
+      </p:ext>
+    </p:extLst>
+  </p:cSld>
+  <p:clrMapOvr>
+    <a:masterClrMapping/>
+  </p:clrMapOvr>
+</p:sld>
+</file>
+
+<file path=ppt/slides/slide29.xml><?xml version="1.0" encoding="utf-8"?>
+<p:sld xmlns:a="http://schemas.openxmlformats.org/drawingml/2006/main" xmlns:r="http://schemas.openxmlformats.org/officeDocument/2006/relationships" xmlns:p="http://schemas.openxmlformats.org/presentationml/2006/main">
+  <p:cSld>
+    <p:spTree>
+      <p:nvGrpSpPr>
+        <p:cNvPr id="1" name=""/>
+        <p:cNvGrpSpPr/>
+        <p:nvPr/>
+      </p:nvGrpSpPr>
+      <p:grpSpPr>
+        <a:xfrm>
+          <a:off x="0" y="0"/>
+          <a:ext cx="0" cy="0"/>
+          <a:chOff x="0" y="0"/>
+          <a:chExt cx="0" cy="0"/>
+        </a:xfrm>
+      </p:grpSpPr>
+      <p:sp>
+        <p:nvSpPr>
+          <p:cNvPr id="2" name="Title 1"/>
+          <p:cNvSpPr>
+            <a:spLocks noGrp="1"/>
+          </p:cNvSpPr>
+          <p:nvPr>
+            <p:ph type="title"/>
+          </p:nvPr>
+        </p:nvSpPr>
+        <p:spPr/>
+        <p:txBody>
+          <a:bodyPr/>
+          <a:lstStyle/>
+          <a:p>
+            <a:r>
+              <a:rPr lang="de-AT" dirty="0" smtClean="0"/>
+              <a:t>Targets</a:t>
+            </a:r>
+            <a:endParaRPr lang="de-AT" dirty="0"/>
+          </a:p>
+        </p:txBody>
+      </p:sp>
+      <p:sp>
+        <p:nvSpPr>
+          <p:cNvPr id="4" name="Content Placeholder 3"/>
+          <p:cNvSpPr>
+            <a:spLocks noGrp="1"/>
+          </p:cNvSpPr>
+          <p:nvPr>
+            <p:ph sz="half" idx="1"/>
+          </p:nvPr>
+        </p:nvSpPr>
+        <p:spPr/>
+        <p:txBody>
+          <a:bodyPr/>
+          <a:lstStyle/>
+          <a:p>
+            <a:endParaRPr lang="de-AT" dirty="0"/>
+          </a:p>
+        </p:txBody>
+      </p:sp>
+      <p:sp>
+        <p:nvSpPr>
+          <p:cNvPr id="5" name="Content Placeholder 4"/>
+          <p:cNvSpPr>
+            <a:spLocks noGrp="1"/>
+          </p:cNvSpPr>
+          <p:nvPr>
+            <p:ph sz="half" idx="2"/>
+          </p:nvPr>
+        </p:nvSpPr>
+        <p:spPr/>
+        <p:txBody>
+          <a:bodyPr/>
+          <a:lstStyle/>
+          <a:p>
+            <a:endParaRPr lang="de-AT"/>
+          </a:p>
+        </p:txBody>
+      </p:sp>
+    </p:spTree>
+    <p:extLst>
+      <p:ext uri="{BB962C8B-B14F-4D97-AF65-F5344CB8AC3E}">
+        <p14:creationId xmlns:p14="http://schemas.microsoft.com/office/powerpoint/2010/main" val="4258409465"/>
+      </p:ext>
+    </p:extLst>
+  </p:cSld>
+  <p:clrMapOvr>
+    <a:masterClrMapping/>
+  </p:clrMapOvr>
+</p:sld>
+</file>
+
+<file path=ppt/slides/slide3.xml><?xml version="1.0" encoding="utf-8"?>
+<p:sld xmlns:a="http://schemas.openxmlformats.org/drawingml/2006/main" xmlns:r="http://schemas.openxmlformats.org/officeDocument/2006/relationships" xmlns:p="http://schemas.openxmlformats.org/presentationml/2006/main">
+  <p:cSld>
+    <p:spTree>
+      <p:nvGrpSpPr>
+        <p:cNvPr id="1" name=""/>
+        <p:cNvGrpSpPr/>
+        <p:nvPr/>
+      </p:nvGrpSpPr>
+      <p:grpSpPr>
+        <a:xfrm>
+          <a:off x="0" y="0"/>
+          <a:ext cx="0" cy="0"/>
+          <a:chOff x="0" y="0"/>
+          <a:chExt cx="0" cy="0"/>
+        </a:xfrm>
+      </p:grpSpPr>
+      <p:sp>
+        <p:nvSpPr>
+          <p:cNvPr id="2" name="Title 1"/>
+          <p:cNvSpPr>
+            <a:spLocks noGrp="1"/>
+          </p:cNvSpPr>
+          <p:nvPr>
+            <p:ph type="title"/>
+          </p:nvPr>
+        </p:nvSpPr>
+        <p:spPr/>
+        <p:txBody>
+          <a:bodyPr/>
+          <a:lstStyle/>
+          <a:p>
+            <a:r>
+              <a:rPr lang="de-AT" dirty="0" err="1" smtClean="0"/>
+              <a:t>Excursus</a:t>
+            </a:r>
+            <a:r>
+              <a:rPr lang="de-AT" dirty="0" smtClean="0"/>
+              <a:t>: </a:t>
+            </a:r>
+            <a:r>
+              <a:rPr lang="de-AT" dirty="0" err="1" smtClean="0"/>
+              <a:t>Documentation</a:t>
+            </a:r>
+            <a:endParaRPr lang="de-AT" dirty="0"/>
+          </a:p>
+        </p:txBody>
+      </p:sp>
+      <p:pic>
+        <p:nvPicPr>
+          <p:cNvPr id="5" name="Content Placeholder 4"/>
+          <p:cNvPicPr>
+            <a:picLocks noGrp="1" noChangeAspect="1"/>
+          </p:cNvPicPr>
+          <p:nvPr>
+            <p:ph idx="1"/>
+          </p:nvPr>
+        </p:nvPicPr>
+        <p:blipFill>
+          <a:blip r:embed="rId3"/>
+          <a:stretch>
+            <a:fillRect/>
+          </a:stretch>
+        </p:blipFill>
+        <p:spPr>
+          <a:xfrm>
+            <a:off x="6644640" y="457199"/>
+            <a:ext cx="5061458" cy="6035821"/>
+          </a:xfrm>
+          <a:prstGeom prst="rect">
+            <a:avLst/>
+          </a:prstGeom>
+        </p:spPr>
+      </p:pic>
+      <p:sp>
+        <p:nvSpPr>
+          <p:cNvPr id="4" name="Text Placeholder 3"/>
+          <p:cNvSpPr>
+            <a:spLocks noGrp="1"/>
+          </p:cNvSpPr>
+          <p:nvPr>
+            <p:ph type="body" sz="half" idx="2"/>
+          </p:nvPr>
+        </p:nvSpPr>
+        <p:spPr/>
+        <p:txBody>
+          <a:bodyPr/>
+          <a:lstStyle/>
+          <a:p>
+            <a:endParaRPr lang="de-AT" dirty="0" smtClean="0"/>
+          </a:p>
+          <a:p>
+            <a:r>
+              <a:rPr lang="de-AT" dirty="0" err="1" smtClean="0"/>
+              <a:t>OpenAPI</a:t>
+            </a:r>
+            <a:r>
+              <a:rPr lang="de-AT" dirty="0" smtClean="0"/>
+              <a:t> </a:t>
+            </a:r>
+            <a:r>
+              <a:rPr lang="de-AT" dirty="0"/>
+              <a:t>aka </a:t>
+            </a:r>
+            <a:r>
+              <a:rPr lang="de-AT" dirty="0" err="1"/>
+              <a:t>Swagger</a:t>
+            </a:r>
+            <a:endParaRPr lang="de-AT" dirty="0"/>
+          </a:p>
+          <a:p>
+            <a:r>
+              <a:rPr lang="de-AT" dirty="0" err="1"/>
+              <a:t>Example</a:t>
+            </a:r>
+            <a:r>
+              <a:rPr lang="de-AT" dirty="0"/>
+              <a:t> .NET Core </a:t>
+            </a:r>
+            <a:r>
+              <a:rPr lang="de-AT" dirty="0" err="1" smtClean="0"/>
+              <a:t>see</a:t>
+            </a:r>
+            <a:endParaRPr lang="de-AT" dirty="0" smtClean="0"/>
+          </a:p>
+          <a:p>
+            <a:r>
+              <a:rPr lang="de-AT" dirty="0">
+                <a:hlinkClick r:id="rId4"/>
+              </a:rPr>
+              <a:t>https://docs.microsoft.com/en-us/aspnet/core/tutorials/web-api-help-pages-using-swagger?view=aspnetcore-3.1</a:t>
+            </a:r>
+            <a:endParaRPr lang="de-AT" dirty="0"/>
+          </a:p>
+          <a:p>
+            <a:r>
+              <a:rPr lang="de-AT" dirty="0"/>
+              <a:t/>
+            </a:r>
+            <a:br>
+              <a:rPr lang="de-AT" dirty="0"/>
+            </a:br>
+            <a:endParaRPr lang="de-AT" dirty="0"/>
+          </a:p>
+        </p:txBody>
+      </p:sp>
+    </p:spTree>
+    <p:extLst>
+      <p:ext uri="{BB962C8B-B14F-4D97-AF65-F5344CB8AC3E}">
+        <p14:creationId xmlns:p14="http://schemas.microsoft.com/office/powerpoint/2010/main" val="1156229624"/>
+      </p:ext>
+    </p:extLst>
+  </p:cSld>
+  <p:clrMapOvr>
+    <a:masterClrMapping/>
+  </p:clrMapOvr>
+</p:sld>
+</file>
+
+<file path=ppt/slides/slide30.xml><?xml version="1.0" encoding="utf-8"?>
+<p:sld xmlns:a="http://schemas.openxmlformats.org/drawingml/2006/main" xmlns:r="http://schemas.openxmlformats.org/officeDocument/2006/relationships" xmlns:p="http://schemas.openxmlformats.org/presentationml/2006/main">
+  <p:cSld>
+    <p:spTree>
+      <p:nvGrpSpPr>
+        <p:cNvPr id="1" name=""/>
+        <p:cNvGrpSpPr/>
+        <p:nvPr/>
+      </p:nvGrpSpPr>
+      <p:grpSpPr>
+        <a:xfrm>
+          <a:off x="0" y="0"/>
+          <a:ext cx="0" cy="0"/>
+          <a:chOff x="0" y="0"/>
+          <a:chExt cx="0" cy="0"/>
+        </a:xfrm>
+      </p:grpSpPr>
+      <p:sp>
+        <p:nvSpPr>
+          <p:cNvPr id="2" name="Title 1"/>
+          <p:cNvSpPr>
+            <a:spLocks noGrp="1"/>
+          </p:cNvSpPr>
+          <p:nvPr>
+            <p:ph type="title"/>
+          </p:nvPr>
+        </p:nvSpPr>
+        <p:spPr/>
+        <p:txBody>
+          <a:bodyPr/>
+          <a:lstStyle/>
+          <a:p>
+            <a:r>
+              <a:rPr lang="de-AT" dirty="0" err="1" smtClean="0"/>
+              <a:t>Plugins</a:t>
+            </a:r>
+            <a:endParaRPr lang="de-AT" dirty="0"/>
+          </a:p>
+        </p:txBody>
+      </p:sp>
+      <p:sp>
+        <p:nvSpPr>
+          <p:cNvPr id="4" name="Content Placeholder 3"/>
+          <p:cNvSpPr>
+            <a:spLocks noGrp="1"/>
+          </p:cNvSpPr>
+          <p:nvPr>
+            <p:ph sz="half" idx="1"/>
+          </p:nvPr>
+        </p:nvSpPr>
+        <p:spPr>
+          <a:xfrm>
+            <a:off x="838200" y="1825625"/>
+            <a:ext cx="5181600" cy="3319883"/>
+          </a:xfrm>
+        </p:spPr>
+        <p:txBody>
+          <a:bodyPr>
+            <a:spAutoFit/>
+          </a:bodyPr>
+          <a:lstStyle/>
+          <a:p>
+            <a:pPr marL="0" indent="0">
+              <a:buNone/>
+            </a:pPr>
+            <a:r>
+              <a:rPr lang="de-AT" dirty="0" err="1" smtClean="0"/>
+              <a:t>Plugins</a:t>
+            </a:r>
+            <a:r>
+              <a:rPr lang="de-AT" dirty="0" smtClean="0"/>
+              <a:t> </a:t>
+            </a:r>
+            <a:r>
+              <a:rPr lang="de-AT" dirty="0" err="1" smtClean="0"/>
+              <a:t>are</a:t>
+            </a:r>
+            <a:r>
+              <a:rPr lang="de-AT" dirty="0" smtClean="0"/>
+              <a:t> </a:t>
+            </a:r>
+            <a:r>
+              <a:rPr lang="de-AT" dirty="0" err="1" smtClean="0"/>
+              <a:t>executed</a:t>
+            </a:r>
+            <a:r>
+              <a:rPr lang="de-AT" dirty="0" smtClean="0"/>
+              <a:t> </a:t>
+            </a:r>
+            <a:r>
+              <a:rPr lang="de-AT" dirty="0" err="1" smtClean="0"/>
+              <a:t>during</a:t>
+            </a:r>
+            <a:r>
+              <a:rPr lang="de-AT" dirty="0" smtClean="0"/>
+              <a:t> HTTP </a:t>
+            </a:r>
+            <a:r>
+              <a:rPr lang="de-AT" dirty="0" err="1" smtClean="0"/>
+              <a:t>request</a:t>
+            </a:r>
+            <a:r>
+              <a:rPr lang="de-AT" dirty="0" smtClean="0"/>
+              <a:t>/</a:t>
+            </a:r>
+            <a:r>
+              <a:rPr lang="de-AT" dirty="0" err="1" smtClean="0"/>
+              <a:t>response</a:t>
+            </a:r>
+            <a:r>
+              <a:rPr lang="de-AT" dirty="0" smtClean="0"/>
+              <a:t> </a:t>
+            </a:r>
+            <a:r>
+              <a:rPr lang="de-AT" dirty="0" err="1" smtClean="0"/>
+              <a:t>lifecycle</a:t>
+            </a:r>
+            <a:endParaRPr lang="de-AT" dirty="0" smtClean="0"/>
+          </a:p>
+          <a:p>
+            <a:pPr marL="0" indent="0">
+              <a:buNone/>
+            </a:pPr>
+            <a:endParaRPr lang="de-AT" dirty="0" smtClean="0"/>
+          </a:p>
+          <a:p>
+            <a:pPr marL="0" indent="0">
+              <a:buNone/>
+            </a:pPr>
+            <a:r>
+              <a:rPr lang="de-AT" dirty="0" err="1" smtClean="0"/>
+              <a:t>Plugins</a:t>
+            </a:r>
+            <a:r>
+              <a:rPr lang="de-AT" dirty="0" smtClean="0"/>
+              <a:t> </a:t>
+            </a:r>
+            <a:r>
+              <a:rPr lang="de-AT" dirty="0" err="1" smtClean="0"/>
+              <a:t>are</a:t>
+            </a:r>
+            <a:r>
+              <a:rPr lang="de-AT" dirty="0" smtClean="0"/>
+              <a:t> </a:t>
+            </a:r>
+            <a:r>
+              <a:rPr lang="de-AT" dirty="0" err="1" smtClean="0"/>
+              <a:t>bound</a:t>
+            </a:r>
+            <a:r>
+              <a:rPr lang="de-AT" dirty="0" smtClean="0"/>
+              <a:t> </a:t>
+            </a:r>
+            <a:r>
+              <a:rPr lang="de-AT" dirty="0" err="1" smtClean="0"/>
+              <a:t>to</a:t>
+            </a:r>
+            <a:r>
+              <a:rPr lang="de-AT" dirty="0" smtClean="0"/>
+              <a:t> </a:t>
+            </a:r>
+            <a:r>
+              <a:rPr lang="de-AT" dirty="0" err="1" smtClean="0"/>
+              <a:t>services</a:t>
+            </a:r>
+            <a:r>
+              <a:rPr lang="de-AT" dirty="0" smtClean="0"/>
+              <a:t>, </a:t>
+            </a:r>
+            <a:r>
+              <a:rPr lang="de-AT" dirty="0" err="1" smtClean="0"/>
+              <a:t>routes</a:t>
+            </a:r>
+            <a:r>
+              <a:rPr lang="de-AT" dirty="0" smtClean="0"/>
+              <a:t> </a:t>
+            </a:r>
+            <a:r>
+              <a:rPr lang="de-AT" dirty="0" err="1" smtClean="0"/>
+              <a:t>and</a:t>
+            </a:r>
+            <a:r>
+              <a:rPr lang="de-AT" dirty="0" smtClean="0"/>
+              <a:t>/</a:t>
+            </a:r>
+            <a:r>
+              <a:rPr lang="de-AT" dirty="0" err="1" smtClean="0"/>
+              <a:t>or</a:t>
+            </a:r>
+            <a:r>
+              <a:rPr lang="de-AT" dirty="0" smtClean="0"/>
+              <a:t> </a:t>
+            </a:r>
+            <a:r>
+              <a:rPr lang="de-AT" dirty="0" err="1" smtClean="0"/>
+              <a:t>consumers</a:t>
+            </a:r>
+            <a:endParaRPr lang="de-AT" dirty="0" smtClean="0"/>
+          </a:p>
+          <a:p>
+            <a:pPr marL="0" indent="0">
+              <a:buNone/>
+            </a:pPr>
+            <a:endParaRPr lang="de-AT" dirty="0"/>
+          </a:p>
+          <a:p>
+            <a:pPr marL="0" indent="0">
+              <a:buNone/>
+            </a:pPr>
+            <a:r>
+              <a:rPr lang="de-AT" dirty="0" err="1" smtClean="0"/>
+              <a:t>Plugins</a:t>
+            </a:r>
+            <a:r>
+              <a:rPr lang="de-AT" dirty="0" smtClean="0"/>
+              <a:t> </a:t>
+            </a:r>
+            <a:r>
+              <a:rPr lang="de-AT" dirty="0" err="1" smtClean="0"/>
+              <a:t>are</a:t>
+            </a:r>
+            <a:r>
+              <a:rPr lang="de-AT" dirty="0" smtClean="0"/>
+              <a:t> </a:t>
+            </a:r>
+            <a:r>
+              <a:rPr lang="de-AT" dirty="0" err="1" smtClean="0"/>
+              <a:t>developed</a:t>
+            </a:r>
+            <a:r>
+              <a:rPr lang="de-AT" dirty="0" smtClean="0"/>
+              <a:t> in </a:t>
+            </a:r>
+            <a:r>
+              <a:rPr lang="de-AT" dirty="0" err="1" smtClean="0"/>
+              <a:t>Lua</a:t>
+            </a:r>
+            <a:endParaRPr lang="de-AT" dirty="0" smtClean="0"/>
+          </a:p>
+        </p:txBody>
+      </p:sp>
+      <p:sp>
+        <p:nvSpPr>
+          <p:cNvPr id="5" name="Content Placeholder 4"/>
+          <p:cNvSpPr>
+            <a:spLocks noGrp="1"/>
+          </p:cNvSpPr>
+          <p:nvPr>
+            <p:ph sz="half" idx="2"/>
+          </p:nvPr>
+        </p:nvSpPr>
+        <p:spPr/>
+        <p:txBody>
+          <a:bodyPr>
+            <a:normAutofit fontScale="40000" lnSpcReduction="20000"/>
+          </a:bodyPr>
+          <a:lstStyle/>
+          <a:p>
+            <a:pPr marL="0" indent="0">
+              <a:buNone/>
+            </a:pPr>
+            <a:r>
+              <a:rPr lang="de-AT" dirty="0">
+                <a:solidFill>
+                  <a:srgbClr val="000000"/>
+                </a:solidFill>
+                <a:latin typeface="Fira Code, Consolas,  Courier New"/>
+              </a:rPr>
+              <a:t>{</a:t>
+            </a:r>
+          </a:p>
+          <a:p>
+            <a:pPr marL="0" indent="0">
+              <a:buNone/>
+            </a:pPr>
+            <a:r>
+              <a:rPr lang="de-AT" dirty="0">
+                <a:solidFill>
+                  <a:srgbClr val="000000"/>
+                </a:solidFill>
+                <a:latin typeface="Fira Code, Consolas,  Courier New"/>
+              </a:rPr>
+              <a:t>    </a:t>
+            </a:r>
+            <a:r>
+              <a:rPr lang="de-AT" dirty="0">
+                <a:solidFill>
+                  <a:srgbClr val="0451A5"/>
+                </a:solidFill>
+                <a:latin typeface="Fira Code, Consolas,  Courier New"/>
+              </a:rPr>
+              <a:t>"</a:t>
+            </a:r>
+            <a:r>
+              <a:rPr lang="de-AT" dirty="0" err="1">
+                <a:solidFill>
+                  <a:srgbClr val="0451A5"/>
+                </a:solidFill>
+                <a:latin typeface="Fira Code, Consolas,  Courier New"/>
+              </a:rPr>
+              <a:t>name</a:t>
+            </a:r>
+            <a:r>
+              <a:rPr lang="de-AT" dirty="0">
+                <a:solidFill>
+                  <a:srgbClr val="0451A5"/>
+                </a:solidFill>
+                <a:latin typeface="Fira Code, Consolas,  Courier New"/>
+              </a:rPr>
+              <a:t>"</a:t>
+            </a:r>
+            <a:r>
+              <a:rPr lang="de-AT" dirty="0">
+                <a:solidFill>
+                  <a:srgbClr val="000000"/>
+                </a:solidFill>
+                <a:latin typeface="Fira Code, Consolas,  Courier New"/>
+              </a:rPr>
+              <a:t>: </a:t>
+            </a:r>
+            <a:r>
+              <a:rPr lang="de-AT" dirty="0">
+                <a:solidFill>
+                  <a:srgbClr val="A31515"/>
+                </a:solidFill>
+                <a:latin typeface="Fira Code, Consolas,  Courier New"/>
+              </a:rPr>
+              <a:t>"</a:t>
+            </a:r>
+            <a:r>
+              <a:rPr lang="de-AT" dirty="0" err="1">
+                <a:solidFill>
+                  <a:srgbClr val="A31515"/>
+                </a:solidFill>
+                <a:latin typeface="Fira Code, Consolas,  Courier New"/>
+              </a:rPr>
+              <a:t>ip-restriction</a:t>
+            </a:r>
+            <a:r>
+              <a:rPr lang="de-AT" dirty="0">
+                <a:solidFill>
+                  <a:srgbClr val="A31515"/>
+                </a:solidFill>
+                <a:latin typeface="Fira Code, Consolas,  Courier New"/>
+              </a:rPr>
+              <a:t>"</a:t>
+            </a:r>
+            <a:r>
+              <a:rPr lang="de-AT" dirty="0">
+                <a:solidFill>
+                  <a:srgbClr val="000000"/>
+                </a:solidFill>
+                <a:latin typeface="Fira Code, Consolas,  Courier New"/>
+              </a:rPr>
+              <a:t>,</a:t>
+            </a:r>
+          </a:p>
+          <a:p>
+            <a:pPr marL="0" indent="0">
+              <a:buNone/>
+            </a:pPr>
+            <a:r>
+              <a:rPr lang="de-AT" dirty="0">
+                <a:solidFill>
+                  <a:srgbClr val="000000"/>
+                </a:solidFill>
+                <a:latin typeface="Fira Code, Consolas,  Courier New"/>
+              </a:rPr>
+              <a:t>    </a:t>
+            </a:r>
+            <a:r>
+              <a:rPr lang="de-AT" dirty="0">
+                <a:solidFill>
+                  <a:srgbClr val="0451A5"/>
+                </a:solidFill>
+                <a:latin typeface="Fira Code, Consolas,  Courier New"/>
+              </a:rPr>
+              <a:t>"</a:t>
+            </a:r>
+            <a:r>
+              <a:rPr lang="de-AT" dirty="0" err="1">
+                <a:solidFill>
+                  <a:srgbClr val="0451A5"/>
+                </a:solidFill>
+                <a:latin typeface="Fira Code, Consolas,  Courier New"/>
+              </a:rPr>
+              <a:t>config</a:t>
+            </a:r>
+            <a:r>
+              <a:rPr lang="de-AT" dirty="0">
+                <a:solidFill>
+                  <a:srgbClr val="0451A5"/>
+                </a:solidFill>
+                <a:latin typeface="Fira Code, Consolas,  Courier New"/>
+              </a:rPr>
+              <a:t>"</a:t>
+            </a:r>
+            <a:r>
+              <a:rPr lang="de-AT" dirty="0">
+                <a:solidFill>
+                  <a:srgbClr val="000000"/>
+                </a:solidFill>
+                <a:latin typeface="Fira Code, Consolas,  Courier New"/>
+              </a:rPr>
+              <a:t>: {</a:t>
+            </a:r>
+          </a:p>
+          <a:p>
+            <a:pPr marL="0" indent="0">
+              <a:buNone/>
+            </a:pPr>
+            <a:r>
+              <a:rPr lang="de-AT" dirty="0">
+                <a:solidFill>
+                  <a:srgbClr val="000000"/>
+                </a:solidFill>
+                <a:latin typeface="Fira Code, Consolas,  Courier New"/>
+              </a:rPr>
+              <a:t>        </a:t>
+            </a:r>
+            <a:r>
+              <a:rPr lang="de-AT" dirty="0">
+                <a:solidFill>
+                  <a:srgbClr val="0451A5"/>
+                </a:solidFill>
+                <a:latin typeface="Fira Code, Consolas,  Courier New"/>
+              </a:rPr>
+              <a:t>"</a:t>
+            </a:r>
+            <a:r>
+              <a:rPr lang="de-AT" dirty="0" err="1">
+                <a:solidFill>
+                  <a:srgbClr val="0451A5"/>
+                </a:solidFill>
+                <a:latin typeface="Fira Code, Consolas,  Courier New"/>
+              </a:rPr>
+              <a:t>whitelist</a:t>
+            </a:r>
+            <a:r>
+              <a:rPr lang="de-AT" dirty="0">
+                <a:solidFill>
+                  <a:srgbClr val="0451A5"/>
+                </a:solidFill>
+                <a:latin typeface="Fira Code, Consolas,  Courier New"/>
+              </a:rPr>
+              <a:t>"</a:t>
+            </a:r>
+            <a:r>
+              <a:rPr lang="de-AT" dirty="0">
+                <a:solidFill>
+                  <a:srgbClr val="000000"/>
+                </a:solidFill>
+                <a:latin typeface="Fira Code, Consolas,  Courier New"/>
+              </a:rPr>
+              <a:t>: [</a:t>
+            </a:r>
+          </a:p>
+          <a:p>
+            <a:pPr marL="0" indent="0">
+              <a:buNone/>
+            </a:pPr>
+            <a:r>
+              <a:rPr lang="de-AT" dirty="0">
+                <a:solidFill>
+                  <a:srgbClr val="000000"/>
+                </a:solidFill>
+                <a:latin typeface="Fira Code, Consolas,  Courier New"/>
+              </a:rPr>
+              <a:t>            </a:t>
+            </a:r>
+            <a:r>
+              <a:rPr lang="de-AT" dirty="0">
+                <a:solidFill>
+                  <a:srgbClr val="A31515"/>
+                </a:solidFill>
+                <a:latin typeface="Fira Code, Consolas,  Courier New"/>
+              </a:rPr>
+              <a:t>"172.18.0.0/16"</a:t>
+            </a:r>
+            <a:endParaRPr lang="de-AT" dirty="0">
+              <a:solidFill>
+                <a:srgbClr val="000000"/>
+              </a:solidFill>
+              <a:latin typeface="Fira Code, Consolas,  Courier New"/>
+            </a:endParaRPr>
+          </a:p>
+          <a:p>
+            <a:pPr marL="0" indent="0">
+              <a:buNone/>
+            </a:pPr>
+            <a:r>
+              <a:rPr lang="de-AT" dirty="0">
+                <a:solidFill>
+                  <a:srgbClr val="000000"/>
+                </a:solidFill>
+                <a:latin typeface="Fira Code, Consolas,  Courier New"/>
+              </a:rPr>
+              <a:t>        ]</a:t>
+            </a:r>
+          </a:p>
+          <a:p>
+            <a:pPr marL="0" indent="0">
+              <a:buNone/>
+            </a:pPr>
+            <a:r>
+              <a:rPr lang="de-AT" dirty="0">
+                <a:solidFill>
+                  <a:srgbClr val="000000"/>
+                </a:solidFill>
+                <a:latin typeface="Fira Code, Consolas,  Courier New"/>
+              </a:rPr>
+              <a:t>    },</a:t>
+            </a:r>
+          </a:p>
+          <a:p>
+            <a:pPr marL="0" indent="0">
+              <a:buNone/>
+            </a:pPr>
+            <a:r>
+              <a:rPr lang="de-AT" dirty="0">
+                <a:solidFill>
+                  <a:srgbClr val="000000"/>
+                </a:solidFill>
+                <a:latin typeface="Fira Code, Consolas,  Courier New"/>
+              </a:rPr>
+              <a:t>    </a:t>
+            </a:r>
+            <a:r>
+              <a:rPr lang="de-AT" dirty="0">
+                <a:solidFill>
+                  <a:srgbClr val="0451A5"/>
+                </a:solidFill>
+                <a:latin typeface="Fira Code, Consolas,  Courier New"/>
+              </a:rPr>
+              <a:t>"</a:t>
+            </a:r>
+            <a:r>
+              <a:rPr lang="de-AT" dirty="0" err="1">
+                <a:solidFill>
+                  <a:srgbClr val="0451A5"/>
+                </a:solidFill>
+                <a:latin typeface="Fira Code, Consolas,  Courier New"/>
+              </a:rPr>
+              <a:t>consumer</a:t>
+            </a:r>
+            <a:r>
+              <a:rPr lang="de-AT" dirty="0">
+                <a:solidFill>
+                  <a:srgbClr val="0451A5"/>
+                </a:solidFill>
+                <a:latin typeface="Fira Code, Consolas,  Courier New"/>
+              </a:rPr>
+              <a:t>"</a:t>
+            </a:r>
+            <a:r>
+              <a:rPr lang="de-AT" dirty="0">
+                <a:solidFill>
+                  <a:srgbClr val="000000"/>
+                </a:solidFill>
+                <a:latin typeface="Fira Code, Consolas,  Courier New"/>
+              </a:rPr>
+              <a:t>: </a:t>
+            </a:r>
+            <a:r>
+              <a:rPr lang="de-AT" dirty="0">
+                <a:solidFill>
+                  <a:srgbClr val="0000FF"/>
+                </a:solidFill>
+                <a:latin typeface="Fira Code, Consolas,  Courier New"/>
+              </a:rPr>
+              <a:t>null</a:t>
+            </a:r>
+            <a:r>
+              <a:rPr lang="de-AT" dirty="0">
+                <a:solidFill>
+                  <a:srgbClr val="000000"/>
+                </a:solidFill>
+                <a:latin typeface="Fira Code, Consolas,  Courier New"/>
+              </a:rPr>
+              <a:t>,</a:t>
+            </a:r>
+          </a:p>
+          <a:p>
+            <a:pPr marL="0" indent="0">
+              <a:buNone/>
+            </a:pPr>
+            <a:r>
+              <a:rPr lang="de-AT" dirty="0">
+                <a:solidFill>
+                  <a:srgbClr val="000000"/>
+                </a:solidFill>
+                <a:latin typeface="Fira Code, Consolas,  Courier New"/>
+              </a:rPr>
+              <a:t>    </a:t>
+            </a:r>
+            <a:r>
+              <a:rPr lang="de-AT" dirty="0">
+                <a:solidFill>
+                  <a:srgbClr val="0451A5"/>
+                </a:solidFill>
+                <a:latin typeface="Fira Code, Consolas,  Courier New"/>
+              </a:rPr>
+              <a:t>"</a:t>
+            </a:r>
+            <a:r>
+              <a:rPr lang="de-AT" dirty="0" err="1">
+                <a:solidFill>
+                  <a:srgbClr val="0451A5"/>
+                </a:solidFill>
+                <a:latin typeface="Fira Code, Consolas,  Courier New"/>
+              </a:rPr>
+              <a:t>protocols</a:t>
+            </a:r>
+            <a:r>
+              <a:rPr lang="de-AT" dirty="0">
+                <a:solidFill>
+                  <a:srgbClr val="0451A5"/>
+                </a:solidFill>
+                <a:latin typeface="Fira Code, Consolas,  Courier New"/>
+              </a:rPr>
+              <a:t>"</a:t>
+            </a:r>
+            <a:r>
+              <a:rPr lang="de-AT" dirty="0">
+                <a:solidFill>
+                  <a:srgbClr val="000000"/>
+                </a:solidFill>
+                <a:latin typeface="Fira Code, Consolas,  Courier New"/>
+              </a:rPr>
+              <a:t>: [</a:t>
+            </a:r>
+          </a:p>
+          <a:p>
+            <a:pPr marL="0" indent="0">
+              <a:buNone/>
+            </a:pPr>
+            <a:r>
+              <a:rPr lang="de-AT" dirty="0">
+                <a:solidFill>
+                  <a:srgbClr val="000000"/>
+                </a:solidFill>
+                <a:latin typeface="Fira Code, Consolas,  Courier New"/>
+              </a:rPr>
+              <a:t>        </a:t>
+            </a:r>
+            <a:r>
+              <a:rPr lang="de-AT" dirty="0">
+                <a:solidFill>
+                  <a:srgbClr val="A31515"/>
+                </a:solidFill>
+                <a:latin typeface="Fira Code, Consolas,  Courier New"/>
+              </a:rPr>
+              <a:t>"http"</a:t>
+            </a:r>
+            <a:r>
+              <a:rPr lang="de-AT" dirty="0">
+                <a:solidFill>
+                  <a:srgbClr val="000000"/>
+                </a:solidFill>
+                <a:latin typeface="Fira Code, Consolas,  Courier New"/>
+              </a:rPr>
+              <a:t>,</a:t>
+            </a:r>
+          </a:p>
+          <a:p>
+            <a:pPr marL="0" indent="0">
+              <a:buNone/>
+            </a:pPr>
+            <a:r>
+              <a:rPr lang="de-AT" dirty="0">
+                <a:solidFill>
+                  <a:srgbClr val="000000"/>
+                </a:solidFill>
+                <a:latin typeface="Fira Code, Consolas,  Courier New"/>
+              </a:rPr>
+              <a:t>        </a:t>
+            </a:r>
+            <a:r>
+              <a:rPr lang="de-AT" dirty="0">
+                <a:solidFill>
+                  <a:srgbClr val="A31515"/>
+                </a:solidFill>
+                <a:latin typeface="Fira Code, Consolas,  Courier New"/>
+              </a:rPr>
+              <a:t>"https"</a:t>
+            </a:r>
+            <a:endParaRPr lang="de-AT" dirty="0">
+              <a:solidFill>
+                <a:srgbClr val="000000"/>
+              </a:solidFill>
+              <a:latin typeface="Fira Code, Consolas,  Courier New"/>
+            </a:endParaRPr>
+          </a:p>
+          <a:p>
+            <a:pPr marL="0" indent="0">
+              <a:buNone/>
+            </a:pPr>
+            <a:r>
+              <a:rPr lang="de-AT" dirty="0">
+                <a:solidFill>
+                  <a:srgbClr val="000000"/>
+                </a:solidFill>
+                <a:latin typeface="Fira Code, Consolas,  Courier New"/>
+              </a:rPr>
+              <a:t>    ],</a:t>
+            </a:r>
+          </a:p>
+          <a:p>
+            <a:pPr marL="0" indent="0">
+              <a:buNone/>
+            </a:pPr>
+            <a:r>
+              <a:rPr lang="de-AT" dirty="0">
+                <a:solidFill>
+                  <a:srgbClr val="000000"/>
+                </a:solidFill>
+                <a:latin typeface="Fira Code, Consolas,  Courier New"/>
+              </a:rPr>
+              <a:t>    </a:t>
+            </a:r>
+            <a:r>
+              <a:rPr lang="de-AT" dirty="0">
+                <a:solidFill>
+                  <a:srgbClr val="0451A5"/>
+                </a:solidFill>
+                <a:latin typeface="Fira Code, Consolas,  Courier New"/>
+              </a:rPr>
+              <a:t>"route"</a:t>
+            </a:r>
+            <a:r>
+              <a:rPr lang="de-AT" dirty="0">
+                <a:solidFill>
+                  <a:srgbClr val="000000"/>
+                </a:solidFill>
+                <a:latin typeface="Fira Code, Consolas,  Courier New"/>
+              </a:rPr>
+              <a:t>: {</a:t>
+            </a:r>
+          </a:p>
+          <a:p>
+            <a:pPr marL="0" indent="0">
+              <a:buNone/>
+            </a:pPr>
+            <a:r>
+              <a:rPr lang="de-AT" dirty="0">
+                <a:solidFill>
+                  <a:srgbClr val="000000"/>
+                </a:solidFill>
+                <a:latin typeface="Fira Code, Consolas,  Courier New"/>
+              </a:rPr>
+              <a:t>        </a:t>
+            </a:r>
+            <a:r>
+              <a:rPr lang="de-AT" dirty="0">
+                <a:solidFill>
+                  <a:srgbClr val="0451A5"/>
+                </a:solidFill>
+                <a:latin typeface="Fira Code, Consolas,  Courier New"/>
+              </a:rPr>
+              <a:t>"</a:t>
+            </a:r>
+            <a:r>
+              <a:rPr lang="de-AT" dirty="0" err="1">
+                <a:solidFill>
+                  <a:srgbClr val="0451A5"/>
+                </a:solidFill>
+                <a:latin typeface="Fira Code, Consolas,  Courier New"/>
+              </a:rPr>
+              <a:t>id</a:t>
+            </a:r>
+            <a:r>
+              <a:rPr lang="de-AT" dirty="0">
+                <a:solidFill>
+                  <a:srgbClr val="0451A5"/>
+                </a:solidFill>
+                <a:latin typeface="Fira Code, Consolas,  Courier New"/>
+              </a:rPr>
+              <a:t>"</a:t>
+            </a:r>
+            <a:r>
+              <a:rPr lang="de-AT" dirty="0">
+                <a:solidFill>
+                  <a:srgbClr val="000000"/>
+                </a:solidFill>
+                <a:latin typeface="Fira Code, Consolas,  Courier New"/>
+              </a:rPr>
+              <a:t>: </a:t>
+            </a:r>
+            <a:r>
+              <a:rPr lang="de-AT" dirty="0">
+                <a:solidFill>
+                  <a:srgbClr val="A31515"/>
+                </a:solidFill>
+                <a:latin typeface="Fira Code, Consolas,  Courier New"/>
+              </a:rPr>
+              <a:t>"5ff018a3-2a25-567e-8c74-1805c4029fbd"</a:t>
+            </a:r>
+            <a:endParaRPr lang="de-AT" dirty="0">
+              <a:solidFill>
+                <a:srgbClr val="000000"/>
+              </a:solidFill>
+              <a:latin typeface="Fira Code, Consolas,  Courier New"/>
+            </a:endParaRPr>
+          </a:p>
+          <a:p>
+            <a:pPr marL="0" indent="0">
+              <a:buNone/>
+            </a:pPr>
+            <a:r>
+              <a:rPr lang="de-AT" dirty="0">
+                <a:solidFill>
+                  <a:srgbClr val="000000"/>
+                </a:solidFill>
+                <a:latin typeface="Fira Code, Consolas,  Courier New"/>
+              </a:rPr>
+              <a:t>    },</a:t>
+            </a:r>
+          </a:p>
+          <a:p>
+            <a:pPr marL="0" indent="0">
+              <a:buNone/>
+            </a:pPr>
+            <a:r>
+              <a:rPr lang="de-AT" dirty="0">
+                <a:solidFill>
+                  <a:srgbClr val="000000"/>
+                </a:solidFill>
+                <a:latin typeface="Fira Code, Consolas,  Courier New"/>
+              </a:rPr>
+              <a:t>    </a:t>
+            </a:r>
+            <a:r>
+              <a:rPr lang="de-AT" dirty="0">
+                <a:solidFill>
+                  <a:srgbClr val="0451A5"/>
+                </a:solidFill>
+                <a:latin typeface="Fira Code, Consolas,  Courier New"/>
+              </a:rPr>
+              <a:t>"</a:t>
+            </a:r>
+            <a:r>
+              <a:rPr lang="de-AT" dirty="0" err="1">
+                <a:solidFill>
+                  <a:srgbClr val="0451A5"/>
+                </a:solidFill>
+                <a:latin typeface="Fira Code, Consolas,  Courier New"/>
+              </a:rPr>
+              <a:t>service</a:t>
+            </a:r>
+            <a:r>
+              <a:rPr lang="de-AT" dirty="0">
+                <a:solidFill>
+                  <a:srgbClr val="0451A5"/>
+                </a:solidFill>
+                <a:latin typeface="Fira Code, Consolas,  Courier New"/>
+              </a:rPr>
+              <a:t>"</a:t>
+            </a:r>
+            <a:r>
+              <a:rPr lang="de-AT" dirty="0">
+                <a:solidFill>
+                  <a:srgbClr val="000000"/>
+                </a:solidFill>
+                <a:latin typeface="Fira Code, Consolas,  Courier New"/>
+              </a:rPr>
+              <a:t>: </a:t>
+            </a:r>
+            <a:r>
+              <a:rPr lang="de-AT" dirty="0">
+                <a:solidFill>
+                  <a:srgbClr val="0000FF"/>
+                </a:solidFill>
+                <a:latin typeface="Fira Code, Consolas,  Courier New"/>
+              </a:rPr>
+              <a:t>null</a:t>
+            </a:r>
+            <a:endParaRPr lang="de-AT" dirty="0">
+              <a:solidFill>
+                <a:srgbClr val="000000"/>
+              </a:solidFill>
+              <a:latin typeface="Fira Code, Consolas,  Courier New"/>
+            </a:endParaRPr>
+          </a:p>
+          <a:p>
+            <a:pPr marL="0" indent="0">
+              <a:buNone/>
+            </a:pPr>
+            <a:r>
+              <a:rPr lang="de-AT" dirty="0">
+                <a:solidFill>
+                  <a:srgbClr val="000000"/>
+                </a:solidFill>
+                <a:latin typeface="Fira Code, Consolas,  Courier New"/>
+              </a:rPr>
+              <a:t>}</a:t>
+            </a:r>
+            <a:endParaRPr lang="de-AT" b="0" dirty="0">
+              <a:solidFill>
+                <a:srgbClr val="000000"/>
+              </a:solidFill>
+              <a:effectLst/>
+              <a:latin typeface="Fira Code, Consolas,  Courier New"/>
+            </a:endParaRPr>
+          </a:p>
+        </p:txBody>
+      </p:sp>
+    </p:spTree>
+    <p:extLst>
+      <p:ext uri="{BB962C8B-B14F-4D97-AF65-F5344CB8AC3E}">
+        <p14:creationId xmlns:p14="http://schemas.microsoft.com/office/powerpoint/2010/main" val="2735879224"/>
+      </p:ext>
+    </p:extLst>
+  </p:cSld>
+  <p:clrMapOvr>
+    <a:masterClrMapping/>
+  </p:clrMapOvr>
+</p:sld>
+</file>
+
+<file path=ppt/slides/slide31.xml><?xml version="1.0" encoding="utf-8"?>
+<p:sld xmlns:a="http://schemas.openxmlformats.org/drawingml/2006/main" xmlns:r="http://schemas.openxmlformats.org/officeDocument/2006/relationships" xmlns:p="http://schemas.openxmlformats.org/presentationml/2006/main">
+  <p:cSld>
+    <p:spTree>
+      <p:nvGrpSpPr>
+        <p:cNvPr id="1" name=""/>
+        <p:cNvGrpSpPr/>
+        <p:nvPr/>
+      </p:nvGrpSpPr>
+      <p:grpSpPr>
+        <a:xfrm>
+          <a:off x="0" y="0"/>
+          <a:ext cx="0" cy="0"/>
+          <a:chOff x="0" y="0"/>
+          <a:chExt cx="0" cy="0"/>
+        </a:xfrm>
+      </p:grpSpPr>
+      <p:sp>
+        <p:nvSpPr>
+          <p:cNvPr id="2" name="Title 1"/>
+          <p:cNvSpPr>
+            <a:spLocks noGrp="1"/>
+          </p:cNvSpPr>
+          <p:nvPr>
+            <p:ph type="title"/>
+          </p:nvPr>
+        </p:nvSpPr>
+        <p:spPr/>
+        <p:txBody>
+          <a:bodyPr/>
+          <a:lstStyle/>
+          <a:p>
+            <a:r>
+              <a:rPr lang="de-AT" dirty="0" smtClean="0"/>
+              <a:t>Service Design</a:t>
+            </a:r>
+            <a:endParaRPr lang="de-AT" dirty="0"/>
+          </a:p>
+        </p:txBody>
+      </p:sp>
+      <p:sp>
+        <p:nvSpPr>
+          <p:cNvPr id="3" name="Content Placeholder 2"/>
+          <p:cNvSpPr>
+            <a:spLocks noGrp="1"/>
+          </p:cNvSpPr>
+          <p:nvPr>
+            <p:ph idx="1"/>
+          </p:nvPr>
+        </p:nvSpPr>
+        <p:spPr/>
+        <p:txBody>
+          <a:bodyPr/>
+          <a:lstStyle/>
+          <a:p>
+            <a:pPr marL="0" indent="0">
+              <a:buNone/>
+            </a:pPr>
+            <a:endParaRPr lang="de-AT" dirty="0" smtClean="0"/>
+          </a:p>
+          <a:p>
+            <a:pPr marL="0" indent="0">
+              <a:buNone/>
+            </a:pPr>
+            <a:r>
+              <a:rPr lang="de-AT" dirty="0" smtClean="0"/>
+              <a:t>Who </a:t>
+            </a:r>
+            <a:r>
+              <a:rPr lang="de-AT" dirty="0" err="1" smtClean="0"/>
+              <a:t>operates</a:t>
+            </a:r>
+            <a:r>
+              <a:rPr lang="de-AT" dirty="0" smtClean="0"/>
+              <a:t> </a:t>
+            </a:r>
+            <a:r>
+              <a:rPr lang="de-AT" dirty="0" err="1" smtClean="0"/>
+              <a:t>your</a:t>
+            </a:r>
+            <a:r>
+              <a:rPr lang="de-AT" dirty="0" smtClean="0"/>
+              <a:t> </a:t>
+            </a:r>
+            <a:r>
+              <a:rPr lang="de-AT" dirty="0" err="1" smtClean="0"/>
+              <a:t>gateway</a:t>
+            </a:r>
+            <a:r>
+              <a:rPr lang="de-AT" dirty="0" smtClean="0"/>
+              <a:t>?</a:t>
+            </a:r>
+          </a:p>
+          <a:p>
+            <a:pPr marL="0" indent="0">
+              <a:buNone/>
+            </a:pPr>
+            <a:endParaRPr lang="de-AT" dirty="0"/>
+          </a:p>
+          <a:p>
+            <a:pPr marL="0" indent="0">
+              <a:buNone/>
+            </a:pPr>
+            <a:r>
+              <a:rPr lang="de-AT" dirty="0" smtClean="0"/>
+              <a:t>Who </a:t>
+            </a:r>
+            <a:r>
+              <a:rPr lang="de-AT" dirty="0" err="1" smtClean="0"/>
+              <a:t>uses</a:t>
+            </a:r>
+            <a:r>
+              <a:rPr lang="de-AT" dirty="0" smtClean="0"/>
+              <a:t> </a:t>
+            </a:r>
+            <a:r>
+              <a:rPr lang="de-AT" dirty="0" err="1" smtClean="0"/>
+              <a:t>your</a:t>
+            </a:r>
+            <a:r>
+              <a:rPr lang="de-AT" dirty="0" smtClean="0"/>
+              <a:t> </a:t>
+            </a:r>
+            <a:r>
+              <a:rPr lang="de-AT" dirty="0" err="1" smtClean="0"/>
+              <a:t>gateway</a:t>
+            </a:r>
+            <a:r>
+              <a:rPr lang="de-AT" dirty="0" smtClean="0"/>
+              <a:t>?</a:t>
+            </a:r>
+            <a:endParaRPr lang="de-AT" dirty="0"/>
+          </a:p>
+        </p:txBody>
+      </p:sp>
+    </p:spTree>
+    <p:extLst>
+      <p:ext uri="{BB962C8B-B14F-4D97-AF65-F5344CB8AC3E}">
+        <p14:creationId xmlns:p14="http://schemas.microsoft.com/office/powerpoint/2010/main" val="2848102619"/>
+      </p:ext>
+    </p:extLst>
+  </p:cSld>
+  <p:clrMapOvr>
+    <a:masterClrMapping/>
+  </p:clrMapOvr>
+</p:sld>
+</file>
+
+<file path=ppt/slides/slide32.xml><?xml version="1.0" encoding="utf-8"?>
+<p:sld xmlns:a="http://schemas.openxmlformats.org/drawingml/2006/main" xmlns:r="http://schemas.openxmlformats.org/officeDocument/2006/relationships" xmlns:p="http://schemas.openxmlformats.org/presentationml/2006/main">
+  <p:cSld>
+    <p:spTree>
+      <p:nvGrpSpPr>
+        <p:cNvPr id="1" name=""/>
+        <p:cNvGrpSpPr/>
+        <p:nvPr/>
+      </p:nvGrpSpPr>
+      <p:grpSpPr>
+        <a:xfrm>
+          <a:off x="0" y="0"/>
+          <a:ext cx="0" cy="0"/>
+          <a:chOff x="0" y="0"/>
+          <a:chExt cx="0" cy="0"/>
+        </a:xfrm>
+      </p:grpSpPr>
+      <p:sp>
+        <p:nvSpPr>
+          <p:cNvPr id="2" name="Title 1"/>
+          <p:cNvSpPr>
+            <a:spLocks noGrp="1"/>
+          </p:cNvSpPr>
+          <p:nvPr>
+            <p:ph type="title"/>
+          </p:nvPr>
+        </p:nvSpPr>
+        <p:spPr/>
+        <p:txBody>
+          <a:bodyPr/>
+          <a:lstStyle/>
+          <a:p>
+            <a:r>
+              <a:rPr lang="de-AT" dirty="0" err="1" smtClean="0"/>
               <a:t>Logging</a:t>
             </a:r>
             <a:r>
@@ -13782,7 +14330,7 @@
 </p:sld>
 </file>
 
-<file path=ppt/slides/slide29.xml><?xml version="1.0" encoding="utf-8"?>
+<file path=ppt/slides/slide33.xml><?xml version="1.0" encoding="utf-8"?>
 <p:sld xmlns:a="http://schemas.openxmlformats.org/drawingml/2006/main" xmlns:r="http://schemas.openxmlformats.org/officeDocument/2006/relationships" xmlns:p="http://schemas.openxmlformats.org/presentationml/2006/main">
   <p:cSld>
     <p:spTree>
@@ -14181,166 +14729,7 @@
 </p:sld>
 </file>
 
-<file path=ppt/slides/slide3.xml><?xml version="1.0" encoding="utf-8"?>
-<p:sld xmlns:a="http://schemas.openxmlformats.org/drawingml/2006/main" xmlns:r="http://schemas.openxmlformats.org/officeDocument/2006/relationships" xmlns:p="http://schemas.openxmlformats.org/presentationml/2006/main">
-  <p:cSld>
-    <p:spTree>
-      <p:nvGrpSpPr>
-        <p:cNvPr id="1" name=""/>
-        <p:cNvGrpSpPr/>
-        <p:nvPr/>
-      </p:nvGrpSpPr>
-      <p:grpSpPr>
-        <a:xfrm>
-          <a:off x="0" y="0"/>
-          <a:ext cx="0" cy="0"/>
-          <a:chOff x="0" y="0"/>
-          <a:chExt cx="0" cy="0"/>
-        </a:xfrm>
-      </p:grpSpPr>
-      <p:sp>
-        <p:nvSpPr>
-          <p:cNvPr id="2" name="Title 1"/>
-          <p:cNvSpPr>
-            <a:spLocks noGrp="1"/>
-          </p:cNvSpPr>
-          <p:nvPr>
-            <p:ph type="title"/>
-          </p:nvPr>
-        </p:nvSpPr>
-        <p:spPr/>
-        <p:txBody>
-          <a:bodyPr/>
-          <a:lstStyle/>
-          <a:p>
-            <a:r>
-              <a:rPr lang="de-AT" dirty="0" err="1" smtClean="0"/>
-              <a:t>Excursus</a:t>
-            </a:r>
-            <a:r>
-              <a:rPr lang="de-AT" dirty="0" smtClean="0"/>
-              <a:t>: </a:t>
-            </a:r>
-            <a:r>
-              <a:rPr lang="de-AT" dirty="0" err="1" smtClean="0"/>
-              <a:t>Documentation</a:t>
-            </a:r>
-            <a:endParaRPr lang="de-AT" dirty="0"/>
-          </a:p>
-        </p:txBody>
-      </p:sp>
-      <p:pic>
-        <p:nvPicPr>
-          <p:cNvPr id="5" name="Content Placeholder 4"/>
-          <p:cNvPicPr>
-            <a:picLocks noGrp="1" noChangeAspect="1"/>
-          </p:cNvPicPr>
-          <p:nvPr>
-            <p:ph idx="1"/>
-          </p:nvPr>
-        </p:nvPicPr>
-        <p:blipFill>
-          <a:blip r:embed="rId3"/>
-          <a:stretch>
-            <a:fillRect/>
-          </a:stretch>
-        </p:blipFill>
-        <p:spPr>
-          <a:xfrm>
-            <a:off x="6644640" y="457199"/>
-            <a:ext cx="5061458" cy="6035821"/>
-          </a:xfrm>
-          <a:prstGeom prst="rect">
-            <a:avLst/>
-          </a:prstGeom>
-        </p:spPr>
-      </p:pic>
-      <p:sp>
-        <p:nvSpPr>
-          <p:cNvPr id="4" name="Text Placeholder 3"/>
-          <p:cNvSpPr>
-            <a:spLocks noGrp="1"/>
-          </p:cNvSpPr>
-          <p:nvPr>
-            <p:ph type="body" sz="half" idx="2"/>
-          </p:nvPr>
-        </p:nvSpPr>
-        <p:spPr/>
-        <p:txBody>
-          <a:bodyPr/>
-          <a:lstStyle/>
-          <a:p>
-            <a:endParaRPr lang="de-AT" dirty="0" smtClean="0"/>
-          </a:p>
-          <a:p>
-            <a:r>
-              <a:rPr lang="de-AT" dirty="0" err="1" smtClean="0"/>
-              <a:t>OpenAPI</a:t>
-            </a:r>
-            <a:r>
-              <a:rPr lang="de-AT" dirty="0" smtClean="0"/>
-              <a:t> </a:t>
-            </a:r>
-            <a:r>
-              <a:rPr lang="de-AT" dirty="0"/>
-              <a:t>aka </a:t>
-            </a:r>
-            <a:r>
-              <a:rPr lang="de-AT" dirty="0" err="1"/>
-              <a:t>Swagger</a:t>
-            </a:r>
-            <a:endParaRPr lang="de-AT" dirty="0"/>
-          </a:p>
-          <a:p>
-            <a:r>
-              <a:rPr lang="de-AT" dirty="0" err="1"/>
-              <a:t>Example</a:t>
-            </a:r>
-            <a:r>
-              <a:rPr lang="de-AT" dirty="0"/>
-              <a:t> .NET Core </a:t>
-            </a:r>
-            <a:r>
-              <a:rPr lang="de-AT" dirty="0" err="1" smtClean="0"/>
-              <a:t>see</a:t>
-            </a:r>
-            <a:endParaRPr lang="de-AT" dirty="0" smtClean="0"/>
-          </a:p>
-          <a:p>
-            <a:r>
-              <a:rPr lang="de-AT" dirty="0">
-                <a:hlinkClick r:id="rId4"/>
-              </a:rPr>
-              <a:t>https://docs.microsoft.com/en-us/aspnet/core/tutorials/web-api-help-pages-using-swagger?view=aspnetcore-3.1</a:t>
-            </a:r>
-            <a:endParaRPr lang="de-AT" dirty="0"/>
-          </a:p>
-          <a:p>
-            <a:r>
-              <a:rPr lang="de-AT" dirty="0"/>
-              <a:t/>
-            </a:r>
-            <a:br>
-              <a:rPr lang="de-AT" dirty="0"/>
-            </a:br>
-            <a:endParaRPr lang="de-AT" dirty="0"/>
-          </a:p>
-        </p:txBody>
-      </p:sp>
-    </p:spTree>
-    <p:extLst>
-      <p:ext uri="{BB962C8B-B14F-4D97-AF65-F5344CB8AC3E}">
-        <p14:creationId xmlns:p14="http://schemas.microsoft.com/office/powerpoint/2010/main" val="1156229624"/>
-      </p:ext>
-    </p:extLst>
-  </p:cSld>
-  <p:clrMapOvr>
-    <a:masterClrMapping/>
-  </p:clrMapOvr>
-</p:sld>
-</file>
-
-<file path=ppt/slides/slide30.xml><?xml version="1.0" encoding="utf-8"?>
+<file path=ppt/slides/slide34.xml><?xml version="1.0" encoding="utf-8"?>
 <p:sld xmlns:a="http://schemas.openxmlformats.org/drawingml/2006/main" xmlns:r="http://schemas.openxmlformats.org/officeDocument/2006/relationships" xmlns:p="http://schemas.openxmlformats.org/presentationml/2006/main">
   <p:cSld>
     <p:spTree>
@@ -14485,7 +14874,7 @@
 </p:sld>
 </file>
 
-<file path=ppt/slides/slide31.xml><?xml version="1.0" encoding="utf-8"?>
+<file path=ppt/slides/slide35.xml><?xml version="1.0" encoding="utf-8"?>
 <p:sld xmlns:a="http://schemas.openxmlformats.org/drawingml/2006/main" xmlns:r="http://schemas.openxmlformats.org/officeDocument/2006/relationships" xmlns:p="http://schemas.openxmlformats.org/presentationml/2006/main">
   <p:cSld>
     <p:spTree>

</xml_diff>

<commit_message>
Added Upstreams and Targets.
</commit_message>
<xml_diff>
--- a/API Gateway.pptx
+++ b/API Gateway.pptx
@@ -11899,7 +11899,139 @@
           <a:bodyPr/>
           <a:lstStyle/>
           <a:p>
-            <a:endParaRPr lang="de-AT"/>
+            <a:r>
+              <a:rPr lang="de-AT" dirty="0" err="1" smtClean="0"/>
+              <a:t>virtual</a:t>
+            </a:r>
+            <a:r>
+              <a:rPr lang="de-AT" dirty="0" smtClean="0"/>
+              <a:t> </a:t>
+            </a:r>
+            <a:r>
+              <a:rPr lang="de-AT" dirty="0" err="1" smtClean="0"/>
+              <a:t>hostname</a:t>
+            </a:r>
+            <a:endParaRPr lang="de-AT" dirty="0" smtClean="0"/>
+          </a:p>
+          <a:p>
+            <a:r>
+              <a:rPr lang="de-AT" dirty="0" err="1" smtClean="0"/>
+              <a:t>load-balances</a:t>
+            </a:r>
+            <a:r>
+              <a:rPr lang="de-AT" dirty="0" smtClean="0"/>
+              <a:t> </a:t>
+            </a:r>
+            <a:r>
+              <a:rPr lang="de-AT" dirty="0" err="1" smtClean="0"/>
+              <a:t>requests</a:t>
+            </a:r>
+            <a:r>
+              <a:rPr lang="de-AT" dirty="0" smtClean="0"/>
+              <a:t> </a:t>
+            </a:r>
+            <a:r>
+              <a:rPr lang="de-AT" dirty="0" err="1" smtClean="0"/>
+              <a:t>to</a:t>
+            </a:r>
+            <a:r>
+              <a:rPr lang="de-AT" dirty="0" smtClean="0"/>
+              <a:t> (multiple) </a:t>
+            </a:r>
+            <a:r>
+              <a:rPr lang="de-AT" dirty="0" err="1" smtClean="0"/>
+              <a:t>services</a:t>
+            </a:r>
+            <a:r>
+              <a:rPr lang="de-AT" dirty="0" smtClean="0"/>
+              <a:t> (</a:t>
+            </a:r>
+            <a:r>
+              <a:rPr lang="de-AT" dirty="0" err="1" smtClean="0"/>
+              <a:t>targets</a:t>
+            </a:r>
+            <a:r>
+              <a:rPr lang="de-AT" dirty="0" smtClean="0"/>
+              <a:t>)</a:t>
+            </a:r>
+          </a:p>
+          <a:p>
+            <a:r>
+              <a:rPr lang="de-AT" dirty="0" err="1" smtClean="0"/>
+              <a:t>includes</a:t>
+            </a:r>
+            <a:r>
+              <a:rPr lang="de-AT" dirty="0" smtClean="0"/>
+              <a:t> </a:t>
+            </a:r>
+            <a:r>
+              <a:rPr lang="de-AT" dirty="0" err="1" smtClean="0"/>
+              <a:t>health</a:t>
+            </a:r>
+            <a:r>
+              <a:rPr lang="de-AT" dirty="0" smtClean="0"/>
+              <a:t> </a:t>
+            </a:r>
+            <a:r>
+              <a:rPr lang="de-AT" dirty="0" err="1" smtClean="0"/>
+              <a:t>checker</a:t>
+            </a:r>
+            <a:endParaRPr lang="de-AT" dirty="0"/>
+          </a:p>
+          <a:p>
+            <a:r>
+              <a:rPr lang="de-AT" dirty="0" err="1" smtClean="0"/>
+              <a:t>disables</a:t>
+            </a:r>
+            <a:r>
+              <a:rPr lang="de-AT" dirty="0" smtClean="0"/>
+              <a:t> </a:t>
+            </a:r>
+            <a:r>
+              <a:rPr lang="de-AT" dirty="0" err="1" smtClean="0"/>
+              <a:t>targets</a:t>
+            </a:r>
+            <a:r>
+              <a:rPr lang="de-AT" dirty="0"/>
+              <a:t> </a:t>
+            </a:r>
+            <a:r>
+              <a:rPr lang="de-AT" dirty="0" err="1" smtClean="0"/>
+              <a:t>based</a:t>
+            </a:r>
+            <a:r>
+              <a:rPr lang="de-AT" dirty="0" smtClean="0"/>
+              <a:t> on </a:t>
+            </a:r>
+            <a:r>
+              <a:rPr lang="de-AT" dirty="0" err="1" smtClean="0"/>
+              <a:t>inability</a:t>
+            </a:r>
+            <a:r>
+              <a:rPr lang="de-AT" dirty="0" smtClean="0"/>
+              <a:t> </a:t>
+            </a:r>
+            <a:r>
+              <a:rPr lang="de-AT" dirty="0" err="1" smtClean="0"/>
+              <a:t>to</a:t>
+            </a:r>
+            <a:r>
+              <a:rPr lang="de-AT" dirty="0" smtClean="0"/>
+              <a:t> </a:t>
+            </a:r>
+            <a:r>
+              <a:rPr lang="de-AT" dirty="0" err="1" smtClean="0"/>
+              <a:t>serve</a:t>
+            </a:r>
+            <a:r>
+              <a:rPr lang="de-AT" dirty="0" smtClean="0"/>
+              <a:t> </a:t>
+            </a:r>
+            <a:r>
+              <a:rPr lang="de-AT" dirty="0" err="1" smtClean="0"/>
+              <a:t>requests</a:t>
+            </a:r>
+            <a:endParaRPr lang="de-AT" dirty="0"/>
           </a:p>
         </p:txBody>
       </p:sp>
@@ -11918,7 +12050,103 @@
           <a:bodyPr/>
           <a:lstStyle/>
           <a:p>
-            <a:endParaRPr lang="de-AT"/>
+            <a:pPr marL="0" indent="0">
+              <a:buNone/>
+            </a:pPr>
+            <a:r>
+              <a:rPr lang="de-AT" dirty="0">
+                <a:solidFill>
+                  <a:srgbClr val="000000"/>
+                </a:solidFill>
+                <a:latin typeface="Fira Code, Consolas,  Courier New"/>
+              </a:rPr>
+              <a:t>{</a:t>
+            </a:r>
+          </a:p>
+          <a:p>
+            <a:pPr marL="0" indent="0">
+              <a:buNone/>
+            </a:pPr>
+            <a:r>
+              <a:rPr lang="de-AT" dirty="0">
+                <a:solidFill>
+                  <a:srgbClr val="000000"/>
+                </a:solidFill>
+                <a:latin typeface="Fira Code, Consolas,  Courier New"/>
+              </a:rPr>
+              <a:t>  </a:t>
+            </a:r>
+            <a:r>
+              <a:rPr lang="de-AT" dirty="0">
+                <a:solidFill>
+                  <a:srgbClr val="0451A5"/>
+                </a:solidFill>
+                <a:latin typeface="Fira Code, Consolas,  Courier New"/>
+              </a:rPr>
+              <a:t>"</a:t>
+            </a:r>
+            <a:r>
+              <a:rPr lang="de-AT" dirty="0" err="1">
+                <a:solidFill>
+                  <a:srgbClr val="0451A5"/>
+                </a:solidFill>
+                <a:latin typeface="Fira Code, Consolas,  Courier New"/>
+              </a:rPr>
+              <a:t>name</a:t>
+            </a:r>
+            <a:r>
+              <a:rPr lang="de-AT" dirty="0">
+                <a:solidFill>
+                  <a:srgbClr val="0451A5"/>
+                </a:solidFill>
+                <a:latin typeface="Fira Code, Consolas,  Courier New"/>
+              </a:rPr>
+              <a:t>"</a:t>
+            </a:r>
+            <a:r>
+              <a:rPr lang="de-AT" dirty="0">
+                <a:solidFill>
+                  <a:srgbClr val="000000"/>
+                </a:solidFill>
+                <a:latin typeface="Fira Code, Consolas,  Courier New"/>
+              </a:rPr>
+              <a:t>: </a:t>
+            </a:r>
+            <a:r>
+              <a:rPr lang="de-AT" dirty="0">
+                <a:solidFill>
+                  <a:srgbClr val="A31515"/>
+                </a:solidFill>
+                <a:latin typeface="Fira Code, Consolas,  Courier New"/>
+              </a:rPr>
+              <a:t>"calcapi.v1.service"</a:t>
+            </a:r>
+            <a:endParaRPr lang="de-AT" dirty="0">
+              <a:solidFill>
+                <a:srgbClr val="000000"/>
+              </a:solidFill>
+              <a:latin typeface="Fira Code, Consolas,  Courier New"/>
+            </a:endParaRPr>
+          </a:p>
+          <a:p>
+            <a:pPr marL="0" indent="0">
+              <a:buNone/>
+            </a:pPr>
+            <a:r>
+              <a:rPr lang="de-AT" dirty="0" smtClean="0">
+                <a:solidFill>
+                  <a:srgbClr val="000000"/>
+                </a:solidFill>
+                <a:latin typeface="Fira Code, Consolas,  Courier New"/>
+              </a:rPr>
+              <a:t>}</a:t>
+            </a:r>
+            <a:endParaRPr lang="de-AT" dirty="0">
+              <a:solidFill>
+                <a:srgbClr val="000000"/>
+              </a:solidFill>
+              <a:latin typeface="Fira Code, Consolas,  Courier New"/>
+            </a:endParaRPr>
           </a:p>
         </p:txBody>
       </p:sp>
@@ -11990,7 +12218,135 @@
           <a:bodyPr/>
           <a:lstStyle/>
           <a:p>
+            <a:r>
+              <a:rPr lang="de-AT" dirty="0" smtClean="0"/>
+              <a:t>IP-</a:t>
+            </a:r>
+            <a:r>
+              <a:rPr lang="de-AT" dirty="0" err="1" smtClean="0"/>
+              <a:t>adress</a:t>
+            </a:r>
+            <a:r>
+              <a:rPr lang="de-AT" dirty="0" smtClean="0"/>
+              <a:t> </a:t>
+            </a:r>
+            <a:r>
+              <a:rPr lang="de-AT" dirty="0" err="1" smtClean="0"/>
+              <a:t>or</a:t>
+            </a:r>
+            <a:r>
+              <a:rPr lang="de-AT" dirty="0" smtClean="0"/>
+              <a:t> </a:t>
+            </a:r>
+            <a:r>
+              <a:rPr lang="de-AT" dirty="0" err="1" smtClean="0"/>
+              <a:t>hostname</a:t>
+            </a:r>
+            <a:r>
+              <a:rPr lang="de-AT" dirty="0" smtClean="0"/>
+              <a:t> w/ </a:t>
+            </a:r>
+            <a:r>
+              <a:rPr lang="de-AT" dirty="0" err="1" smtClean="0"/>
+              <a:t>port</a:t>
+            </a:r>
+            <a:r>
+              <a:rPr lang="de-AT" dirty="0" smtClean="0"/>
+              <a:t> </a:t>
+            </a:r>
+            <a:r>
+              <a:rPr lang="de-AT" dirty="0" err="1" smtClean="0"/>
+              <a:t>identifying</a:t>
+            </a:r>
+            <a:r>
+              <a:rPr lang="de-AT" dirty="0" smtClean="0"/>
+              <a:t> an </a:t>
+            </a:r>
+            <a:r>
+              <a:rPr lang="de-AT" dirty="0" err="1" smtClean="0"/>
+              <a:t>instance</a:t>
+            </a:r>
+            <a:r>
+              <a:rPr lang="de-AT" dirty="0" smtClean="0"/>
+              <a:t> </a:t>
+            </a:r>
+            <a:r>
+              <a:rPr lang="de-AT" dirty="0" err="1" smtClean="0"/>
+              <a:t>of</a:t>
+            </a:r>
+            <a:r>
+              <a:rPr lang="de-AT" dirty="0" smtClean="0"/>
+              <a:t> a backend </a:t>
+            </a:r>
+            <a:r>
+              <a:rPr lang="de-AT" dirty="0" err="1" smtClean="0"/>
+              <a:t>service</a:t>
+            </a:r>
+            <a:endParaRPr lang="de-AT" dirty="0" smtClean="0"/>
+          </a:p>
+          <a:p>
             <a:endParaRPr lang="de-AT" dirty="0"/>
+          </a:p>
+          <a:p>
+            <a:r>
+              <a:rPr lang="de-AT" dirty="0" smtClean="0"/>
+              <a:t>Dynamic </a:t>
+            </a:r>
+            <a:r>
+              <a:rPr lang="de-AT" dirty="0" err="1" smtClean="0"/>
+              <a:t>list</a:t>
+            </a:r>
+            <a:r>
+              <a:rPr lang="de-AT" dirty="0" smtClean="0"/>
+              <a:t> </a:t>
+            </a:r>
+            <a:r>
+              <a:rPr lang="de-AT" dirty="0" err="1" smtClean="0"/>
+              <a:t>with</a:t>
+            </a:r>
+            <a:r>
+              <a:rPr lang="de-AT" dirty="0" smtClean="0"/>
+              <a:t> </a:t>
+            </a:r>
+            <a:r>
+              <a:rPr lang="de-AT" dirty="0" err="1" smtClean="0"/>
+              <a:t>weights</a:t>
+            </a:r>
+            <a:r>
+              <a:rPr lang="de-AT" dirty="0" smtClean="0"/>
+              <a:t> per </a:t>
+            </a:r>
+            <a:r>
+              <a:rPr lang="de-AT" dirty="0" err="1" smtClean="0"/>
+              <a:t>upstream</a:t>
+            </a:r>
+            <a:endParaRPr lang="de-AT" dirty="0" smtClean="0"/>
+          </a:p>
+          <a:p>
+            <a:endParaRPr lang="de-AT" dirty="0"/>
+          </a:p>
+          <a:p>
+            <a:r>
+              <a:rPr lang="de-AT" dirty="0" err="1" smtClean="0"/>
+              <a:t>Cannot</a:t>
+            </a:r>
+            <a:r>
+              <a:rPr lang="de-AT" dirty="0" smtClean="0"/>
+              <a:t> </a:t>
+            </a:r>
+            <a:r>
+              <a:rPr lang="de-AT" dirty="0" err="1" smtClean="0"/>
+              <a:t>be</a:t>
+            </a:r>
+            <a:r>
+              <a:rPr lang="de-AT" dirty="0" smtClean="0"/>
+              <a:t> </a:t>
+            </a:r>
+            <a:r>
+              <a:rPr lang="de-AT" dirty="0" err="1" smtClean="0"/>
+              <a:t>deleted</a:t>
+            </a:r>
+            <a:endParaRPr lang="de-AT" dirty="0" smtClean="0"/>
           </a:p>
         </p:txBody>
       </p:sp>
@@ -12009,7 +12365,172 @@
           <a:bodyPr/>
           <a:lstStyle/>
           <a:p>
-            <a:endParaRPr lang="de-AT"/>
+            <a:pPr marL="0" indent="0">
+              <a:buNone/>
+            </a:pPr>
+            <a:r>
+              <a:rPr lang="de-AT" dirty="0">
+                <a:solidFill>
+                  <a:srgbClr val="000000"/>
+                </a:solidFill>
+                <a:latin typeface="Fira Code, Consolas,  Courier New"/>
+              </a:rPr>
+              <a:t>{</a:t>
+            </a:r>
+          </a:p>
+          <a:p>
+            <a:pPr marL="0" indent="0">
+              <a:buNone/>
+            </a:pPr>
+            <a:r>
+              <a:rPr lang="de-AT" dirty="0">
+                <a:solidFill>
+                  <a:srgbClr val="000000"/>
+                </a:solidFill>
+                <a:latin typeface="Fira Code, Consolas,  Courier New"/>
+              </a:rPr>
+              <a:t>    </a:t>
+            </a:r>
+            <a:r>
+              <a:rPr lang="de-AT" dirty="0">
+                <a:solidFill>
+                  <a:srgbClr val="0451A5"/>
+                </a:solidFill>
+                <a:latin typeface="Fira Code, Consolas,  Courier New"/>
+              </a:rPr>
+              <a:t>"</a:t>
+            </a:r>
+            <a:r>
+              <a:rPr lang="de-AT" dirty="0" err="1">
+                <a:solidFill>
+                  <a:srgbClr val="0451A5"/>
+                </a:solidFill>
+                <a:latin typeface="Fira Code, Consolas,  Courier New"/>
+              </a:rPr>
+              <a:t>target</a:t>
+            </a:r>
+            <a:r>
+              <a:rPr lang="de-AT" dirty="0">
+                <a:solidFill>
+                  <a:srgbClr val="0451A5"/>
+                </a:solidFill>
+                <a:latin typeface="Fira Code, Consolas,  Courier New"/>
+              </a:rPr>
+              <a:t>"</a:t>
+            </a:r>
+            <a:r>
+              <a:rPr lang="de-AT" dirty="0">
+                <a:solidFill>
+                  <a:srgbClr val="000000"/>
+                </a:solidFill>
+                <a:latin typeface="Fira Code, Consolas,  Courier New"/>
+              </a:rPr>
+              <a:t> : </a:t>
+            </a:r>
+            <a:r>
+              <a:rPr lang="de-AT" dirty="0">
+                <a:solidFill>
+                  <a:srgbClr val="A31515"/>
+                </a:solidFill>
+                <a:latin typeface="Fira Code, Consolas,  Courier New"/>
+              </a:rPr>
+              <a:t>"calc-api:80"</a:t>
+            </a:r>
+            <a:r>
+              <a:rPr lang="de-AT" dirty="0">
+                <a:solidFill>
+                  <a:srgbClr val="000000"/>
+                </a:solidFill>
+                <a:latin typeface="Fira Code, Consolas,  Courier New"/>
+              </a:rPr>
+              <a:t>,</a:t>
+            </a:r>
+          </a:p>
+          <a:p>
+            <a:pPr marL="0" indent="0">
+              <a:buNone/>
+            </a:pPr>
+            <a:r>
+              <a:rPr lang="de-AT" dirty="0">
+                <a:solidFill>
+                  <a:srgbClr val="000000"/>
+                </a:solidFill>
+                <a:latin typeface="Fira Code, Consolas,  Courier New"/>
+              </a:rPr>
+              <a:t>    </a:t>
+            </a:r>
+            <a:r>
+              <a:rPr lang="de-AT" dirty="0">
+                <a:solidFill>
+                  <a:srgbClr val="0451A5"/>
+                </a:solidFill>
+                <a:latin typeface="Fira Code, Consolas,  Courier New"/>
+              </a:rPr>
+              <a:t>"</a:t>
+            </a:r>
+            <a:r>
+              <a:rPr lang="de-AT" dirty="0" err="1">
+                <a:solidFill>
+                  <a:srgbClr val="0451A5"/>
+                </a:solidFill>
+                <a:latin typeface="Fira Code, Consolas,  Courier New"/>
+              </a:rPr>
+              <a:t>weight</a:t>
+            </a:r>
+            <a:r>
+              <a:rPr lang="de-AT" dirty="0">
+                <a:solidFill>
+                  <a:srgbClr val="0451A5"/>
+                </a:solidFill>
+                <a:latin typeface="Fira Code, Consolas,  Courier New"/>
+              </a:rPr>
+              <a:t>"</a:t>
+            </a:r>
+            <a:r>
+              <a:rPr lang="de-AT" dirty="0">
+                <a:solidFill>
+                  <a:srgbClr val="000000"/>
+                </a:solidFill>
+                <a:latin typeface="Fira Code, Consolas,  Courier New"/>
+              </a:rPr>
+              <a:t>: </a:t>
+            </a:r>
+            <a:r>
+              <a:rPr lang="de-AT" dirty="0">
+                <a:solidFill>
+                  <a:srgbClr val="09885A"/>
+                </a:solidFill>
+                <a:latin typeface="Fira Code, Consolas,  Courier New"/>
+              </a:rPr>
+              <a:t>100</a:t>
+            </a:r>
+            <a:endParaRPr lang="de-AT" dirty="0">
+              <a:solidFill>
+                <a:srgbClr val="000000"/>
+              </a:solidFill>
+              <a:latin typeface="Fira Code, Consolas,  Courier New"/>
+            </a:endParaRPr>
+          </a:p>
+          <a:p>
+            <a:pPr marL="0" indent="0">
+              <a:buNone/>
+            </a:pPr>
+            <a:r>
+              <a:rPr lang="de-AT" dirty="0">
+                <a:solidFill>
+                  <a:srgbClr val="000000"/>
+                </a:solidFill>
+                <a:latin typeface="Fira Code, Consolas,  Courier New"/>
+              </a:rPr>
+              <a:t>}</a:t>
+            </a:r>
+            <a:endParaRPr lang="de-AT" b="0" dirty="0">
+              <a:solidFill>
+                <a:srgbClr val="000000"/>
+              </a:solidFill>
+              <a:effectLst/>
+              <a:latin typeface="Fira Code, Consolas,  Courier New"/>
+            </a:endParaRPr>
           </a:p>
         </p:txBody>
       </p:sp>

</xml_diff>